<commit_message>
Changed master slide also updated  flowchart
</commit_message>
<xml_diff>
--- a/Praesentation/Vorlage Präsentation.pptx
+++ b/Praesentation/Vorlage Präsentation.pptx
@@ -5,10 +5,10 @@
     <p:sldMasterId id="2147483648" r:id="rId1"/>
   </p:sldMasterIdLst>
   <p:notesMasterIdLst>
-    <p:notesMasterId r:id="rId14"/>
+    <p:notesMasterId r:id="rId19"/>
   </p:notesMasterIdLst>
   <p:handoutMasterIdLst>
-    <p:handoutMasterId r:id="rId15"/>
+    <p:handoutMasterId r:id="rId20"/>
   </p:handoutMasterIdLst>
   <p:sldIdLst>
     <p:sldId id="589" r:id="rId2"/>
@@ -18,11 +18,16 @@
     <p:sldId id="594" r:id="rId6"/>
     <p:sldId id="595" r:id="rId7"/>
     <p:sldId id="596" r:id="rId8"/>
-    <p:sldId id="597" r:id="rId9"/>
-    <p:sldId id="598" r:id="rId10"/>
-    <p:sldId id="599" r:id="rId11"/>
-    <p:sldId id="600" r:id="rId12"/>
-    <p:sldId id="601" r:id="rId13"/>
+    <p:sldId id="602" r:id="rId9"/>
+    <p:sldId id="603" r:id="rId10"/>
+    <p:sldId id="597" r:id="rId11"/>
+    <p:sldId id="604" r:id="rId12"/>
+    <p:sldId id="598" r:id="rId13"/>
+    <p:sldId id="605" r:id="rId14"/>
+    <p:sldId id="599" r:id="rId15"/>
+    <p:sldId id="606" r:id="rId16"/>
+    <p:sldId id="600" r:id="rId17"/>
+    <p:sldId id="601" r:id="rId18"/>
   </p:sldIdLst>
   <p:sldSz cx="9144000" cy="6858000" type="screen4x3"/>
   <p:notesSz cx="6797675" cy="9928225"/>
@@ -153,7 +158,7 @@
   </p:defaultTextStyle>
   <p:extLst>
     <p:ext uri="{EFAFB233-063F-42B5-8137-9DF3F51BA10A}">
-      <p15:sldGuideLst xmlns:p15="http://schemas.microsoft.com/office/powerpoint/2012/main" xmlns="">
+      <p15:sldGuideLst xmlns:p15="http://schemas.microsoft.com/office/powerpoint/2012/main">
         <p15:guide id="1" orient="horz" pos="2160">
           <p15:clr>
             <a:srgbClr val="A4A3A4"/>
@@ -167,7 +172,7 @@
       </p15:sldGuideLst>
     </p:ext>
     <p:ext uri="{2D200454-40CA-4A62-9FC3-DE9A4176ACB9}">
-      <p15:notesGuideLst xmlns:p15="http://schemas.microsoft.com/office/powerpoint/2012/main" xmlns="">
+      <p15:notesGuideLst xmlns:p15="http://schemas.microsoft.com/office/powerpoint/2012/main">
         <p15:guide id="1" orient="horz" pos="3127">
           <p15:clr>
             <a:srgbClr val="A4A3A4"/>
@@ -1715,25 +1720,7 @@
                 </a:solidFill>
                 <a:cs typeface="+mn-cs"/>
               </a:rPr>
-              <a:t>Institut für </a:t>
-            </a:r>
-            <a:r>
-              <a:rPr lang="de-DE" sz="1400" b="0" dirty="0" err="1" smtClean="0">
-                <a:solidFill>
-                  <a:schemeClr val="bg1"/>
-                </a:solidFill>
-                <a:cs typeface="+mn-cs"/>
-              </a:rPr>
-              <a:t>Anthropomatik</a:t>
-            </a:r>
-            <a:r>
-              <a:rPr lang="de-DE" sz="1400" b="0" dirty="0" smtClean="0">
-                <a:solidFill>
-                  <a:schemeClr val="bg1"/>
-                </a:solidFill>
-                <a:cs typeface="+mn-cs"/>
-              </a:rPr>
-              <a:t> und Robotik (IAR) - Intelligente Prozessautomation und Robotik (IPR)</a:t>
+              <a:t>Institut für Anthropomatik und Robotik (IAR) - Intelligente Prozessautomation und Robotik (IPR)</a:t>
             </a:r>
           </a:p>
         </p:txBody>
@@ -2529,6 +2516,13 @@
   <p:clrMapOvr>
     <a:masterClrMapping/>
   </p:clrMapOvr>
+  <p:timing>
+    <p:tnLst>
+      <p:par>
+        <p:cTn id="1" dur="indefinite" restart="never" nodeType="tmRoot"/>
+      </p:par>
+    </p:tnLst>
+  </p:timing>
 </p:sldLayout>
 </file>
 
@@ -3181,6 +3175,13 @@
   <p:clrMapOvr>
     <a:masterClrMapping/>
   </p:clrMapOvr>
+  <p:timing>
+    <p:tnLst>
+      <p:par>
+        <p:cTn id="1" dur="indefinite" restart="never" nodeType="tmRoot"/>
+      </p:par>
+    </p:tnLst>
+  </p:timing>
 </p:sldLayout>
 </file>
 
@@ -4014,25 +4015,7 @@
                 </a:solidFill>
                 <a:cs typeface="+mn-cs"/>
               </a:rPr>
-              <a:t>Institut für </a:t>
-            </a:r>
-            <a:r>
-              <a:rPr lang="de-DE" sz="900" b="0" dirty="0" err="1" smtClean="0">
-                <a:solidFill>
-                  <a:schemeClr val="tx1"/>
-                </a:solidFill>
-                <a:cs typeface="+mn-cs"/>
-              </a:rPr>
-              <a:t>Anthropomatik</a:t>
-            </a:r>
-            <a:r>
-              <a:rPr lang="de-DE" sz="900" b="0" dirty="0" smtClean="0">
-                <a:solidFill>
-                  <a:schemeClr val="tx1"/>
-                </a:solidFill>
-                <a:cs typeface="+mn-cs"/>
-              </a:rPr>
-              <a:t> und Robotik (IAR) -</a:t>
+              <a:t>Institut für Anthropomatik und Robotik (IAR) -</a:t>
             </a:r>
           </a:p>
           <a:p>
@@ -4462,26 +4445,50 @@
                 </a:solidFill>
                 <a:cs typeface="+mn-cs"/>
               </a:rPr>
-              <a:t>	Prof. Heinz </a:t>
-            </a:r>
-            <a:r>
-              <a:rPr lang="de-DE" altLang="de-DE" sz="900" b="0" dirty="0" err="1" smtClean="0">
+              <a:t>	</a:t>
+            </a:r>
+            <a:r>
+              <a:rPr lang="de-DE" altLang="de-DE" sz="900" b="0" dirty="0" smtClean="0">
                 <a:solidFill>
                   <a:schemeClr val="tx1"/>
                 </a:solidFill>
                 <a:cs typeface="+mn-cs"/>
               </a:rPr>
-              <a:t>Wörn</a:t>
-            </a:r>
-            <a:r>
-              <a:rPr lang="de-DE" altLang="de-DE" sz="900" b="0" dirty="0" smtClean="0">
+              <a:t> Christoph Jost, Marcus </a:t>
+            </a:r>
+            <a:r>
+              <a:rPr lang="de-DE" altLang="de-DE" sz="900" b="0" dirty="0" err="1" smtClean="0">
                 <a:solidFill>
                   <a:schemeClr val="tx1"/>
                 </a:solidFill>
                 <a:cs typeface="+mn-cs"/>
               </a:rPr>
-              <a:t>, Prof. Björn Hein - Jahrespräsentation 2015</a:t>
-            </a:r>
+              <a:t>Conzelmann</a:t>
+            </a:r>
+            <a:r>
+              <a:rPr lang="de-DE" altLang="de-DE" sz="900" b="0" dirty="0" smtClean="0">
+                <a:solidFill>
+                  <a:schemeClr val="tx1"/>
+                </a:solidFill>
+                <a:cs typeface="+mn-cs"/>
+              </a:rPr>
+              <a:t>,</a:t>
+            </a:r>
+            <a:r>
+              <a:rPr lang="de-DE" altLang="de-DE" sz="900" b="0" baseline="0" dirty="0" smtClean="0">
+                <a:solidFill>
+                  <a:schemeClr val="tx1"/>
+                </a:solidFill>
+                <a:cs typeface="+mn-cs"/>
+              </a:rPr>
+              <a:t> Patrick Petersen</a:t>
+            </a:r>
+            <a:endParaRPr lang="de-DE" altLang="de-DE" sz="900" b="0" dirty="0" smtClean="0">
+              <a:solidFill>
+                <a:schemeClr val="tx1"/>
+              </a:solidFill>
+              <a:cs typeface="+mn-cs"/>
+            </a:endParaRPr>
           </a:p>
         </p:txBody>
       </p:sp>
@@ -4959,7 +4966,15 @@
                   <a:srgbClr val="006666"/>
                 </a:solidFill>
               </a:rPr>
-              <a:t>Praktikum Robotik und Automation I</a:t>
+              <a:t>Projektpraktikum </a:t>
+            </a:r>
+            <a:r>
+              <a:rPr lang="de-DE" altLang="de-DE" sz="3200" dirty="0">
+                <a:solidFill>
+                  <a:srgbClr val="006666"/>
+                </a:solidFill>
+              </a:rPr>
+              <a:t>Robotik und Automation I </a:t>
             </a:r>
             <a:endParaRPr lang="de-DE" altLang="de-DE" sz="2400" dirty="0" smtClean="0">
               <a:solidFill>
@@ -5821,26 +5836,10 @@
           <a:lstStyle/>
           <a:p>
             <a:r>
-              <a:rPr lang="en-US" dirty="0" err="1" smtClean="0"/>
-              <a:t>Prüfen</a:t>
-            </a:r>
-            <a:r>
-              <a:rPr lang="en-US" dirty="0" smtClean="0"/>
-              <a:t> </a:t>
-            </a:r>
-            <a:r>
-              <a:rPr lang="en-US" dirty="0" err="1" smtClean="0"/>
-              <a:t>der</a:t>
-            </a:r>
-            <a:r>
-              <a:rPr lang="en-US" dirty="0" smtClean="0"/>
-              <a:t> </a:t>
-            </a:r>
-            <a:r>
-              <a:rPr lang="en-US" dirty="0" err="1" smtClean="0"/>
-              <a:t>Bohrungen</a:t>
-            </a:r>
-            <a:endParaRPr lang="en-US" dirty="0"/>
+              <a:rPr lang="de-DE" dirty="0" smtClean="0"/>
+              <a:t>Kalibrierung</a:t>
+            </a:r>
+            <a:endParaRPr lang="de-DE" dirty="0"/>
           </a:p>
         </p:txBody>
       </p:sp>
@@ -5859,7 +5858,11 @@
           <a:bodyPr/>
           <a:lstStyle/>
           <a:p>
-            <a:endParaRPr lang="en-US"/>
+            <a:r>
+              <a:rPr lang="de-DE" dirty="0" err="1" smtClean="0"/>
+              <a:t>aaaa</a:t>
+            </a:r>
+            <a:endParaRPr lang="de-DE" dirty="0"/>
           </a:p>
         </p:txBody>
       </p:sp>
@@ -5868,6 +5871,13 @@
   <p:clrMapOvr>
     <a:masterClrMapping/>
   </p:clrMapOvr>
+  <p:timing>
+    <p:tnLst>
+      <p:par>
+        <p:cTn id="1" dur="indefinite" restart="never" nodeType="tmRoot"/>
+      </p:par>
+    </p:tnLst>
+  </p:timing>
 </p:sld>
 </file>
 
@@ -5904,18 +5914,412 @@
           <a:lstStyle/>
           <a:p>
             <a:r>
-              <a:rPr lang="en-US" dirty="0" err="1" smtClean="0"/>
-              <a:t>Prüfen</a:t>
-            </a:r>
-            <a:r>
-              <a:rPr lang="en-US" dirty="0" smtClean="0"/>
-              <a:t> auf </a:t>
-            </a:r>
-            <a:r>
-              <a:rPr lang="en-US" dirty="0" err="1" smtClean="0"/>
-              <a:t>Beschädigungen</a:t>
-            </a:r>
-            <a:endParaRPr lang="en-US" dirty="0"/>
+              <a:rPr lang="de-DE" dirty="0" smtClean="0"/>
+              <a:t>Programm-Ablauf</a:t>
+            </a:r>
+            <a:endParaRPr lang="de-DE" dirty="0"/>
+          </a:p>
+        </p:txBody>
+      </p:sp>
+      <p:sp>
+        <p:nvSpPr>
+          <p:cNvPr id="4" name="Flussdiagramm: Alternativer Prozess 3"/>
+          <p:cNvSpPr/>
+          <p:nvPr/>
+        </p:nvSpPr>
+        <p:spPr>
+          <a:xfrm>
+            <a:off x="2971800" y="1040600"/>
+            <a:ext cx="2743200" cy="612648"/>
+          </a:xfrm>
+          <a:prstGeom prst="flowChartAlternateProcess">
+            <a:avLst/>
+          </a:prstGeom>
+          <a:solidFill>
+            <a:schemeClr val="accent1">
+              <a:alpha val="25000"/>
+            </a:schemeClr>
+          </a:solidFill>
+          <a:ln>
+            <a:solidFill>
+              <a:schemeClr val="accent1">
+                <a:shade val="50000"/>
+                <a:alpha val="25000"/>
+              </a:schemeClr>
+            </a:solidFill>
+          </a:ln>
+        </p:spPr>
+        <p:style>
+          <a:lnRef idx="2">
+            <a:schemeClr val="accent1">
+              <a:shade val="50000"/>
+            </a:schemeClr>
+          </a:lnRef>
+          <a:fillRef idx="1">
+            <a:schemeClr val="accent1"/>
+          </a:fillRef>
+          <a:effectRef idx="0">
+            <a:schemeClr val="accent1"/>
+          </a:effectRef>
+          <a:fontRef idx="minor">
+            <a:schemeClr val="lt1"/>
+          </a:fontRef>
+        </p:style>
+        <p:txBody>
+          <a:bodyPr rtlCol="0" anchor="ctr"/>
+          <a:lstStyle/>
+          <a:p>
+            <a:pPr algn="ctr"/>
+            <a:r>
+              <a:rPr lang="de-DE" dirty="0" smtClean="0"/>
+              <a:t>Kalibrierung</a:t>
+            </a:r>
+            <a:endParaRPr lang="de-DE" dirty="0"/>
+          </a:p>
+        </p:txBody>
+      </p:sp>
+      <p:sp>
+        <p:nvSpPr>
+          <p:cNvPr id="5" name="Flussdiagramm: Alternativer Prozess 4"/>
+          <p:cNvSpPr/>
+          <p:nvPr/>
+        </p:nvSpPr>
+        <p:spPr>
+          <a:xfrm>
+            <a:off x="2971800" y="2397744"/>
+            <a:ext cx="2743200" cy="612648"/>
+          </a:xfrm>
+          <a:prstGeom prst="flowChartAlternateProcess">
+            <a:avLst/>
+          </a:prstGeom>
+          <a:solidFill>
+            <a:schemeClr val="accent1"/>
+          </a:solidFill>
+          <a:ln>
+            <a:solidFill>
+              <a:schemeClr val="accent1"/>
+            </a:solidFill>
+          </a:ln>
+        </p:spPr>
+        <p:style>
+          <a:lnRef idx="2">
+            <a:schemeClr val="accent1">
+              <a:shade val="50000"/>
+            </a:schemeClr>
+          </a:lnRef>
+          <a:fillRef idx="1">
+            <a:schemeClr val="accent1"/>
+          </a:fillRef>
+          <a:effectRef idx="0">
+            <a:schemeClr val="accent1"/>
+          </a:effectRef>
+          <a:fontRef idx="minor">
+            <a:schemeClr val="lt1"/>
+          </a:fontRef>
+        </p:style>
+        <p:txBody>
+          <a:bodyPr rtlCol="0" anchor="ctr"/>
+          <a:lstStyle/>
+          <a:p>
+            <a:pPr algn="ctr"/>
+            <a:r>
+              <a:rPr lang="de-DE" dirty="0"/>
+              <a:t>Lage und Maße</a:t>
+            </a:r>
+            <a:endParaRPr lang="de-DE" dirty="0"/>
+          </a:p>
+        </p:txBody>
+      </p:sp>
+      <p:sp>
+        <p:nvSpPr>
+          <p:cNvPr id="6" name="Flussdiagramm: Alternativer Prozess 5"/>
+          <p:cNvSpPr/>
+          <p:nvPr/>
+        </p:nvSpPr>
+        <p:spPr>
+          <a:xfrm>
+            <a:off x="2986216" y="3748710"/>
+            <a:ext cx="2743200" cy="612648"/>
+          </a:xfrm>
+          <a:prstGeom prst="flowChartAlternateProcess">
+            <a:avLst/>
+          </a:prstGeom>
+          <a:solidFill>
+            <a:schemeClr val="accent1">
+              <a:alpha val="25000"/>
+            </a:schemeClr>
+          </a:solidFill>
+          <a:ln>
+            <a:solidFill>
+              <a:schemeClr val="accent1">
+                <a:alpha val="25000"/>
+              </a:schemeClr>
+            </a:solidFill>
+          </a:ln>
+        </p:spPr>
+        <p:style>
+          <a:lnRef idx="2">
+            <a:schemeClr val="accent1">
+              <a:shade val="50000"/>
+            </a:schemeClr>
+          </a:lnRef>
+          <a:fillRef idx="1">
+            <a:schemeClr val="accent1"/>
+          </a:fillRef>
+          <a:effectRef idx="0">
+            <a:schemeClr val="accent1"/>
+          </a:effectRef>
+          <a:fontRef idx="minor">
+            <a:schemeClr val="lt1"/>
+          </a:fontRef>
+        </p:style>
+        <p:txBody>
+          <a:bodyPr rtlCol="0" anchor="ctr"/>
+          <a:lstStyle/>
+          <a:p>
+            <a:pPr algn="ctr"/>
+            <a:r>
+              <a:rPr lang="de-DE" dirty="0" smtClean="0"/>
+              <a:t>Bohrungen</a:t>
+            </a:r>
+            <a:endParaRPr lang="de-DE" dirty="0"/>
+          </a:p>
+        </p:txBody>
+      </p:sp>
+      <p:sp>
+        <p:nvSpPr>
+          <p:cNvPr id="7" name="Flussdiagramm: Alternativer Prozess 6"/>
+          <p:cNvSpPr/>
+          <p:nvPr/>
+        </p:nvSpPr>
+        <p:spPr>
+          <a:xfrm>
+            <a:off x="2971800" y="5105854"/>
+            <a:ext cx="2743200" cy="612648"/>
+          </a:xfrm>
+          <a:prstGeom prst="flowChartAlternateProcess">
+            <a:avLst/>
+          </a:prstGeom>
+          <a:solidFill>
+            <a:schemeClr val="accent1">
+              <a:alpha val="25000"/>
+            </a:schemeClr>
+          </a:solidFill>
+          <a:ln>
+            <a:solidFill>
+              <a:schemeClr val="accent1">
+                <a:alpha val="25000"/>
+              </a:schemeClr>
+            </a:solidFill>
+          </a:ln>
+        </p:spPr>
+        <p:style>
+          <a:lnRef idx="2">
+            <a:schemeClr val="accent1">
+              <a:shade val="50000"/>
+            </a:schemeClr>
+          </a:lnRef>
+          <a:fillRef idx="1">
+            <a:schemeClr val="accent1"/>
+          </a:fillRef>
+          <a:effectRef idx="0">
+            <a:schemeClr val="accent1"/>
+          </a:effectRef>
+          <a:fontRef idx="minor">
+            <a:schemeClr val="lt1"/>
+          </a:fontRef>
+        </p:style>
+        <p:txBody>
+          <a:bodyPr rtlCol="0" anchor="ctr"/>
+          <a:lstStyle/>
+          <a:p>
+            <a:pPr algn="ctr"/>
+            <a:r>
+              <a:rPr lang="de-DE" dirty="0" smtClean="0"/>
+              <a:t>Schäden</a:t>
+            </a:r>
+            <a:endParaRPr lang="de-DE" dirty="0"/>
+          </a:p>
+        </p:txBody>
+      </p:sp>
+      <p:cxnSp>
+        <p:nvCxnSpPr>
+          <p:cNvPr id="11" name="Gerade Verbindung mit Pfeil 10"/>
+          <p:cNvCxnSpPr>
+            <a:stCxn id="4" idx="2"/>
+            <a:endCxn id="5" idx="0"/>
+          </p:cNvCxnSpPr>
+          <p:nvPr/>
+        </p:nvCxnSpPr>
+        <p:spPr>
+          <a:xfrm>
+            <a:off x="4343400" y="1653248"/>
+            <a:ext cx="0" cy="744496"/>
+          </a:xfrm>
+          <a:prstGeom prst="straightConnector1">
+            <a:avLst/>
+          </a:prstGeom>
+          <a:ln>
+            <a:solidFill>
+              <a:schemeClr val="accent1">
+                <a:alpha val="25000"/>
+              </a:schemeClr>
+            </a:solidFill>
+            <a:tailEnd type="triangle"/>
+          </a:ln>
+        </p:spPr>
+        <p:style>
+          <a:lnRef idx="3">
+            <a:schemeClr val="accent1"/>
+          </a:lnRef>
+          <a:fillRef idx="0">
+            <a:schemeClr val="accent1"/>
+          </a:fillRef>
+          <a:effectRef idx="2">
+            <a:schemeClr val="accent1"/>
+          </a:effectRef>
+          <a:fontRef idx="minor">
+            <a:schemeClr val="tx1"/>
+          </a:fontRef>
+        </p:style>
+      </p:cxnSp>
+      <p:cxnSp>
+        <p:nvCxnSpPr>
+          <p:cNvPr id="13" name="Gerade Verbindung mit Pfeil 12"/>
+          <p:cNvCxnSpPr/>
+          <p:nvPr/>
+        </p:nvCxnSpPr>
+        <p:spPr>
+          <a:xfrm>
+            <a:off x="4343400" y="3004214"/>
+            <a:ext cx="0" cy="744496"/>
+          </a:xfrm>
+          <a:prstGeom prst="straightConnector1">
+            <a:avLst/>
+          </a:prstGeom>
+          <a:ln>
+            <a:solidFill>
+              <a:schemeClr val="accent1">
+                <a:alpha val="25000"/>
+              </a:schemeClr>
+            </a:solidFill>
+            <a:tailEnd type="triangle"/>
+          </a:ln>
+        </p:spPr>
+        <p:style>
+          <a:lnRef idx="3">
+            <a:schemeClr val="accent1"/>
+          </a:lnRef>
+          <a:fillRef idx="0">
+            <a:schemeClr val="accent1"/>
+          </a:fillRef>
+          <a:effectRef idx="2">
+            <a:schemeClr val="accent1"/>
+          </a:effectRef>
+          <a:fontRef idx="minor">
+            <a:schemeClr val="tx1"/>
+          </a:fontRef>
+        </p:style>
+      </p:cxnSp>
+      <p:cxnSp>
+        <p:nvCxnSpPr>
+          <p:cNvPr id="14" name="Gerade Verbindung mit Pfeil 13"/>
+          <p:cNvCxnSpPr/>
+          <p:nvPr/>
+        </p:nvCxnSpPr>
+        <p:spPr>
+          <a:xfrm>
+            <a:off x="4333103" y="4361358"/>
+            <a:ext cx="0" cy="744496"/>
+          </a:xfrm>
+          <a:prstGeom prst="straightConnector1">
+            <a:avLst/>
+          </a:prstGeom>
+          <a:ln>
+            <a:solidFill>
+              <a:schemeClr val="accent1">
+                <a:alpha val="25000"/>
+              </a:schemeClr>
+            </a:solidFill>
+            <a:tailEnd type="triangle"/>
+          </a:ln>
+        </p:spPr>
+        <p:style>
+          <a:lnRef idx="3">
+            <a:schemeClr val="accent1"/>
+          </a:lnRef>
+          <a:fillRef idx="0">
+            <a:schemeClr val="accent1"/>
+          </a:fillRef>
+          <a:effectRef idx="2">
+            <a:schemeClr val="accent1"/>
+          </a:effectRef>
+          <a:fontRef idx="minor">
+            <a:schemeClr val="tx1"/>
+          </a:fontRef>
+        </p:style>
+      </p:cxnSp>
+    </p:spTree>
+    <p:extLst>
+      <p:ext uri="{BB962C8B-B14F-4D97-AF65-F5344CB8AC3E}">
+        <p14:creationId xmlns:p14="http://schemas.microsoft.com/office/powerpoint/2010/main" val="3681891956"/>
+      </p:ext>
+    </p:extLst>
+  </p:cSld>
+  <p:clrMapOvr>
+    <a:masterClrMapping/>
+  </p:clrMapOvr>
+  <p:timing>
+    <p:tnLst>
+      <p:par>
+        <p:cTn id="1" dur="indefinite" restart="never" nodeType="tmRoot"/>
+      </p:par>
+    </p:tnLst>
+  </p:timing>
+</p:sld>
+</file>
+
+<file path=ppt/slides/slide12.xml><?xml version="1.0" encoding="utf-8"?>
+<p:sld xmlns:a="http://schemas.openxmlformats.org/drawingml/2006/main" xmlns:r="http://schemas.openxmlformats.org/officeDocument/2006/relationships" xmlns:p="http://schemas.openxmlformats.org/presentationml/2006/main">
+  <p:cSld>
+    <p:spTree>
+      <p:nvGrpSpPr>
+        <p:cNvPr id="1" name=""/>
+        <p:cNvGrpSpPr/>
+        <p:nvPr/>
+      </p:nvGrpSpPr>
+      <p:grpSpPr>
+        <a:xfrm>
+          <a:off x="0" y="0"/>
+          <a:ext cx="0" cy="0"/>
+          <a:chOff x="0" y="0"/>
+          <a:chExt cx="0" cy="0"/>
+        </a:xfrm>
+      </p:grpSpPr>
+      <p:sp>
+        <p:nvSpPr>
+          <p:cNvPr id="2" name="Titel 1"/>
+          <p:cNvSpPr>
+            <a:spLocks noGrp="1"/>
+          </p:cNvSpPr>
+          <p:nvPr>
+            <p:ph type="title"/>
+          </p:nvPr>
+        </p:nvSpPr>
+        <p:spPr/>
+        <p:txBody>
+          <a:bodyPr/>
+          <a:lstStyle/>
+          <a:p>
+            <a:r>
+              <a:rPr lang="de-DE" dirty="0" smtClean="0"/>
+              <a:t>Prüfen der Lage und </a:t>
+            </a:r>
+            <a:r>
+              <a:rPr lang="de-DE" dirty="0" err="1" smtClean="0"/>
+              <a:t>Abmaße</a:t>
+            </a:r>
+            <a:endParaRPr lang="de-DE" dirty="0"/>
           </a:p>
         </p:txBody>
       </p:sp>
@@ -5935,123 +6339,147 @@
           <a:lstStyle/>
           <a:p>
             <a:r>
-              <a:rPr lang="en-US" dirty="0" err="1" smtClean="0"/>
-              <a:t>Maskieren</a:t>
-            </a:r>
-            <a:r>
-              <a:rPr lang="en-US" dirty="0" smtClean="0"/>
-              <a:t> des </a:t>
-            </a:r>
-            <a:r>
-              <a:rPr lang="en-US" dirty="0" err="1" smtClean="0"/>
-              <a:t>Werkstücks</a:t>
-            </a:r>
-            <a:endParaRPr lang="en-US" dirty="0" smtClean="0"/>
-          </a:p>
-          <a:p>
-            <a:r>
-              <a:rPr lang="en-US" dirty="0" err="1" smtClean="0"/>
-              <a:t>Filtern</a:t>
-            </a:r>
-            <a:endParaRPr lang="en-US" dirty="0" smtClean="0"/>
+              <a:rPr lang="de-DE" dirty="0" smtClean="0"/>
+              <a:t>Bildvorverarbeitung</a:t>
+            </a:r>
           </a:p>
           <a:p>
             <a:pPr lvl="1"/>
             <a:r>
-              <a:rPr lang="en-US" dirty="0" smtClean="0"/>
-              <a:t>Guided </a:t>
-            </a:r>
-            <a:r>
-              <a:rPr lang="en-US" dirty="0"/>
-              <a:t>I</a:t>
-            </a:r>
-            <a:r>
-              <a:rPr lang="en-US" dirty="0" smtClean="0"/>
-              <a:t>mage Filter</a:t>
-            </a:r>
-          </a:p>
-          <a:p>
-            <a:r>
-              <a:rPr lang="en-US" dirty="0" err="1" smtClean="0"/>
-              <a:t>Kantendetektion</a:t>
-            </a:r>
-            <a:r>
-              <a:rPr lang="en-US" dirty="0" smtClean="0"/>
-              <a:t> </a:t>
-            </a:r>
-            <a:r>
-              <a:rPr lang="en-US" dirty="0" err="1" smtClean="0"/>
-              <a:t>mit</a:t>
-            </a:r>
-            <a:r>
-              <a:rPr lang="en-US" dirty="0" smtClean="0"/>
-              <a:t> Canny</a:t>
-            </a:r>
-          </a:p>
-          <a:p>
-            <a:r>
-              <a:rPr lang="en-US" dirty="0" err="1" smtClean="0"/>
-              <a:t>Kanten</a:t>
-            </a:r>
-            <a:r>
-              <a:rPr lang="en-US" dirty="0" smtClean="0"/>
-              <a:t> und </a:t>
-            </a:r>
-            <a:r>
-              <a:rPr lang="en-US" dirty="0" err="1" smtClean="0"/>
-              <a:t>Bohrungen</a:t>
-            </a:r>
-            <a:r>
-              <a:rPr lang="en-US" dirty="0" smtClean="0"/>
-              <a:t> </a:t>
-            </a:r>
-            <a:r>
-              <a:rPr lang="en-US" dirty="0" err="1" smtClean="0"/>
-              <a:t>entfernen</a:t>
-            </a:r>
-            <a:endParaRPr lang="en-US" dirty="0" smtClean="0"/>
-          </a:p>
-          <a:p>
-            <a:r>
-              <a:rPr lang="en-US" dirty="0" smtClean="0"/>
-              <a:t>Cluster </a:t>
-            </a:r>
-            <a:r>
-              <a:rPr lang="en-US" dirty="0" err="1" smtClean="0"/>
-              <a:t>finden</a:t>
-            </a:r>
-            <a:endParaRPr lang="en-US" dirty="0" smtClean="0"/>
-          </a:p>
-          <a:p>
-            <a:r>
-              <a:rPr lang="en-US" dirty="0" err="1" smtClean="0"/>
-              <a:t>Zusätzlich</a:t>
-            </a:r>
-            <a:r>
-              <a:rPr lang="en-US" dirty="0" smtClean="0"/>
-              <a:t>: </a:t>
-            </a:r>
-            <a:r>
-              <a:rPr lang="en-US" dirty="0" err="1" smtClean="0"/>
-              <a:t>Überprüfung</a:t>
-            </a:r>
-            <a:r>
-              <a:rPr lang="en-US" dirty="0" smtClean="0"/>
-              <a:t> des </a:t>
-            </a:r>
-            <a:r>
-              <a:rPr lang="en-US" dirty="0" err="1" smtClean="0"/>
-              <a:t>Stegs</a:t>
-            </a:r>
-            <a:endParaRPr lang="en-US" dirty="0" smtClean="0"/>
+              <a:rPr lang="de-DE" dirty="0" smtClean="0"/>
+              <a:t>Entfernen der </a:t>
+            </a:r>
+            <a:r>
+              <a:rPr lang="de-DE" dirty="0" err="1" smtClean="0"/>
+              <a:t>spekularen</a:t>
+            </a:r>
+            <a:r>
+              <a:rPr lang="de-DE" dirty="0" smtClean="0"/>
+              <a:t> Kante </a:t>
+            </a:r>
+          </a:p>
+          <a:p>
+            <a:pPr lvl="2"/>
+            <a:r>
+              <a:rPr lang="de-DE" dirty="0" smtClean="0"/>
+              <a:t>Pixel mit </a:t>
+            </a:r>
+            <a:r>
+              <a:rPr lang="de-DE" dirty="0" err="1" smtClean="0"/>
+              <a:t>Grauwert</a:t>
+            </a:r>
+            <a:r>
+              <a:rPr lang="de-DE" dirty="0" smtClean="0"/>
+              <a:t> &gt; 200 werden auf 0 gesetzt</a:t>
+            </a:r>
           </a:p>
           <a:p>
             <a:pPr lvl="1"/>
             <a:r>
-              <a:rPr lang="en-US" dirty="0" smtClean="0"/>
-              <a:t>Threshold</a:t>
-            </a:r>
-            <a:endParaRPr lang="en-US" dirty="0"/>
+              <a:rPr lang="de-DE" dirty="0" smtClean="0"/>
+              <a:t>Maskieren der Werkstück </a:t>
+            </a:r>
+            <a:r>
+              <a:rPr lang="de-DE" dirty="0" err="1" smtClean="0"/>
+              <a:t>pixel</a:t>
+            </a:r>
+            <a:endParaRPr lang="de-DE" dirty="0" smtClean="0"/>
+          </a:p>
+          <a:p>
+            <a:pPr lvl="2"/>
+            <a:r>
+              <a:rPr lang="de-DE" dirty="0" smtClean="0"/>
+              <a:t>Pixel mit </a:t>
+            </a:r>
+            <a:r>
+              <a:rPr lang="de-DE" dirty="0" err="1" smtClean="0"/>
+              <a:t>Grauwert</a:t>
+            </a:r>
+            <a:r>
+              <a:rPr lang="de-DE" dirty="0" smtClean="0"/>
+              <a:t> &gt;= 70 werden auf 255 (weiß) gesetzt</a:t>
+            </a:r>
+          </a:p>
+          <a:p>
+            <a:pPr lvl="1"/>
+            <a:r>
+              <a:rPr lang="de-DE" dirty="0" smtClean="0"/>
+              <a:t>Reduktion von Noise</a:t>
+            </a:r>
+          </a:p>
+          <a:p>
+            <a:pPr lvl="2"/>
+            <a:r>
+              <a:rPr lang="de-DE" dirty="0" smtClean="0"/>
+              <a:t>Morphologische Erosion und </a:t>
+            </a:r>
+            <a:r>
+              <a:rPr lang="de-DE" dirty="0" err="1" smtClean="0"/>
+              <a:t>Dilitation</a:t>
+            </a:r>
+            <a:endParaRPr lang="de-DE" dirty="0" smtClean="0"/>
+          </a:p>
+          <a:p>
+            <a:pPr lvl="1"/>
+            <a:r>
+              <a:rPr lang="de-DE" dirty="0" err="1" smtClean="0"/>
+              <a:t>Kantendektion</a:t>
+            </a:r>
+            <a:r>
+              <a:rPr lang="de-DE" dirty="0" smtClean="0"/>
+              <a:t> mit </a:t>
+            </a:r>
+            <a:r>
+              <a:rPr lang="de-DE" dirty="0" err="1" smtClean="0"/>
+              <a:t>Canny</a:t>
+            </a:r>
+            <a:endParaRPr lang="de-DE" dirty="0" smtClean="0"/>
+          </a:p>
+          <a:p>
+            <a:pPr lvl="1"/>
+            <a:endParaRPr lang="de-DE" dirty="0" smtClean="0"/>
+          </a:p>
+          <a:p>
+            <a:r>
+              <a:rPr lang="de-DE" dirty="0" smtClean="0"/>
+              <a:t>Überprüfen der </a:t>
+            </a:r>
+            <a:r>
+              <a:rPr lang="de-DE" dirty="0" err="1" smtClean="0"/>
+              <a:t>Abmaße</a:t>
+            </a:r>
+            <a:r>
+              <a:rPr lang="de-DE" dirty="0" smtClean="0"/>
+              <a:t> und finden der Lage</a:t>
+            </a:r>
+          </a:p>
+          <a:p>
+            <a:pPr lvl="1"/>
+            <a:r>
+              <a:rPr lang="de-DE" dirty="0" smtClean="0"/>
+              <a:t>Annahme: Kontur, die den Flächeninhalt des kleinsten, vollständig umschließenden Rechtecks maximiert ist die Kontur des Werkstücks</a:t>
+            </a:r>
+          </a:p>
+          <a:p>
+            <a:pPr lvl="1"/>
+            <a:r>
+              <a:rPr lang="de-DE" dirty="0" smtClean="0"/>
+              <a:t>Überprüfe die Länge jeder Kante des umschließenden Rechtecks</a:t>
+            </a:r>
+          </a:p>
+          <a:p>
+            <a:pPr lvl="1"/>
+            <a:endParaRPr lang="de-DE" dirty="0" smtClean="0"/>
+          </a:p>
+          <a:p>
+            <a:pPr lvl="2"/>
+            <a:endParaRPr lang="de-DE" dirty="0" smtClean="0"/>
+          </a:p>
+          <a:p>
+            <a:pPr>
+              <a:buNone/>
+            </a:pPr>
+            <a:endParaRPr lang="de-DE" dirty="0" smtClean="0"/>
           </a:p>
         </p:txBody>
       </p:sp>
@@ -6070,7 +6498,1008 @@
 </p:sld>
 </file>
 
-<file path=ppt/slides/slide12.xml><?xml version="1.0" encoding="utf-8"?>
+<file path=ppt/slides/slide13.xml><?xml version="1.0" encoding="utf-8"?>
+<p:sld xmlns:a="http://schemas.openxmlformats.org/drawingml/2006/main" xmlns:r="http://schemas.openxmlformats.org/officeDocument/2006/relationships" xmlns:p="http://schemas.openxmlformats.org/presentationml/2006/main">
+  <p:cSld>
+    <p:spTree>
+      <p:nvGrpSpPr>
+        <p:cNvPr id="1" name=""/>
+        <p:cNvGrpSpPr/>
+        <p:nvPr/>
+      </p:nvGrpSpPr>
+      <p:grpSpPr>
+        <a:xfrm>
+          <a:off x="0" y="0"/>
+          <a:ext cx="0" cy="0"/>
+          <a:chOff x="0" y="0"/>
+          <a:chExt cx="0" cy="0"/>
+        </a:xfrm>
+      </p:grpSpPr>
+      <p:sp>
+        <p:nvSpPr>
+          <p:cNvPr id="2" name="Titel 1"/>
+          <p:cNvSpPr>
+            <a:spLocks noGrp="1"/>
+          </p:cNvSpPr>
+          <p:nvPr>
+            <p:ph type="title"/>
+          </p:nvPr>
+        </p:nvSpPr>
+        <p:spPr/>
+        <p:txBody>
+          <a:bodyPr/>
+          <a:lstStyle/>
+          <a:p>
+            <a:r>
+              <a:rPr lang="de-DE" dirty="0" smtClean="0"/>
+              <a:t>Programm-Ablauf</a:t>
+            </a:r>
+            <a:endParaRPr lang="de-DE" dirty="0"/>
+          </a:p>
+        </p:txBody>
+      </p:sp>
+      <p:sp>
+        <p:nvSpPr>
+          <p:cNvPr id="4" name="Flussdiagramm: Alternativer Prozess 3"/>
+          <p:cNvSpPr/>
+          <p:nvPr/>
+        </p:nvSpPr>
+        <p:spPr>
+          <a:xfrm>
+            <a:off x="2971800" y="1040600"/>
+            <a:ext cx="2743200" cy="612648"/>
+          </a:xfrm>
+          <a:prstGeom prst="flowChartAlternateProcess">
+            <a:avLst/>
+          </a:prstGeom>
+          <a:solidFill>
+            <a:schemeClr val="accent1">
+              <a:alpha val="25000"/>
+            </a:schemeClr>
+          </a:solidFill>
+          <a:ln>
+            <a:solidFill>
+              <a:schemeClr val="accent1">
+                <a:shade val="50000"/>
+                <a:alpha val="25000"/>
+              </a:schemeClr>
+            </a:solidFill>
+          </a:ln>
+        </p:spPr>
+        <p:style>
+          <a:lnRef idx="2">
+            <a:schemeClr val="accent1">
+              <a:shade val="50000"/>
+            </a:schemeClr>
+          </a:lnRef>
+          <a:fillRef idx="1">
+            <a:schemeClr val="accent1"/>
+          </a:fillRef>
+          <a:effectRef idx="0">
+            <a:schemeClr val="accent1"/>
+          </a:effectRef>
+          <a:fontRef idx="minor">
+            <a:schemeClr val="lt1"/>
+          </a:fontRef>
+        </p:style>
+        <p:txBody>
+          <a:bodyPr rtlCol="0" anchor="ctr"/>
+          <a:lstStyle/>
+          <a:p>
+            <a:pPr algn="ctr"/>
+            <a:r>
+              <a:rPr lang="de-DE" dirty="0" smtClean="0"/>
+              <a:t>Kalibrierung</a:t>
+            </a:r>
+            <a:endParaRPr lang="de-DE" dirty="0"/>
+          </a:p>
+        </p:txBody>
+      </p:sp>
+      <p:sp>
+        <p:nvSpPr>
+          <p:cNvPr id="5" name="Flussdiagramm: Alternativer Prozess 4"/>
+          <p:cNvSpPr/>
+          <p:nvPr/>
+        </p:nvSpPr>
+        <p:spPr>
+          <a:xfrm>
+            <a:off x="2971800" y="2397744"/>
+            <a:ext cx="2743200" cy="612648"/>
+          </a:xfrm>
+          <a:prstGeom prst="flowChartAlternateProcess">
+            <a:avLst/>
+          </a:prstGeom>
+          <a:solidFill>
+            <a:schemeClr val="accent1">
+              <a:alpha val="25000"/>
+            </a:schemeClr>
+          </a:solidFill>
+          <a:ln>
+            <a:solidFill>
+              <a:schemeClr val="accent1">
+                <a:alpha val="25000"/>
+              </a:schemeClr>
+            </a:solidFill>
+          </a:ln>
+        </p:spPr>
+        <p:style>
+          <a:lnRef idx="2">
+            <a:schemeClr val="accent1">
+              <a:shade val="50000"/>
+            </a:schemeClr>
+          </a:lnRef>
+          <a:fillRef idx="1">
+            <a:schemeClr val="accent1"/>
+          </a:fillRef>
+          <a:effectRef idx="0">
+            <a:schemeClr val="accent1"/>
+          </a:effectRef>
+          <a:fontRef idx="minor">
+            <a:schemeClr val="lt1"/>
+          </a:fontRef>
+        </p:style>
+        <p:txBody>
+          <a:bodyPr rtlCol="0" anchor="ctr"/>
+          <a:lstStyle/>
+          <a:p>
+            <a:pPr algn="ctr"/>
+            <a:r>
+              <a:rPr lang="de-DE" dirty="0"/>
+              <a:t>Lage und Maße</a:t>
+            </a:r>
+            <a:endParaRPr lang="de-DE" dirty="0"/>
+          </a:p>
+        </p:txBody>
+      </p:sp>
+      <p:sp>
+        <p:nvSpPr>
+          <p:cNvPr id="6" name="Flussdiagramm: Alternativer Prozess 5"/>
+          <p:cNvSpPr/>
+          <p:nvPr/>
+        </p:nvSpPr>
+        <p:spPr>
+          <a:xfrm>
+            <a:off x="2986216" y="3748710"/>
+            <a:ext cx="2743200" cy="612648"/>
+          </a:xfrm>
+          <a:prstGeom prst="flowChartAlternateProcess">
+            <a:avLst/>
+          </a:prstGeom>
+          <a:solidFill>
+            <a:schemeClr val="accent1"/>
+          </a:solidFill>
+          <a:ln>
+            <a:solidFill>
+              <a:schemeClr val="accent1"/>
+            </a:solidFill>
+          </a:ln>
+        </p:spPr>
+        <p:style>
+          <a:lnRef idx="2">
+            <a:schemeClr val="accent1">
+              <a:shade val="50000"/>
+            </a:schemeClr>
+          </a:lnRef>
+          <a:fillRef idx="1">
+            <a:schemeClr val="accent1"/>
+          </a:fillRef>
+          <a:effectRef idx="0">
+            <a:schemeClr val="accent1"/>
+          </a:effectRef>
+          <a:fontRef idx="minor">
+            <a:schemeClr val="lt1"/>
+          </a:fontRef>
+        </p:style>
+        <p:txBody>
+          <a:bodyPr rtlCol="0" anchor="ctr"/>
+          <a:lstStyle/>
+          <a:p>
+            <a:pPr algn="ctr"/>
+            <a:r>
+              <a:rPr lang="de-DE" dirty="0" smtClean="0"/>
+              <a:t>Bohrungen</a:t>
+            </a:r>
+            <a:endParaRPr lang="de-DE" dirty="0"/>
+          </a:p>
+        </p:txBody>
+      </p:sp>
+      <p:sp>
+        <p:nvSpPr>
+          <p:cNvPr id="7" name="Flussdiagramm: Alternativer Prozess 6"/>
+          <p:cNvSpPr/>
+          <p:nvPr/>
+        </p:nvSpPr>
+        <p:spPr>
+          <a:xfrm>
+            <a:off x="2971800" y="5105854"/>
+            <a:ext cx="2743200" cy="612648"/>
+          </a:xfrm>
+          <a:prstGeom prst="flowChartAlternateProcess">
+            <a:avLst/>
+          </a:prstGeom>
+          <a:solidFill>
+            <a:schemeClr val="accent1">
+              <a:alpha val="25000"/>
+            </a:schemeClr>
+          </a:solidFill>
+          <a:ln>
+            <a:solidFill>
+              <a:schemeClr val="accent1">
+                <a:alpha val="25000"/>
+              </a:schemeClr>
+            </a:solidFill>
+          </a:ln>
+        </p:spPr>
+        <p:style>
+          <a:lnRef idx="2">
+            <a:schemeClr val="accent1">
+              <a:shade val="50000"/>
+            </a:schemeClr>
+          </a:lnRef>
+          <a:fillRef idx="1">
+            <a:schemeClr val="accent1"/>
+          </a:fillRef>
+          <a:effectRef idx="0">
+            <a:schemeClr val="accent1"/>
+          </a:effectRef>
+          <a:fontRef idx="minor">
+            <a:schemeClr val="lt1"/>
+          </a:fontRef>
+        </p:style>
+        <p:txBody>
+          <a:bodyPr rtlCol="0" anchor="ctr"/>
+          <a:lstStyle/>
+          <a:p>
+            <a:pPr algn="ctr"/>
+            <a:r>
+              <a:rPr lang="de-DE" dirty="0" smtClean="0"/>
+              <a:t>Schäden</a:t>
+            </a:r>
+            <a:endParaRPr lang="de-DE" dirty="0"/>
+          </a:p>
+        </p:txBody>
+      </p:sp>
+      <p:cxnSp>
+        <p:nvCxnSpPr>
+          <p:cNvPr id="11" name="Gerade Verbindung mit Pfeil 10"/>
+          <p:cNvCxnSpPr>
+            <a:stCxn id="4" idx="2"/>
+            <a:endCxn id="5" idx="0"/>
+          </p:cNvCxnSpPr>
+          <p:nvPr/>
+        </p:nvCxnSpPr>
+        <p:spPr>
+          <a:xfrm>
+            <a:off x="4343400" y="1653248"/>
+            <a:ext cx="0" cy="744496"/>
+          </a:xfrm>
+          <a:prstGeom prst="straightConnector1">
+            <a:avLst/>
+          </a:prstGeom>
+          <a:ln>
+            <a:solidFill>
+              <a:schemeClr val="accent1">
+                <a:alpha val="25000"/>
+              </a:schemeClr>
+            </a:solidFill>
+            <a:tailEnd type="triangle"/>
+          </a:ln>
+        </p:spPr>
+        <p:style>
+          <a:lnRef idx="3">
+            <a:schemeClr val="accent1"/>
+          </a:lnRef>
+          <a:fillRef idx="0">
+            <a:schemeClr val="accent1"/>
+          </a:fillRef>
+          <a:effectRef idx="2">
+            <a:schemeClr val="accent1"/>
+          </a:effectRef>
+          <a:fontRef idx="minor">
+            <a:schemeClr val="tx1"/>
+          </a:fontRef>
+        </p:style>
+      </p:cxnSp>
+      <p:cxnSp>
+        <p:nvCxnSpPr>
+          <p:cNvPr id="13" name="Gerade Verbindung mit Pfeil 12"/>
+          <p:cNvCxnSpPr/>
+          <p:nvPr/>
+        </p:nvCxnSpPr>
+        <p:spPr>
+          <a:xfrm>
+            <a:off x="4343400" y="3004214"/>
+            <a:ext cx="0" cy="744496"/>
+          </a:xfrm>
+          <a:prstGeom prst="straightConnector1">
+            <a:avLst/>
+          </a:prstGeom>
+          <a:ln>
+            <a:solidFill>
+              <a:schemeClr val="accent1">
+                <a:alpha val="25000"/>
+              </a:schemeClr>
+            </a:solidFill>
+            <a:tailEnd type="triangle"/>
+          </a:ln>
+        </p:spPr>
+        <p:style>
+          <a:lnRef idx="3">
+            <a:schemeClr val="accent1"/>
+          </a:lnRef>
+          <a:fillRef idx="0">
+            <a:schemeClr val="accent1"/>
+          </a:fillRef>
+          <a:effectRef idx="2">
+            <a:schemeClr val="accent1"/>
+          </a:effectRef>
+          <a:fontRef idx="minor">
+            <a:schemeClr val="tx1"/>
+          </a:fontRef>
+        </p:style>
+      </p:cxnSp>
+      <p:cxnSp>
+        <p:nvCxnSpPr>
+          <p:cNvPr id="14" name="Gerade Verbindung mit Pfeil 13"/>
+          <p:cNvCxnSpPr/>
+          <p:nvPr/>
+        </p:nvCxnSpPr>
+        <p:spPr>
+          <a:xfrm>
+            <a:off x="4333103" y="4361358"/>
+            <a:ext cx="0" cy="744496"/>
+          </a:xfrm>
+          <a:prstGeom prst="straightConnector1">
+            <a:avLst/>
+          </a:prstGeom>
+          <a:ln>
+            <a:solidFill>
+              <a:schemeClr val="accent1">
+                <a:alpha val="25000"/>
+              </a:schemeClr>
+            </a:solidFill>
+            <a:tailEnd type="triangle"/>
+          </a:ln>
+        </p:spPr>
+        <p:style>
+          <a:lnRef idx="3">
+            <a:schemeClr val="accent1"/>
+          </a:lnRef>
+          <a:fillRef idx="0">
+            <a:schemeClr val="accent1"/>
+          </a:fillRef>
+          <a:effectRef idx="2">
+            <a:schemeClr val="accent1"/>
+          </a:effectRef>
+          <a:fontRef idx="minor">
+            <a:schemeClr val="tx1"/>
+          </a:fontRef>
+        </p:style>
+      </p:cxnSp>
+    </p:spTree>
+    <p:extLst>
+      <p:ext uri="{BB962C8B-B14F-4D97-AF65-F5344CB8AC3E}">
+        <p14:creationId xmlns:p14="http://schemas.microsoft.com/office/powerpoint/2010/main" val="689969953"/>
+      </p:ext>
+    </p:extLst>
+  </p:cSld>
+  <p:clrMapOvr>
+    <a:masterClrMapping/>
+  </p:clrMapOvr>
+  <p:timing>
+    <p:tnLst>
+      <p:par>
+        <p:cTn id="1" dur="indefinite" restart="never" nodeType="tmRoot"/>
+      </p:par>
+    </p:tnLst>
+  </p:timing>
+</p:sld>
+</file>
+
+<file path=ppt/slides/slide14.xml><?xml version="1.0" encoding="utf-8"?>
+<p:sld xmlns:a="http://schemas.openxmlformats.org/drawingml/2006/main" xmlns:r="http://schemas.openxmlformats.org/officeDocument/2006/relationships" xmlns:p="http://schemas.openxmlformats.org/presentationml/2006/main">
+  <p:cSld>
+    <p:spTree>
+      <p:nvGrpSpPr>
+        <p:cNvPr id="1" name=""/>
+        <p:cNvGrpSpPr/>
+        <p:nvPr/>
+      </p:nvGrpSpPr>
+      <p:grpSpPr>
+        <a:xfrm>
+          <a:off x="0" y="0"/>
+          <a:ext cx="0" cy="0"/>
+          <a:chOff x="0" y="0"/>
+          <a:chExt cx="0" cy="0"/>
+        </a:xfrm>
+      </p:grpSpPr>
+      <p:sp>
+        <p:nvSpPr>
+          <p:cNvPr id="2" name="Titel 1"/>
+          <p:cNvSpPr>
+            <a:spLocks noGrp="1"/>
+          </p:cNvSpPr>
+          <p:nvPr>
+            <p:ph type="title"/>
+          </p:nvPr>
+        </p:nvSpPr>
+        <p:spPr/>
+        <p:txBody>
+          <a:bodyPr/>
+          <a:lstStyle/>
+          <a:p>
+            <a:r>
+              <a:rPr lang="de-DE" dirty="0" smtClean="0"/>
+              <a:t>Prüfen der Bohrungen</a:t>
+            </a:r>
+            <a:endParaRPr lang="de-DE" dirty="0"/>
+          </a:p>
+        </p:txBody>
+      </p:sp>
+      <p:sp>
+        <p:nvSpPr>
+          <p:cNvPr id="3" name="Inhaltsplatzhalter 2"/>
+          <p:cNvSpPr>
+            <a:spLocks noGrp="1"/>
+          </p:cNvSpPr>
+          <p:nvPr>
+            <p:ph idx="1"/>
+          </p:nvPr>
+        </p:nvSpPr>
+        <p:spPr/>
+        <p:txBody>
+          <a:bodyPr/>
+          <a:lstStyle/>
+          <a:p>
+            <a:endParaRPr lang="de-DE" dirty="0"/>
+          </a:p>
+        </p:txBody>
+      </p:sp>
+    </p:spTree>
+  </p:cSld>
+  <p:clrMapOvr>
+    <a:masterClrMapping/>
+  </p:clrMapOvr>
+  <p:timing>
+    <p:tnLst>
+      <p:par>
+        <p:cTn id="1" dur="indefinite" restart="never" nodeType="tmRoot"/>
+      </p:par>
+    </p:tnLst>
+  </p:timing>
+</p:sld>
+</file>
+
+<file path=ppt/slides/slide15.xml><?xml version="1.0" encoding="utf-8"?>
+<p:sld xmlns:a="http://schemas.openxmlformats.org/drawingml/2006/main" xmlns:r="http://schemas.openxmlformats.org/officeDocument/2006/relationships" xmlns:p="http://schemas.openxmlformats.org/presentationml/2006/main">
+  <p:cSld>
+    <p:spTree>
+      <p:nvGrpSpPr>
+        <p:cNvPr id="1" name=""/>
+        <p:cNvGrpSpPr/>
+        <p:nvPr/>
+      </p:nvGrpSpPr>
+      <p:grpSpPr>
+        <a:xfrm>
+          <a:off x="0" y="0"/>
+          <a:ext cx="0" cy="0"/>
+          <a:chOff x="0" y="0"/>
+          <a:chExt cx="0" cy="0"/>
+        </a:xfrm>
+      </p:grpSpPr>
+      <p:sp>
+        <p:nvSpPr>
+          <p:cNvPr id="2" name="Titel 1"/>
+          <p:cNvSpPr>
+            <a:spLocks noGrp="1"/>
+          </p:cNvSpPr>
+          <p:nvPr>
+            <p:ph type="title"/>
+          </p:nvPr>
+        </p:nvSpPr>
+        <p:spPr/>
+        <p:txBody>
+          <a:bodyPr/>
+          <a:lstStyle/>
+          <a:p>
+            <a:r>
+              <a:rPr lang="de-DE" dirty="0" smtClean="0"/>
+              <a:t>Programm-Ablauf</a:t>
+            </a:r>
+            <a:endParaRPr lang="de-DE" dirty="0"/>
+          </a:p>
+        </p:txBody>
+      </p:sp>
+      <p:sp>
+        <p:nvSpPr>
+          <p:cNvPr id="4" name="Flussdiagramm: Alternativer Prozess 3"/>
+          <p:cNvSpPr/>
+          <p:nvPr/>
+        </p:nvSpPr>
+        <p:spPr>
+          <a:xfrm>
+            <a:off x="2971800" y="1040600"/>
+            <a:ext cx="2743200" cy="612648"/>
+          </a:xfrm>
+          <a:prstGeom prst="flowChartAlternateProcess">
+            <a:avLst/>
+          </a:prstGeom>
+          <a:solidFill>
+            <a:schemeClr val="accent1">
+              <a:alpha val="25000"/>
+            </a:schemeClr>
+          </a:solidFill>
+          <a:ln>
+            <a:solidFill>
+              <a:schemeClr val="accent1">
+                <a:shade val="50000"/>
+                <a:alpha val="25000"/>
+              </a:schemeClr>
+            </a:solidFill>
+          </a:ln>
+        </p:spPr>
+        <p:style>
+          <a:lnRef idx="2">
+            <a:schemeClr val="accent1">
+              <a:shade val="50000"/>
+            </a:schemeClr>
+          </a:lnRef>
+          <a:fillRef idx="1">
+            <a:schemeClr val="accent1"/>
+          </a:fillRef>
+          <a:effectRef idx="0">
+            <a:schemeClr val="accent1"/>
+          </a:effectRef>
+          <a:fontRef idx="minor">
+            <a:schemeClr val="lt1"/>
+          </a:fontRef>
+        </p:style>
+        <p:txBody>
+          <a:bodyPr rtlCol="0" anchor="ctr"/>
+          <a:lstStyle/>
+          <a:p>
+            <a:pPr algn="ctr"/>
+            <a:r>
+              <a:rPr lang="de-DE" dirty="0" smtClean="0"/>
+              <a:t>Kalibrierung</a:t>
+            </a:r>
+            <a:endParaRPr lang="de-DE" dirty="0"/>
+          </a:p>
+        </p:txBody>
+      </p:sp>
+      <p:sp>
+        <p:nvSpPr>
+          <p:cNvPr id="5" name="Flussdiagramm: Alternativer Prozess 4"/>
+          <p:cNvSpPr/>
+          <p:nvPr/>
+        </p:nvSpPr>
+        <p:spPr>
+          <a:xfrm>
+            <a:off x="2971800" y="2397744"/>
+            <a:ext cx="2743200" cy="612648"/>
+          </a:xfrm>
+          <a:prstGeom prst="flowChartAlternateProcess">
+            <a:avLst/>
+          </a:prstGeom>
+          <a:solidFill>
+            <a:schemeClr val="accent1">
+              <a:alpha val="25000"/>
+            </a:schemeClr>
+          </a:solidFill>
+          <a:ln>
+            <a:solidFill>
+              <a:schemeClr val="accent1">
+                <a:alpha val="25000"/>
+              </a:schemeClr>
+            </a:solidFill>
+          </a:ln>
+        </p:spPr>
+        <p:style>
+          <a:lnRef idx="2">
+            <a:schemeClr val="accent1">
+              <a:shade val="50000"/>
+            </a:schemeClr>
+          </a:lnRef>
+          <a:fillRef idx="1">
+            <a:schemeClr val="accent1"/>
+          </a:fillRef>
+          <a:effectRef idx="0">
+            <a:schemeClr val="accent1"/>
+          </a:effectRef>
+          <a:fontRef idx="minor">
+            <a:schemeClr val="lt1"/>
+          </a:fontRef>
+        </p:style>
+        <p:txBody>
+          <a:bodyPr rtlCol="0" anchor="ctr"/>
+          <a:lstStyle/>
+          <a:p>
+            <a:pPr algn="ctr"/>
+            <a:r>
+              <a:rPr lang="de-DE" dirty="0"/>
+              <a:t>Lage und Maße</a:t>
+            </a:r>
+            <a:endParaRPr lang="de-DE" dirty="0"/>
+          </a:p>
+        </p:txBody>
+      </p:sp>
+      <p:sp>
+        <p:nvSpPr>
+          <p:cNvPr id="6" name="Flussdiagramm: Alternativer Prozess 5"/>
+          <p:cNvSpPr/>
+          <p:nvPr/>
+        </p:nvSpPr>
+        <p:spPr>
+          <a:xfrm>
+            <a:off x="2986216" y="3748710"/>
+            <a:ext cx="2743200" cy="612648"/>
+          </a:xfrm>
+          <a:prstGeom prst="flowChartAlternateProcess">
+            <a:avLst/>
+          </a:prstGeom>
+          <a:solidFill>
+            <a:schemeClr val="accent1">
+              <a:alpha val="25000"/>
+            </a:schemeClr>
+          </a:solidFill>
+          <a:ln>
+            <a:solidFill>
+              <a:schemeClr val="accent1">
+                <a:alpha val="25000"/>
+              </a:schemeClr>
+            </a:solidFill>
+          </a:ln>
+        </p:spPr>
+        <p:style>
+          <a:lnRef idx="2">
+            <a:schemeClr val="accent1">
+              <a:shade val="50000"/>
+            </a:schemeClr>
+          </a:lnRef>
+          <a:fillRef idx="1">
+            <a:schemeClr val="accent1"/>
+          </a:fillRef>
+          <a:effectRef idx="0">
+            <a:schemeClr val="accent1"/>
+          </a:effectRef>
+          <a:fontRef idx="minor">
+            <a:schemeClr val="lt1"/>
+          </a:fontRef>
+        </p:style>
+        <p:txBody>
+          <a:bodyPr rtlCol="0" anchor="ctr"/>
+          <a:lstStyle/>
+          <a:p>
+            <a:pPr algn="ctr"/>
+            <a:r>
+              <a:rPr lang="de-DE" dirty="0" smtClean="0"/>
+              <a:t>Bohrungen</a:t>
+            </a:r>
+            <a:endParaRPr lang="de-DE" dirty="0"/>
+          </a:p>
+        </p:txBody>
+      </p:sp>
+      <p:sp>
+        <p:nvSpPr>
+          <p:cNvPr id="7" name="Flussdiagramm: Alternativer Prozess 6"/>
+          <p:cNvSpPr/>
+          <p:nvPr/>
+        </p:nvSpPr>
+        <p:spPr>
+          <a:xfrm>
+            <a:off x="2971800" y="5105854"/>
+            <a:ext cx="2743200" cy="612648"/>
+          </a:xfrm>
+          <a:prstGeom prst="flowChartAlternateProcess">
+            <a:avLst/>
+          </a:prstGeom>
+          <a:solidFill>
+            <a:schemeClr val="accent1"/>
+          </a:solidFill>
+          <a:ln>
+            <a:solidFill>
+              <a:schemeClr val="accent1"/>
+            </a:solidFill>
+          </a:ln>
+        </p:spPr>
+        <p:style>
+          <a:lnRef idx="2">
+            <a:schemeClr val="accent1">
+              <a:shade val="50000"/>
+            </a:schemeClr>
+          </a:lnRef>
+          <a:fillRef idx="1">
+            <a:schemeClr val="accent1"/>
+          </a:fillRef>
+          <a:effectRef idx="0">
+            <a:schemeClr val="accent1"/>
+          </a:effectRef>
+          <a:fontRef idx="minor">
+            <a:schemeClr val="lt1"/>
+          </a:fontRef>
+        </p:style>
+        <p:txBody>
+          <a:bodyPr rtlCol="0" anchor="ctr"/>
+          <a:lstStyle/>
+          <a:p>
+            <a:pPr algn="ctr"/>
+            <a:r>
+              <a:rPr lang="de-DE" dirty="0" smtClean="0"/>
+              <a:t>Schäden</a:t>
+            </a:r>
+            <a:endParaRPr lang="de-DE" dirty="0"/>
+          </a:p>
+        </p:txBody>
+      </p:sp>
+      <p:cxnSp>
+        <p:nvCxnSpPr>
+          <p:cNvPr id="11" name="Gerade Verbindung mit Pfeil 10"/>
+          <p:cNvCxnSpPr>
+            <a:stCxn id="4" idx="2"/>
+            <a:endCxn id="5" idx="0"/>
+          </p:cNvCxnSpPr>
+          <p:nvPr/>
+        </p:nvCxnSpPr>
+        <p:spPr>
+          <a:xfrm>
+            <a:off x="4343400" y="1653248"/>
+            <a:ext cx="0" cy="744496"/>
+          </a:xfrm>
+          <a:prstGeom prst="straightConnector1">
+            <a:avLst/>
+          </a:prstGeom>
+          <a:ln>
+            <a:solidFill>
+              <a:schemeClr val="accent1">
+                <a:alpha val="25000"/>
+              </a:schemeClr>
+            </a:solidFill>
+            <a:tailEnd type="triangle"/>
+          </a:ln>
+        </p:spPr>
+        <p:style>
+          <a:lnRef idx="3">
+            <a:schemeClr val="accent1"/>
+          </a:lnRef>
+          <a:fillRef idx="0">
+            <a:schemeClr val="accent1"/>
+          </a:fillRef>
+          <a:effectRef idx="2">
+            <a:schemeClr val="accent1"/>
+          </a:effectRef>
+          <a:fontRef idx="minor">
+            <a:schemeClr val="tx1"/>
+          </a:fontRef>
+        </p:style>
+      </p:cxnSp>
+      <p:cxnSp>
+        <p:nvCxnSpPr>
+          <p:cNvPr id="13" name="Gerade Verbindung mit Pfeil 12"/>
+          <p:cNvCxnSpPr/>
+          <p:nvPr/>
+        </p:nvCxnSpPr>
+        <p:spPr>
+          <a:xfrm>
+            <a:off x="4343400" y="3004214"/>
+            <a:ext cx="0" cy="744496"/>
+          </a:xfrm>
+          <a:prstGeom prst="straightConnector1">
+            <a:avLst/>
+          </a:prstGeom>
+          <a:ln>
+            <a:solidFill>
+              <a:schemeClr val="accent1">
+                <a:alpha val="25000"/>
+              </a:schemeClr>
+            </a:solidFill>
+            <a:tailEnd type="triangle"/>
+          </a:ln>
+        </p:spPr>
+        <p:style>
+          <a:lnRef idx="3">
+            <a:schemeClr val="accent1"/>
+          </a:lnRef>
+          <a:fillRef idx="0">
+            <a:schemeClr val="accent1"/>
+          </a:fillRef>
+          <a:effectRef idx="2">
+            <a:schemeClr val="accent1"/>
+          </a:effectRef>
+          <a:fontRef idx="minor">
+            <a:schemeClr val="tx1"/>
+          </a:fontRef>
+        </p:style>
+      </p:cxnSp>
+      <p:cxnSp>
+        <p:nvCxnSpPr>
+          <p:cNvPr id="14" name="Gerade Verbindung mit Pfeil 13"/>
+          <p:cNvCxnSpPr/>
+          <p:nvPr/>
+        </p:nvCxnSpPr>
+        <p:spPr>
+          <a:xfrm>
+            <a:off x="4333103" y="4361358"/>
+            <a:ext cx="0" cy="744496"/>
+          </a:xfrm>
+          <a:prstGeom prst="straightConnector1">
+            <a:avLst/>
+          </a:prstGeom>
+          <a:ln>
+            <a:solidFill>
+              <a:schemeClr val="accent1">
+                <a:alpha val="25000"/>
+              </a:schemeClr>
+            </a:solidFill>
+            <a:tailEnd type="triangle"/>
+          </a:ln>
+        </p:spPr>
+        <p:style>
+          <a:lnRef idx="3">
+            <a:schemeClr val="accent1"/>
+          </a:lnRef>
+          <a:fillRef idx="0">
+            <a:schemeClr val="accent1"/>
+          </a:fillRef>
+          <a:effectRef idx="2">
+            <a:schemeClr val="accent1"/>
+          </a:effectRef>
+          <a:fontRef idx="minor">
+            <a:schemeClr val="tx1"/>
+          </a:fontRef>
+        </p:style>
+      </p:cxnSp>
+    </p:spTree>
+    <p:extLst>
+      <p:ext uri="{BB962C8B-B14F-4D97-AF65-F5344CB8AC3E}">
+        <p14:creationId xmlns:p14="http://schemas.microsoft.com/office/powerpoint/2010/main" val="1212497302"/>
+      </p:ext>
+    </p:extLst>
+  </p:cSld>
+  <p:clrMapOvr>
+    <a:masterClrMapping/>
+  </p:clrMapOvr>
+  <p:timing>
+    <p:tnLst>
+      <p:par>
+        <p:cTn id="1" dur="indefinite" restart="never" nodeType="tmRoot"/>
+      </p:par>
+    </p:tnLst>
+  </p:timing>
+</p:sld>
+</file>
+
+<file path=ppt/slides/slide16.xml><?xml version="1.0" encoding="utf-8"?>
+<p:sld xmlns:a="http://schemas.openxmlformats.org/drawingml/2006/main" xmlns:r="http://schemas.openxmlformats.org/officeDocument/2006/relationships" xmlns:p="http://schemas.openxmlformats.org/presentationml/2006/main">
+  <p:cSld>
+    <p:spTree>
+      <p:nvGrpSpPr>
+        <p:cNvPr id="1" name=""/>
+        <p:cNvGrpSpPr/>
+        <p:nvPr/>
+      </p:nvGrpSpPr>
+      <p:grpSpPr>
+        <a:xfrm>
+          <a:off x="0" y="0"/>
+          <a:ext cx="0" cy="0"/>
+          <a:chOff x="0" y="0"/>
+          <a:chExt cx="0" cy="0"/>
+        </a:xfrm>
+      </p:grpSpPr>
+      <p:sp>
+        <p:nvSpPr>
+          <p:cNvPr id="2" name="Titel 1"/>
+          <p:cNvSpPr>
+            <a:spLocks noGrp="1"/>
+          </p:cNvSpPr>
+          <p:nvPr>
+            <p:ph type="title"/>
+          </p:nvPr>
+        </p:nvSpPr>
+        <p:spPr/>
+        <p:txBody>
+          <a:bodyPr/>
+          <a:lstStyle/>
+          <a:p>
+            <a:r>
+              <a:rPr lang="de-DE" dirty="0" smtClean="0"/>
+              <a:t>Prüfen auf Beschädigungen</a:t>
+            </a:r>
+            <a:endParaRPr lang="de-DE" dirty="0"/>
+          </a:p>
+        </p:txBody>
+      </p:sp>
+      <p:sp>
+        <p:nvSpPr>
+          <p:cNvPr id="3" name="Inhaltsplatzhalter 2"/>
+          <p:cNvSpPr>
+            <a:spLocks noGrp="1"/>
+          </p:cNvSpPr>
+          <p:nvPr>
+            <p:ph idx="1"/>
+          </p:nvPr>
+        </p:nvSpPr>
+        <p:spPr/>
+        <p:txBody>
+          <a:bodyPr/>
+          <a:lstStyle/>
+          <a:p>
+            <a:r>
+              <a:rPr lang="de-DE" dirty="0" smtClean="0"/>
+              <a:t>Maskieren des Werkstücks</a:t>
+            </a:r>
+          </a:p>
+          <a:p>
+            <a:r>
+              <a:rPr lang="de-DE" dirty="0" smtClean="0"/>
+              <a:t>Filtern</a:t>
+            </a:r>
+          </a:p>
+          <a:p>
+            <a:pPr lvl="1"/>
+            <a:r>
+              <a:rPr lang="de-DE" dirty="0" err="1" smtClean="0"/>
+              <a:t>Guided</a:t>
+            </a:r>
+            <a:r>
+              <a:rPr lang="de-DE" dirty="0" smtClean="0"/>
+              <a:t> Image Filter</a:t>
+            </a:r>
+          </a:p>
+          <a:p>
+            <a:r>
+              <a:rPr lang="de-DE" dirty="0" smtClean="0"/>
+              <a:t>Kantendetektion mit </a:t>
+            </a:r>
+            <a:r>
+              <a:rPr lang="de-DE" dirty="0" err="1" smtClean="0"/>
+              <a:t>Canny</a:t>
+            </a:r>
+            <a:endParaRPr lang="de-DE" dirty="0" smtClean="0"/>
+          </a:p>
+          <a:p>
+            <a:r>
+              <a:rPr lang="de-DE" dirty="0" smtClean="0"/>
+              <a:t>Kanten und Bohrungen entfernen</a:t>
+            </a:r>
+          </a:p>
+          <a:p>
+            <a:r>
+              <a:rPr lang="de-DE" dirty="0" smtClean="0"/>
+              <a:t>Cluster finden</a:t>
+            </a:r>
+          </a:p>
+          <a:p>
+            <a:r>
+              <a:rPr lang="de-DE" dirty="0" smtClean="0"/>
+              <a:t>Zusätzlich: Überprüfung des Stegs</a:t>
+            </a:r>
+          </a:p>
+          <a:p>
+            <a:pPr lvl="1"/>
+            <a:r>
+              <a:rPr lang="de-DE" dirty="0" err="1" smtClean="0"/>
+              <a:t>Threshold</a:t>
+            </a:r>
+            <a:endParaRPr lang="de-DE" dirty="0"/>
+          </a:p>
+        </p:txBody>
+      </p:sp>
+    </p:spTree>
+  </p:cSld>
+  <p:clrMapOvr>
+    <a:masterClrMapping/>
+  </p:clrMapOvr>
+  <p:timing>
+    <p:tnLst>
+      <p:par>
+        <p:cTn id="1" dur="indefinite" restart="never" nodeType="tmRoot"/>
+      </p:par>
+    </p:tnLst>
+  </p:timing>
+</p:sld>
+</file>
+
+<file path=ppt/slides/slide17.xml><?xml version="1.0" encoding="utf-8"?>
 <p:sld xmlns:a="http://schemas.openxmlformats.org/drawingml/2006/main" xmlns:r="http://schemas.openxmlformats.org/officeDocument/2006/relationships" xmlns:p="http://schemas.openxmlformats.org/presentationml/2006/main">
   <p:cSld>
     <p:spTree>
@@ -6191,84 +7620,51 @@
           <a:lstStyle/>
           <a:p>
             <a:r>
-              <a:rPr lang="en-US" sz="2400" dirty="0" err="1" smtClean="0"/>
-              <a:t>Werkstück</a:t>
-            </a:r>
-            <a:r>
-              <a:rPr lang="en-US" sz="2400" dirty="0" smtClean="0"/>
-              <a:t> &amp; </a:t>
-            </a:r>
-            <a:r>
-              <a:rPr lang="en-US" sz="2400" dirty="0" err="1" smtClean="0"/>
-              <a:t>Prüfaufgaben</a:t>
-            </a:r>
-            <a:endParaRPr lang="en-US" sz="2400" dirty="0" smtClean="0"/>
-          </a:p>
-          <a:p>
-            <a:r>
-              <a:rPr lang="en-US" sz="2400" dirty="0" err="1" smtClean="0"/>
+              <a:rPr lang="de-DE" sz="2400" dirty="0" smtClean="0"/>
+              <a:t>Werkstück &amp; Prüfaufgaben</a:t>
+            </a:r>
+          </a:p>
+          <a:p>
+            <a:r>
+              <a:rPr lang="de-DE" sz="2400" dirty="0" smtClean="0"/>
               <a:t>Aufbau</a:t>
             </a:r>
-            <a:endParaRPr lang="en-US" sz="2400" dirty="0" smtClean="0"/>
-          </a:p>
-          <a:p>
-            <a:r>
-              <a:rPr lang="en-US" sz="2400" dirty="0" err="1" smtClean="0"/>
-              <a:t>Verwendete</a:t>
-            </a:r>
-            <a:r>
-              <a:rPr lang="en-US" sz="2400" dirty="0" smtClean="0"/>
-              <a:t> Software</a:t>
-            </a:r>
-          </a:p>
-          <a:p>
-            <a:r>
-              <a:rPr lang="en-US" sz="2400" dirty="0" err="1" smtClean="0"/>
-              <a:t>Unterschied</a:t>
-            </a:r>
-            <a:r>
-              <a:rPr lang="en-US" sz="2400" dirty="0" smtClean="0"/>
-              <a:t> </a:t>
-            </a:r>
-            <a:r>
-              <a:rPr lang="en-US" sz="2400" dirty="0" err="1" smtClean="0"/>
-              <a:t>Modell</a:t>
-            </a:r>
-            <a:r>
-              <a:rPr lang="en-US" sz="2400" dirty="0" smtClean="0"/>
-              <a:t> &amp; </a:t>
-            </a:r>
-            <a:r>
-              <a:rPr lang="en-US" sz="2400" dirty="0" err="1" smtClean="0"/>
-              <a:t>Aufnahme</a:t>
-            </a:r>
-            <a:endParaRPr lang="en-US" sz="2400" dirty="0" smtClean="0"/>
-          </a:p>
-          <a:p>
-            <a:r>
-              <a:rPr lang="en-US" sz="2400" dirty="0" err="1" smtClean="0"/>
+          </a:p>
+          <a:p>
+            <a:r>
+              <a:rPr lang="de-DE" sz="2400" dirty="0" smtClean="0"/>
+              <a:t>Verwendete Software</a:t>
+            </a:r>
+          </a:p>
+          <a:p>
+            <a:r>
+              <a:rPr lang="de-DE" sz="2400" dirty="0" smtClean="0"/>
+              <a:t>Unterschied Modell &amp; Aufnahme</a:t>
+            </a:r>
+          </a:p>
+          <a:p>
+            <a:r>
+              <a:rPr lang="de-DE" sz="2400" dirty="0" smtClean="0"/>
               <a:t>Vorgehensweise</a:t>
             </a:r>
-            <a:endParaRPr lang="en-US" sz="2400" dirty="0" smtClean="0"/>
-          </a:p>
-          <a:p>
-            <a:r>
-              <a:rPr lang="en-US" sz="2400" dirty="0" err="1" smtClean="0"/>
+          </a:p>
+          <a:p>
+            <a:r>
+              <a:rPr lang="de-DE" sz="2400" dirty="0" smtClean="0"/>
               <a:t>Vorführung</a:t>
             </a:r>
-            <a:endParaRPr lang="en-US" sz="2400" dirty="0" smtClean="0"/>
           </a:p>
           <a:p>
             <a:pPr>
               <a:buNone/>
             </a:pPr>
-            <a:endParaRPr lang="en-US" sz="2400" dirty="0" smtClean="0"/>
+            <a:endParaRPr lang="de-DE" sz="2400" dirty="0" smtClean="0"/>
           </a:p>
           <a:p>
             <a:pPr>
               <a:buNone/>
             </a:pPr>
-            <a:endParaRPr lang="en-US" sz="2400" dirty="0"/>
+            <a:endParaRPr lang="de-DE" sz="2400" dirty="0"/>
           </a:p>
         </p:txBody>
       </p:sp>
@@ -6320,18 +7716,10 @@
           <a:lstStyle/>
           <a:p>
             <a:r>
-              <a:rPr lang="en-US" dirty="0" err="1" smtClean="0"/>
-              <a:t>Werkstück</a:t>
-            </a:r>
-            <a:r>
-              <a:rPr lang="en-US" dirty="0" smtClean="0"/>
-              <a:t> &amp; </a:t>
-            </a:r>
-            <a:r>
-              <a:rPr lang="en-US" dirty="0" err="1" smtClean="0"/>
-              <a:t>Prüfaufgaben</a:t>
-            </a:r>
-            <a:endParaRPr lang="en-US" dirty="0"/>
+              <a:rPr lang="de-DE" dirty="0" smtClean="0"/>
+              <a:t>Werkstück &amp; Prüfaufgaben</a:t>
+            </a:r>
+            <a:endParaRPr lang="de-DE" dirty="0"/>
           </a:p>
         </p:txBody>
       </p:sp>
@@ -6351,175 +7739,78 @@
           <a:lstStyle/>
           <a:p>
             <a:r>
-              <a:rPr lang="en-US" dirty="0" err="1" smtClean="0"/>
-              <a:t>Maße</a:t>
-            </a:r>
-            <a:r>
-              <a:rPr lang="en-US" dirty="0" smtClean="0"/>
-              <a:t> 8x8cm</a:t>
-            </a:r>
-          </a:p>
-          <a:p>
-            <a:r>
-              <a:rPr lang="en-US" dirty="0" smtClean="0"/>
-              <a:t>4x 5mm </a:t>
-            </a:r>
-            <a:r>
-              <a:rPr lang="en-US" dirty="0" err="1" smtClean="0"/>
-              <a:t>Bohrung</a:t>
-            </a:r>
-            <a:endParaRPr lang="en-US" dirty="0" smtClean="0"/>
-          </a:p>
-          <a:p>
-            <a:r>
-              <a:rPr lang="en-US" dirty="0" smtClean="0"/>
-              <a:t>2x 7mm </a:t>
-            </a:r>
-            <a:r>
-              <a:rPr lang="en-US" dirty="0" err="1" smtClean="0"/>
-              <a:t>Bohrung</a:t>
-            </a:r>
-            <a:endParaRPr lang="en-US" dirty="0" smtClean="0"/>
-          </a:p>
-          <a:p>
-            <a:r>
-              <a:rPr lang="en-US" dirty="0" err="1" smtClean="0"/>
-              <a:t>Mittler</a:t>
-            </a:r>
-            <a:r>
-              <a:rPr lang="en-US" dirty="0" smtClean="0"/>
-              <a:t> </a:t>
-            </a:r>
-            <a:r>
-              <a:rPr lang="en-US" dirty="0" err="1" smtClean="0"/>
-              <a:t>Steg</a:t>
-            </a:r>
-            <a:r>
-              <a:rPr lang="en-US" dirty="0" smtClean="0"/>
-              <a:t> </a:t>
-            </a:r>
-            <a:r>
-              <a:rPr lang="en-US" dirty="0" err="1" smtClean="0"/>
-              <a:t>Maß</a:t>
-            </a:r>
-            <a:r>
-              <a:rPr lang="en-US" dirty="0" smtClean="0"/>
-              <a:t> 1mm</a:t>
+              <a:rPr lang="de-DE" dirty="0" smtClean="0"/>
+              <a:t>Maße 8x8cm</a:t>
+            </a:r>
+          </a:p>
+          <a:p>
+            <a:r>
+              <a:rPr lang="de-DE" dirty="0" smtClean="0"/>
+              <a:t>4x 5mm Bohrung</a:t>
+            </a:r>
+          </a:p>
+          <a:p>
+            <a:r>
+              <a:rPr lang="de-DE" dirty="0" smtClean="0"/>
+              <a:t>2x 7mm Bohrung</a:t>
+            </a:r>
+          </a:p>
+          <a:p>
+            <a:r>
+              <a:rPr lang="de-DE" dirty="0" smtClean="0"/>
+              <a:t>Mittler Steg Maß 1mm</a:t>
             </a:r>
           </a:p>
           <a:p>
             <a:pPr>
               <a:buNone/>
             </a:pPr>
-            <a:endParaRPr lang="en-US" dirty="0" smtClean="0"/>
-          </a:p>
-          <a:p>
-            <a:r>
-              <a:rPr lang="en-US" dirty="0" err="1" smtClean="0"/>
-              <a:t>Abmessung</a:t>
-            </a:r>
-            <a:r>
-              <a:rPr lang="en-US" dirty="0" smtClean="0"/>
-              <a:t> </a:t>
-            </a:r>
-            <a:r>
-              <a:rPr lang="en-US" dirty="0" err="1" smtClean="0"/>
-              <a:t>Werkstück</a:t>
-            </a:r>
-            <a:r>
-              <a:rPr lang="en-US" dirty="0" smtClean="0"/>
-              <a:t> (</a:t>
-            </a:r>
-            <a:r>
-              <a:rPr lang="en-US" dirty="0" err="1" smtClean="0"/>
-              <a:t>Toleranz</a:t>
-            </a:r>
-            <a:r>
-              <a:rPr lang="en-US" dirty="0" smtClean="0"/>
-              <a:t> 2mm)</a:t>
-            </a:r>
-          </a:p>
-          <a:p>
-            <a:r>
-              <a:rPr lang="en-US" dirty="0" err="1" smtClean="0"/>
-              <a:t>Bohrungen</a:t>
-            </a:r>
-            <a:r>
-              <a:rPr lang="en-US" dirty="0" smtClean="0"/>
-              <a:t> (</a:t>
-            </a:r>
-            <a:r>
-              <a:rPr lang="en-US" dirty="0" err="1" smtClean="0"/>
-              <a:t>Toleranz</a:t>
-            </a:r>
-            <a:r>
-              <a:rPr lang="en-US" dirty="0" smtClean="0"/>
-              <a:t> 2mm)</a:t>
+            <a:endParaRPr lang="de-DE" dirty="0" smtClean="0"/>
+          </a:p>
+          <a:p>
+            <a:r>
+              <a:rPr lang="de-DE" dirty="0" smtClean="0"/>
+              <a:t>Abmessung Werkstück (Toleranz 2mm)</a:t>
+            </a:r>
+          </a:p>
+          <a:p>
+            <a:r>
+              <a:rPr lang="de-DE" dirty="0" smtClean="0"/>
+              <a:t>Bohrungen (Toleranz 2mm)</a:t>
             </a:r>
           </a:p>
           <a:p>
             <a:pPr lvl="1"/>
             <a:r>
-              <a:rPr lang="en-US" dirty="0" err="1" smtClean="0"/>
+              <a:rPr lang="de-DE" dirty="0" smtClean="0"/>
               <a:t>Existenz</a:t>
             </a:r>
-            <a:endParaRPr lang="en-US" dirty="0" smtClean="0"/>
           </a:p>
           <a:p>
             <a:pPr lvl="1"/>
             <a:r>
-              <a:rPr lang="en-US" dirty="0" err="1" smtClean="0"/>
+              <a:rPr lang="de-DE" dirty="0" smtClean="0"/>
               <a:t>Durchmesser</a:t>
             </a:r>
-            <a:endParaRPr lang="en-US" dirty="0" smtClean="0"/>
           </a:p>
           <a:p>
             <a:pPr lvl="1"/>
             <a:r>
-              <a:rPr lang="en-US" dirty="0" err="1" smtClean="0"/>
-              <a:t>Korrekte</a:t>
-            </a:r>
-            <a:r>
-              <a:rPr lang="en-US" dirty="0" smtClean="0"/>
-              <a:t> Position</a:t>
-            </a:r>
-          </a:p>
-          <a:p>
-            <a:r>
-              <a:rPr lang="en-US" dirty="0" err="1" smtClean="0"/>
-              <a:t>Tiefe</a:t>
-            </a:r>
-            <a:r>
-              <a:rPr lang="en-US" dirty="0" smtClean="0"/>
-              <a:t> </a:t>
-            </a:r>
-            <a:r>
-              <a:rPr lang="en-US" dirty="0" err="1" smtClean="0"/>
-              <a:t>Kratzer</a:t>
-            </a:r>
-            <a:r>
-              <a:rPr lang="en-US" dirty="0" smtClean="0"/>
-              <a:t> und </a:t>
-            </a:r>
-            <a:r>
-              <a:rPr lang="en-US" dirty="0" err="1" smtClean="0"/>
-              <a:t>strukturelle</a:t>
-            </a:r>
-            <a:r>
-              <a:rPr lang="en-US" dirty="0" smtClean="0"/>
-              <a:t> </a:t>
-            </a:r>
-            <a:r>
-              <a:rPr lang="en-US" dirty="0" err="1" smtClean="0"/>
-              <a:t>Schäden</a:t>
-            </a:r>
-            <a:endParaRPr lang="en-US" dirty="0" smtClean="0"/>
+              <a:rPr lang="de-DE" dirty="0" smtClean="0"/>
+              <a:t>Korrekte Position</a:t>
+            </a:r>
+          </a:p>
+          <a:p>
+            <a:r>
+              <a:rPr lang="de-DE" dirty="0" smtClean="0"/>
+              <a:t>Tiefe Kratzer und strukturelle Schäden</a:t>
+            </a:r>
           </a:p>
           <a:p>
             <a:pPr>
               <a:buNone/>
             </a:pPr>
-            <a:endParaRPr lang="en-US" dirty="0"/>
+            <a:endParaRPr lang="de-DE" dirty="0"/>
           </a:p>
         </p:txBody>
       </p:sp>
@@ -6619,10 +7910,10 @@
           <a:lstStyle/>
           <a:p>
             <a:r>
-              <a:rPr lang="en-US" dirty="0" err="1" smtClean="0"/>
+              <a:rPr lang="de-DE" dirty="0" smtClean="0"/>
               <a:t>Aufbau</a:t>
             </a:r>
-            <a:endParaRPr lang="en-US" dirty="0"/>
+            <a:endParaRPr lang="de-DE" dirty="0"/>
           </a:p>
         </p:txBody>
       </p:sp>
@@ -6642,80 +7933,54 @@
           <a:lstStyle/>
           <a:p>
             <a:r>
-              <a:rPr lang="en-US" dirty="0" smtClean="0"/>
-              <a:t>60 x 60 x 60 cm </a:t>
-            </a:r>
-            <a:r>
-              <a:rPr lang="en-US" dirty="0" err="1" smtClean="0"/>
-              <a:t>Aufbau</a:t>
-            </a:r>
-            <a:endParaRPr lang="en-US" dirty="0" smtClean="0"/>
-          </a:p>
-          <a:p>
-            <a:r>
-              <a:rPr lang="en-US" dirty="0" err="1" smtClean="0"/>
-              <a:t>Kamera</a:t>
-            </a:r>
-            <a:r>
-              <a:rPr lang="en-US" dirty="0" smtClean="0"/>
-              <a:t>: UI-1 460SE-C-HQ</a:t>
+              <a:rPr lang="de-DE" dirty="0" smtClean="0"/>
+              <a:t>60 x 60 x 60 cm Aufbau</a:t>
+            </a:r>
+          </a:p>
+          <a:p>
+            <a:r>
+              <a:rPr lang="de-DE" dirty="0" smtClean="0"/>
+              <a:t>Kamera: UI-1 460SE-C-HQ</a:t>
             </a:r>
           </a:p>
           <a:p>
             <a:pPr lvl="1"/>
             <a:r>
-              <a:rPr lang="en-US" dirty="0" smtClean="0"/>
+              <a:rPr lang="de-DE" dirty="0" smtClean="0"/>
               <a:t>2048 x 1536</a:t>
             </a:r>
           </a:p>
           <a:p>
             <a:r>
-              <a:rPr lang="en-US" dirty="0" err="1" smtClean="0"/>
-              <a:t>Objektiv</a:t>
-            </a:r>
-            <a:r>
-              <a:rPr lang="en-US" dirty="0" smtClean="0"/>
-              <a:t>: Tamron 1:1,6 25mm</a:t>
-            </a:r>
-          </a:p>
-          <a:p>
-            <a:r>
-              <a:rPr lang="en-US" dirty="0" smtClean="0"/>
-              <a:t>2 </a:t>
-            </a:r>
-            <a:r>
-              <a:rPr lang="en-US" dirty="0" err="1" smtClean="0"/>
-              <a:t>Lichter</a:t>
-            </a:r>
-            <a:r>
-              <a:rPr lang="en-US" dirty="0" smtClean="0"/>
-              <a:t> </a:t>
-            </a:r>
-            <a:r>
-              <a:rPr lang="en-US" dirty="0" err="1" smtClean="0"/>
-              <a:t>mit</a:t>
-            </a:r>
-            <a:r>
-              <a:rPr lang="en-US" dirty="0" smtClean="0"/>
-              <a:t> </a:t>
-            </a:r>
-            <a:r>
-              <a:rPr lang="en-US" dirty="0" err="1" smtClean="0"/>
-              <a:t>Diffusor</a:t>
-            </a:r>
-            <a:endParaRPr lang="en-US" dirty="0" smtClean="0"/>
+              <a:rPr lang="de-DE" dirty="0" smtClean="0"/>
+              <a:t>Objektiv: </a:t>
+            </a:r>
+            <a:r>
+              <a:rPr lang="de-DE" dirty="0" err="1" smtClean="0"/>
+              <a:t>Tamron</a:t>
+            </a:r>
+            <a:r>
+              <a:rPr lang="de-DE" dirty="0" smtClean="0"/>
+              <a:t> 1:1,6 25mm</a:t>
+            </a:r>
+          </a:p>
+          <a:p>
+            <a:r>
+              <a:rPr lang="de-DE" dirty="0" smtClean="0"/>
+              <a:t>2 Lichter mit Diffusor</a:t>
+            </a:r>
           </a:p>
           <a:p>
             <a:pPr>
               <a:buNone/>
             </a:pPr>
-            <a:endParaRPr lang="en-US" dirty="0" smtClean="0"/>
-          </a:p>
-          <a:p>
-            <a:endParaRPr lang="en-US" dirty="0" smtClean="0"/>
-          </a:p>
-          <a:p>
-            <a:endParaRPr lang="en-US" dirty="0"/>
+            <a:endParaRPr lang="de-DE" dirty="0" smtClean="0"/>
+          </a:p>
+          <a:p>
+            <a:endParaRPr lang="de-DE" dirty="0" smtClean="0"/>
+          </a:p>
+          <a:p>
+            <a:endParaRPr lang="de-DE" dirty="0"/>
           </a:p>
         </p:txBody>
       </p:sp>
@@ -6832,14 +8097,10 @@
           <a:lstStyle/>
           <a:p>
             <a:r>
-              <a:rPr lang="en-US" dirty="0" err="1" smtClean="0"/>
-              <a:t>Verwendete</a:t>
-            </a:r>
-            <a:r>
-              <a:rPr lang="en-US" dirty="0" smtClean="0"/>
-              <a:t> Software</a:t>
-            </a:r>
-            <a:endParaRPr lang="en-US" dirty="0"/>
+              <a:rPr lang="de-DE" dirty="0" smtClean="0"/>
+              <a:t>Verwendete Software</a:t>
+            </a:r>
+            <a:endParaRPr lang="de-DE" dirty="0"/>
           </a:p>
         </p:txBody>
       </p:sp>
@@ -7069,26 +8330,10 @@
           <a:lstStyle/>
           <a:p>
             <a:r>
-              <a:rPr lang="en-US" dirty="0" err="1" smtClean="0"/>
-              <a:t>Unterschied</a:t>
-            </a:r>
-            <a:r>
-              <a:rPr lang="en-US" dirty="0" smtClean="0"/>
-              <a:t> </a:t>
-            </a:r>
-            <a:r>
-              <a:rPr lang="en-US" dirty="0" err="1" smtClean="0"/>
-              <a:t>Modell</a:t>
-            </a:r>
-            <a:r>
-              <a:rPr lang="en-US" dirty="0" smtClean="0"/>
-              <a:t> &amp; </a:t>
-            </a:r>
-            <a:r>
-              <a:rPr lang="en-US" dirty="0" err="1" smtClean="0"/>
-              <a:t>Aufnahme</a:t>
-            </a:r>
-            <a:endParaRPr lang="en-US" dirty="0"/>
+              <a:rPr lang="de-DE" dirty="0" smtClean="0"/>
+              <a:t>Unterschied Modell &amp; Aufnahme</a:t>
+            </a:r>
+            <a:endParaRPr lang="de-DE" dirty="0"/>
           </a:p>
         </p:txBody>
       </p:sp>
@@ -7108,57 +8353,30 @@
           <a:lstStyle/>
           <a:p>
             <a:r>
-              <a:rPr lang="en-US" dirty="0" err="1" smtClean="0"/>
-              <a:t>Perfekte</a:t>
-            </a:r>
-            <a:r>
-              <a:rPr lang="en-US" dirty="0" smtClean="0"/>
-              <a:t> </a:t>
-            </a:r>
-            <a:r>
-              <a:rPr lang="en-US" dirty="0" err="1" smtClean="0"/>
-              <a:t>Beleuchtung</a:t>
-            </a:r>
-            <a:endParaRPr lang="en-US" dirty="0" smtClean="0"/>
+              <a:rPr lang="de-DE" dirty="0" smtClean="0"/>
+              <a:t>Perfekte Beleuchtung</a:t>
+            </a:r>
           </a:p>
           <a:p>
             <a:pPr lvl="1"/>
             <a:r>
-              <a:rPr lang="en-US" dirty="0" err="1" smtClean="0"/>
-              <a:t>Perfekte</a:t>
-            </a:r>
-            <a:r>
-              <a:rPr lang="en-US" dirty="0" smtClean="0"/>
-              <a:t> </a:t>
-            </a:r>
-            <a:r>
-              <a:rPr lang="en-US" dirty="0" err="1" smtClean="0"/>
-              <a:t>Kanten</a:t>
-            </a:r>
-            <a:endParaRPr lang="en-US" dirty="0" smtClean="0"/>
+              <a:rPr lang="de-DE" dirty="0" smtClean="0"/>
+              <a:t>Perfekte Kanten</a:t>
+            </a:r>
           </a:p>
           <a:p>
             <a:pPr lvl="1"/>
             <a:r>
-              <a:rPr lang="en-US" dirty="0" err="1" smtClean="0"/>
-              <a:t>Perfekte</a:t>
-            </a:r>
-            <a:r>
-              <a:rPr lang="en-US" dirty="0" smtClean="0"/>
-              <a:t> </a:t>
-            </a:r>
-            <a:r>
-              <a:rPr lang="en-US" dirty="0" err="1" smtClean="0"/>
-              <a:t>Genauigkeit</a:t>
-            </a:r>
-            <a:endParaRPr lang="en-US" dirty="0" smtClean="0"/>
+              <a:rPr lang="de-DE" dirty="0" smtClean="0"/>
+              <a:t>Perfekte Genauigkeit</a:t>
+            </a:r>
           </a:p>
           <a:p>
             <a:pPr lvl="1"/>
-            <a:endParaRPr lang="en-US" dirty="0" smtClean="0"/>
-          </a:p>
-          <a:p>
-            <a:endParaRPr lang="en-US" dirty="0"/>
+            <a:endParaRPr lang="de-DE" dirty="0" smtClean="0"/>
+          </a:p>
+          <a:p>
+            <a:endParaRPr lang="de-DE" dirty="0"/>
           </a:p>
         </p:txBody>
       </p:sp>
@@ -7226,7 +8444,7 @@
 </file>
 
 <file path=ppt/slides/slide7.xml><?xml version="1.0" encoding="utf-8"?>
-<p:sld xmlns:a="http://schemas.openxmlformats.org/drawingml/2006/main" xmlns:r="http://schemas.openxmlformats.org/officeDocument/2006/relationships" xmlns:p="http://schemas.openxmlformats.org/presentationml/2006/main">
+<p:sld xmlns:a="http://schemas.openxmlformats.org/drawingml/2006/main" xmlns:r="http://schemas.openxmlformats.org/officeDocument/2006/relationships" xmlns:p="http://schemas.openxmlformats.org/presentationml/2006/main" show="0">
   <p:cSld>
     <p:spTree>
       <p:nvGrpSpPr>
@@ -7313,6 +8531,14 @@
   <p:clrMapOvr>
     <a:masterClrMapping/>
   </p:clrMapOvr>
+  <mc:AlternateContent xmlns:mc="http://schemas.openxmlformats.org/markup-compatibility/2006">
+    <mc:Choice xmlns:p14="http://schemas.microsoft.com/office/powerpoint/2010/main" Requires="p14">
+      <p:transition spd="slow" p14:dur="2000"/>
+    </mc:Choice>
+    <mc:Fallback>
+      <p:transition spd="slow"/>
+    </mc:Fallback>
+  </mc:AlternateContent>
   <p:timing>
     <p:tnLst>
       <p:par>
@@ -7356,37 +8582,297 @@
           <a:lstStyle/>
           <a:p>
             <a:r>
-              <a:rPr lang="en-US" dirty="0" err="1" smtClean="0"/>
-              <a:t>Kalibrierung</a:t>
-            </a:r>
-            <a:endParaRPr lang="en-US" dirty="0"/>
+              <a:rPr lang="de-DE" dirty="0" smtClean="0"/>
+              <a:t>Programm-Ablauf</a:t>
+            </a:r>
+            <a:endParaRPr lang="de-DE" dirty="0"/>
           </a:p>
         </p:txBody>
       </p:sp>
       <p:sp>
         <p:nvSpPr>
-          <p:cNvPr id="3" name="Inhaltsplatzhalter 2"/>
-          <p:cNvSpPr>
-            <a:spLocks noGrp="1"/>
-          </p:cNvSpPr>
-          <p:nvPr>
-            <p:ph idx="1"/>
-          </p:nvPr>
+          <p:cNvPr id="4" name="Flussdiagramm: Alternativer Prozess 3"/>
+          <p:cNvSpPr/>
+          <p:nvPr/>
         </p:nvSpPr>
-        <p:spPr/>
+        <p:spPr>
+          <a:xfrm>
+            <a:off x="2971800" y="1040600"/>
+            <a:ext cx="2743200" cy="612648"/>
+          </a:xfrm>
+          <a:prstGeom prst="flowChartAlternateProcess">
+            <a:avLst/>
+          </a:prstGeom>
+        </p:spPr>
+        <p:style>
+          <a:lnRef idx="2">
+            <a:schemeClr val="accent1">
+              <a:shade val="50000"/>
+            </a:schemeClr>
+          </a:lnRef>
+          <a:fillRef idx="1">
+            <a:schemeClr val="accent1"/>
+          </a:fillRef>
+          <a:effectRef idx="0">
+            <a:schemeClr val="accent1"/>
+          </a:effectRef>
+          <a:fontRef idx="minor">
+            <a:schemeClr val="lt1"/>
+          </a:fontRef>
+        </p:style>
         <p:txBody>
-          <a:bodyPr/>
+          <a:bodyPr rtlCol="0" anchor="ctr"/>
           <a:lstStyle/>
           <a:p>
-            <a:r>
-              <a:rPr lang="en-US" dirty="0" err="1" smtClean="0"/>
-              <a:t>aaaa</a:t>
-            </a:r>
-            <a:endParaRPr lang="en-US" dirty="0"/>
+            <a:pPr algn="ctr"/>
+            <a:r>
+              <a:rPr lang="de-DE" dirty="0" smtClean="0"/>
+              <a:t>Kalibrierung</a:t>
+            </a:r>
+            <a:endParaRPr lang="de-DE" dirty="0"/>
           </a:p>
         </p:txBody>
       </p:sp>
+      <p:sp>
+        <p:nvSpPr>
+          <p:cNvPr id="5" name="Flussdiagramm: Alternativer Prozess 4"/>
+          <p:cNvSpPr/>
+          <p:nvPr/>
+        </p:nvSpPr>
+        <p:spPr>
+          <a:xfrm>
+            <a:off x="2971800" y="2397744"/>
+            <a:ext cx="2743200" cy="612648"/>
+          </a:xfrm>
+          <a:prstGeom prst="flowChartAlternateProcess">
+            <a:avLst/>
+          </a:prstGeom>
+        </p:spPr>
+        <p:style>
+          <a:lnRef idx="2">
+            <a:schemeClr val="accent1">
+              <a:shade val="50000"/>
+            </a:schemeClr>
+          </a:lnRef>
+          <a:fillRef idx="1">
+            <a:schemeClr val="accent1"/>
+          </a:fillRef>
+          <a:effectRef idx="0">
+            <a:schemeClr val="accent1"/>
+          </a:effectRef>
+          <a:fontRef idx="minor">
+            <a:schemeClr val="lt1"/>
+          </a:fontRef>
+        </p:style>
+        <p:txBody>
+          <a:bodyPr rtlCol="0" anchor="ctr"/>
+          <a:lstStyle/>
+          <a:p>
+            <a:pPr algn="ctr"/>
+            <a:r>
+              <a:rPr lang="de-DE" dirty="0" smtClean="0"/>
+              <a:t>Lage und Maße</a:t>
+            </a:r>
+            <a:endParaRPr lang="de-DE" dirty="0"/>
+          </a:p>
+        </p:txBody>
+      </p:sp>
+      <p:sp>
+        <p:nvSpPr>
+          <p:cNvPr id="6" name="Flussdiagramm: Alternativer Prozess 5"/>
+          <p:cNvSpPr/>
+          <p:nvPr/>
+        </p:nvSpPr>
+        <p:spPr>
+          <a:xfrm>
+            <a:off x="2986216" y="3748710"/>
+            <a:ext cx="2743200" cy="612648"/>
+          </a:xfrm>
+          <a:prstGeom prst="flowChartAlternateProcess">
+            <a:avLst/>
+          </a:prstGeom>
+        </p:spPr>
+        <p:style>
+          <a:lnRef idx="2">
+            <a:schemeClr val="accent1">
+              <a:shade val="50000"/>
+            </a:schemeClr>
+          </a:lnRef>
+          <a:fillRef idx="1">
+            <a:schemeClr val="accent1"/>
+          </a:fillRef>
+          <a:effectRef idx="0">
+            <a:schemeClr val="accent1"/>
+          </a:effectRef>
+          <a:fontRef idx="minor">
+            <a:schemeClr val="lt1"/>
+          </a:fontRef>
+        </p:style>
+        <p:txBody>
+          <a:bodyPr rtlCol="0" anchor="ctr"/>
+          <a:lstStyle/>
+          <a:p>
+            <a:pPr algn="ctr"/>
+            <a:r>
+              <a:rPr lang="de-DE" dirty="0" smtClean="0"/>
+              <a:t>Bohrungen</a:t>
+            </a:r>
+            <a:endParaRPr lang="de-DE" dirty="0"/>
+          </a:p>
+        </p:txBody>
+      </p:sp>
+      <p:sp>
+        <p:nvSpPr>
+          <p:cNvPr id="7" name="Flussdiagramm: Alternativer Prozess 6"/>
+          <p:cNvSpPr/>
+          <p:nvPr/>
+        </p:nvSpPr>
+        <p:spPr>
+          <a:xfrm>
+            <a:off x="2971800" y="5105854"/>
+            <a:ext cx="2743200" cy="612648"/>
+          </a:xfrm>
+          <a:prstGeom prst="flowChartAlternateProcess">
+            <a:avLst/>
+          </a:prstGeom>
+        </p:spPr>
+        <p:style>
+          <a:lnRef idx="2">
+            <a:schemeClr val="accent1">
+              <a:shade val="50000"/>
+            </a:schemeClr>
+          </a:lnRef>
+          <a:fillRef idx="1">
+            <a:schemeClr val="accent1"/>
+          </a:fillRef>
+          <a:effectRef idx="0">
+            <a:schemeClr val="accent1"/>
+          </a:effectRef>
+          <a:fontRef idx="minor">
+            <a:schemeClr val="lt1"/>
+          </a:fontRef>
+        </p:style>
+        <p:txBody>
+          <a:bodyPr rtlCol="0" anchor="ctr"/>
+          <a:lstStyle/>
+          <a:p>
+            <a:pPr algn="ctr"/>
+            <a:r>
+              <a:rPr lang="de-DE" dirty="0" smtClean="0"/>
+              <a:t>Schäden</a:t>
+            </a:r>
+            <a:endParaRPr lang="de-DE" dirty="0"/>
+          </a:p>
+        </p:txBody>
+      </p:sp>
+      <p:cxnSp>
+        <p:nvCxnSpPr>
+          <p:cNvPr id="11" name="Gerade Verbindung mit Pfeil 10"/>
+          <p:cNvCxnSpPr>
+            <a:stCxn id="4" idx="2"/>
+            <a:endCxn id="5" idx="0"/>
+          </p:cNvCxnSpPr>
+          <p:nvPr/>
+        </p:nvCxnSpPr>
+        <p:spPr>
+          <a:xfrm>
+            <a:off x="4343400" y="1653248"/>
+            <a:ext cx="0" cy="744496"/>
+          </a:xfrm>
+          <a:prstGeom prst="straightConnector1">
+            <a:avLst/>
+          </a:prstGeom>
+          <a:ln>
+            <a:tailEnd type="triangle"/>
+          </a:ln>
+        </p:spPr>
+        <p:style>
+          <a:lnRef idx="3">
+            <a:schemeClr val="accent1"/>
+          </a:lnRef>
+          <a:fillRef idx="0">
+            <a:schemeClr val="accent1"/>
+          </a:fillRef>
+          <a:effectRef idx="2">
+            <a:schemeClr val="accent1"/>
+          </a:effectRef>
+          <a:fontRef idx="minor">
+            <a:schemeClr val="tx1"/>
+          </a:fontRef>
+        </p:style>
+      </p:cxnSp>
+      <p:cxnSp>
+        <p:nvCxnSpPr>
+          <p:cNvPr id="13" name="Gerade Verbindung mit Pfeil 12"/>
+          <p:cNvCxnSpPr/>
+          <p:nvPr/>
+        </p:nvCxnSpPr>
+        <p:spPr>
+          <a:xfrm>
+            <a:off x="4343400" y="3004214"/>
+            <a:ext cx="0" cy="744496"/>
+          </a:xfrm>
+          <a:prstGeom prst="straightConnector1">
+            <a:avLst/>
+          </a:prstGeom>
+          <a:ln>
+            <a:tailEnd type="triangle"/>
+          </a:ln>
+        </p:spPr>
+        <p:style>
+          <a:lnRef idx="3">
+            <a:schemeClr val="accent1"/>
+          </a:lnRef>
+          <a:fillRef idx="0">
+            <a:schemeClr val="accent1"/>
+          </a:fillRef>
+          <a:effectRef idx="2">
+            <a:schemeClr val="accent1"/>
+          </a:effectRef>
+          <a:fontRef idx="minor">
+            <a:schemeClr val="tx1"/>
+          </a:fontRef>
+        </p:style>
+      </p:cxnSp>
+      <p:cxnSp>
+        <p:nvCxnSpPr>
+          <p:cNvPr id="14" name="Gerade Verbindung mit Pfeil 13"/>
+          <p:cNvCxnSpPr/>
+          <p:nvPr/>
+        </p:nvCxnSpPr>
+        <p:spPr>
+          <a:xfrm>
+            <a:off x="4333103" y="4361358"/>
+            <a:ext cx="0" cy="744496"/>
+          </a:xfrm>
+          <a:prstGeom prst="straightConnector1">
+            <a:avLst/>
+          </a:prstGeom>
+          <a:ln>
+            <a:tailEnd type="triangle"/>
+          </a:ln>
+        </p:spPr>
+        <p:style>
+          <a:lnRef idx="3">
+            <a:schemeClr val="accent1"/>
+          </a:lnRef>
+          <a:fillRef idx="0">
+            <a:schemeClr val="accent1"/>
+          </a:fillRef>
+          <a:effectRef idx="2">
+            <a:schemeClr val="accent1"/>
+          </a:effectRef>
+          <a:fontRef idx="minor">
+            <a:schemeClr val="tx1"/>
+          </a:fontRef>
+        </p:style>
+      </p:cxnSp>
     </p:spTree>
+    <p:extLst>
+      <p:ext uri="{BB962C8B-B14F-4D97-AF65-F5344CB8AC3E}">
+        <p14:creationId xmlns:p14="http://schemas.microsoft.com/office/powerpoint/2010/main" val="2825131093"/>
+      </p:ext>
+    </p:extLst>
   </p:cSld>
   <p:clrMapOvr>
     <a:masterClrMapping/>
@@ -7434,450 +8920,358 @@
           <a:lstStyle/>
           <a:p>
             <a:r>
-              <a:rPr lang="en-US" dirty="0" err="1" smtClean="0"/>
-              <a:t>Prüfen</a:t>
-            </a:r>
-            <a:r>
-              <a:rPr lang="en-US" dirty="0" smtClean="0"/>
-              <a:t> </a:t>
-            </a:r>
-            <a:r>
-              <a:rPr lang="en-US" dirty="0" err="1" smtClean="0"/>
-              <a:t>der</a:t>
-            </a:r>
-            <a:r>
-              <a:rPr lang="en-US" dirty="0" smtClean="0"/>
-              <a:t> </a:t>
-            </a:r>
-            <a:r>
-              <a:rPr lang="en-US" dirty="0" err="1" smtClean="0"/>
-              <a:t>Lage</a:t>
-            </a:r>
-            <a:r>
-              <a:rPr lang="en-US" dirty="0" smtClean="0"/>
-              <a:t> und </a:t>
-            </a:r>
-            <a:r>
-              <a:rPr lang="en-US" dirty="0" err="1" smtClean="0"/>
-              <a:t>Abmaße</a:t>
-            </a:r>
-            <a:endParaRPr lang="en-US" dirty="0"/>
+              <a:rPr lang="de-DE" dirty="0" smtClean="0"/>
+              <a:t>Programm-Ablauf</a:t>
+            </a:r>
+            <a:endParaRPr lang="de-DE" dirty="0"/>
           </a:p>
         </p:txBody>
       </p:sp>
       <p:sp>
         <p:nvSpPr>
-          <p:cNvPr id="3" name="Inhaltsplatzhalter 2"/>
-          <p:cNvSpPr>
-            <a:spLocks noGrp="1"/>
-          </p:cNvSpPr>
-          <p:nvPr>
-            <p:ph idx="1"/>
-          </p:nvPr>
+          <p:cNvPr id="4" name="Flussdiagramm: Alternativer Prozess 3"/>
+          <p:cNvSpPr/>
+          <p:nvPr/>
         </p:nvSpPr>
-        <p:spPr/>
+        <p:spPr>
+          <a:xfrm>
+            <a:off x="2971800" y="1040600"/>
+            <a:ext cx="2743200" cy="612648"/>
+          </a:xfrm>
+          <a:prstGeom prst="flowChartAlternateProcess">
+            <a:avLst/>
+          </a:prstGeom>
+          <a:solidFill>
+            <a:schemeClr val="accent1"/>
+          </a:solidFill>
+          <a:ln>
+            <a:solidFill>
+              <a:schemeClr val="accent1">
+                <a:shade val="50000"/>
+              </a:schemeClr>
+            </a:solidFill>
+          </a:ln>
+        </p:spPr>
+        <p:style>
+          <a:lnRef idx="2">
+            <a:schemeClr val="accent1">
+              <a:shade val="50000"/>
+            </a:schemeClr>
+          </a:lnRef>
+          <a:fillRef idx="1">
+            <a:schemeClr val="accent1"/>
+          </a:fillRef>
+          <a:effectRef idx="0">
+            <a:schemeClr val="accent1"/>
+          </a:effectRef>
+          <a:fontRef idx="minor">
+            <a:schemeClr val="lt1"/>
+          </a:fontRef>
+        </p:style>
         <p:txBody>
-          <a:bodyPr/>
+          <a:bodyPr rtlCol="0" anchor="ctr"/>
           <a:lstStyle/>
           <a:p>
-            <a:r>
-              <a:rPr lang="en-US" dirty="0" err="1" smtClean="0"/>
-              <a:t>Bildvorverarbeitung</a:t>
-            </a:r>
-            <a:endParaRPr lang="en-US" dirty="0" smtClean="0"/>
-          </a:p>
-          <a:p>
-            <a:pPr lvl="1"/>
-            <a:r>
-              <a:rPr lang="en-US" dirty="0" err="1" smtClean="0"/>
-              <a:t>Entfernen</a:t>
-            </a:r>
-            <a:r>
-              <a:rPr lang="en-US" dirty="0" smtClean="0"/>
-              <a:t> </a:t>
-            </a:r>
-            <a:r>
-              <a:rPr lang="en-US" dirty="0" err="1" smtClean="0"/>
-              <a:t>der</a:t>
-            </a:r>
-            <a:r>
-              <a:rPr lang="en-US" dirty="0" smtClean="0"/>
-              <a:t> </a:t>
-            </a:r>
-            <a:r>
-              <a:rPr lang="en-US" dirty="0" err="1" smtClean="0"/>
-              <a:t>spekularen</a:t>
-            </a:r>
-            <a:r>
-              <a:rPr lang="en-US" dirty="0" smtClean="0"/>
-              <a:t> </a:t>
-            </a:r>
-            <a:r>
-              <a:rPr lang="en-US" dirty="0" err="1" smtClean="0"/>
-              <a:t>Kante</a:t>
-            </a:r>
-            <a:r>
-              <a:rPr lang="en-US" dirty="0" smtClean="0"/>
-              <a:t> </a:t>
-            </a:r>
-          </a:p>
-          <a:p>
-            <a:pPr lvl="2"/>
-            <a:r>
-              <a:rPr lang="en-US" dirty="0" smtClean="0"/>
-              <a:t>Pixel </a:t>
-            </a:r>
-            <a:r>
-              <a:rPr lang="en-US" dirty="0" err="1" smtClean="0"/>
-              <a:t>mit</a:t>
-            </a:r>
-            <a:r>
-              <a:rPr lang="en-US" dirty="0" smtClean="0"/>
-              <a:t> </a:t>
-            </a:r>
-            <a:r>
-              <a:rPr lang="en-US" dirty="0" err="1" smtClean="0"/>
-              <a:t>Grauwert</a:t>
-            </a:r>
-            <a:r>
-              <a:rPr lang="en-US" dirty="0" smtClean="0"/>
-              <a:t> &gt; 200 </a:t>
-            </a:r>
-            <a:r>
-              <a:rPr lang="en-US" dirty="0" err="1" smtClean="0"/>
-              <a:t>werden</a:t>
-            </a:r>
-            <a:r>
-              <a:rPr lang="en-US" dirty="0" smtClean="0"/>
-              <a:t> auf 0 </a:t>
-            </a:r>
-            <a:r>
-              <a:rPr lang="en-US" dirty="0" err="1" smtClean="0"/>
-              <a:t>gesetzt</a:t>
-            </a:r>
-            <a:endParaRPr lang="en-US" dirty="0" smtClean="0"/>
-          </a:p>
-          <a:p>
-            <a:pPr lvl="1"/>
-            <a:r>
-              <a:rPr lang="en-US" dirty="0" err="1" smtClean="0"/>
-              <a:t>Maskieren</a:t>
-            </a:r>
-            <a:r>
-              <a:rPr lang="en-US" dirty="0" smtClean="0"/>
-              <a:t> </a:t>
-            </a:r>
-            <a:r>
-              <a:rPr lang="en-US" dirty="0" err="1" smtClean="0"/>
-              <a:t>der</a:t>
-            </a:r>
-            <a:r>
-              <a:rPr lang="en-US" dirty="0" smtClean="0"/>
-              <a:t> </a:t>
-            </a:r>
-            <a:r>
-              <a:rPr lang="en-US" dirty="0" err="1" smtClean="0"/>
-              <a:t>Werkstück</a:t>
-            </a:r>
-            <a:r>
-              <a:rPr lang="en-US" dirty="0" smtClean="0"/>
-              <a:t> pixel</a:t>
-            </a:r>
-          </a:p>
-          <a:p>
-            <a:pPr lvl="2"/>
-            <a:r>
-              <a:rPr lang="en-US" dirty="0" smtClean="0"/>
-              <a:t>Pixel </a:t>
-            </a:r>
-            <a:r>
-              <a:rPr lang="en-US" dirty="0" err="1" smtClean="0"/>
-              <a:t>mit</a:t>
-            </a:r>
-            <a:r>
-              <a:rPr lang="en-US" dirty="0" smtClean="0"/>
-              <a:t> </a:t>
-            </a:r>
-            <a:r>
-              <a:rPr lang="en-US" dirty="0" err="1" smtClean="0"/>
-              <a:t>Grauwert</a:t>
-            </a:r>
-            <a:r>
-              <a:rPr lang="en-US" dirty="0" smtClean="0"/>
-              <a:t> &gt;= 70 </a:t>
-            </a:r>
-            <a:r>
-              <a:rPr lang="en-US" dirty="0" err="1" smtClean="0"/>
-              <a:t>werden</a:t>
-            </a:r>
-            <a:r>
-              <a:rPr lang="en-US" dirty="0" smtClean="0"/>
-              <a:t> auf 255 (</a:t>
-            </a:r>
-            <a:r>
-              <a:rPr lang="en-US" dirty="0" err="1" smtClean="0"/>
-              <a:t>weiß</a:t>
-            </a:r>
-            <a:r>
-              <a:rPr lang="en-US" dirty="0" smtClean="0"/>
-              <a:t>) </a:t>
-            </a:r>
-            <a:r>
-              <a:rPr lang="en-US" dirty="0" err="1" smtClean="0"/>
-              <a:t>gesetzt</a:t>
-            </a:r>
-            <a:endParaRPr lang="en-US" dirty="0" smtClean="0"/>
-          </a:p>
-          <a:p>
-            <a:pPr lvl="1"/>
-            <a:r>
-              <a:rPr lang="en-US" dirty="0" err="1" smtClean="0"/>
-              <a:t>Reduktion</a:t>
-            </a:r>
-            <a:r>
-              <a:rPr lang="en-US" dirty="0" smtClean="0"/>
-              <a:t> von Noise</a:t>
-            </a:r>
-          </a:p>
-          <a:p>
-            <a:pPr lvl="2"/>
-            <a:r>
-              <a:rPr lang="en-US" dirty="0" err="1" smtClean="0"/>
-              <a:t>Morphologische</a:t>
-            </a:r>
-            <a:r>
-              <a:rPr lang="en-US" dirty="0" smtClean="0"/>
-              <a:t> Erosion und </a:t>
-            </a:r>
-            <a:r>
-              <a:rPr lang="en-US" dirty="0" err="1" smtClean="0"/>
-              <a:t>Dilitation</a:t>
-            </a:r>
-            <a:endParaRPr lang="en-US" dirty="0" smtClean="0"/>
-          </a:p>
-          <a:p>
-            <a:pPr lvl="1"/>
-            <a:r>
-              <a:rPr lang="en-US" dirty="0" err="1" smtClean="0"/>
-              <a:t>Kantendektion</a:t>
-            </a:r>
-            <a:r>
-              <a:rPr lang="en-US" dirty="0" smtClean="0"/>
-              <a:t> </a:t>
-            </a:r>
-            <a:r>
-              <a:rPr lang="en-US" dirty="0" err="1" smtClean="0"/>
-              <a:t>mit</a:t>
-            </a:r>
-            <a:r>
-              <a:rPr lang="en-US" dirty="0" smtClean="0"/>
-              <a:t> Canny</a:t>
-            </a:r>
-          </a:p>
-          <a:p>
-            <a:pPr lvl="1"/>
-            <a:endParaRPr lang="en-US" dirty="0" smtClean="0"/>
-          </a:p>
-          <a:p>
-            <a:r>
-              <a:rPr lang="en-US" dirty="0" err="1" smtClean="0"/>
-              <a:t>Überprüfen</a:t>
-            </a:r>
-            <a:r>
-              <a:rPr lang="en-US" dirty="0" smtClean="0"/>
-              <a:t> </a:t>
-            </a:r>
-            <a:r>
-              <a:rPr lang="en-US" dirty="0" err="1" smtClean="0"/>
-              <a:t>der</a:t>
-            </a:r>
-            <a:r>
-              <a:rPr lang="en-US" dirty="0" smtClean="0"/>
-              <a:t> </a:t>
-            </a:r>
-            <a:r>
-              <a:rPr lang="en-US" dirty="0" err="1" smtClean="0"/>
-              <a:t>Abmaße</a:t>
-            </a:r>
-            <a:r>
-              <a:rPr lang="en-US" dirty="0" smtClean="0"/>
-              <a:t> und </a:t>
-            </a:r>
-            <a:r>
-              <a:rPr lang="en-US" dirty="0" err="1" smtClean="0"/>
-              <a:t>finden</a:t>
-            </a:r>
-            <a:r>
-              <a:rPr lang="en-US" dirty="0" smtClean="0"/>
-              <a:t> </a:t>
-            </a:r>
-            <a:r>
-              <a:rPr lang="en-US" dirty="0" err="1" smtClean="0"/>
-              <a:t>der</a:t>
-            </a:r>
-            <a:r>
-              <a:rPr lang="en-US" dirty="0" smtClean="0"/>
-              <a:t> </a:t>
-            </a:r>
-            <a:r>
-              <a:rPr lang="en-US" dirty="0" err="1" smtClean="0"/>
-              <a:t>Lage</a:t>
-            </a:r>
-            <a:endParaRPr lang="en-US" dirty="0" smtClean="0"/>
-          </a:p>
-          <a:p>
-            <a:pPr lvl="1"/>
-            <a:r>
-              <a:rPr lang="en-US" dirty="0" err="1" smtClean="0"/>
-              <a:t>Annahme</a:t>
-            </a:r>
-            <a:r>
-              <a:rPr lang="en-US" dirty="0" smtClean="0"/>
-              <a:t>: </a:t>
-            </a:r>
-            <a:r>
-              <a:rPr lang="en-US" dirty="0" err="1" smtClean="0"/>
-              <a:t>Kontur</a:t>
-            </a:r>
-            <a:r>
-              <a:rPr lang="en-US" dirty="0" smtClean="0"/>
-              <a:t>, die den </a:t>
-            </a:r>
-            <a:r>
-              <a:rPr lang="en-US" dirty="0" err="1" smtClean="0"/>
-              <a:t>Flächeninhalt</a:t>
-            </a:r>
-            <a:r>
-              <a:rPr lang="en-US" dirty="0" smtClean="0"/>
-              <a:t> des </a:t>
-            </a:r>
-            <a:r>
-              <a:rPr lang="en-US" dirty="0" err="1" smtClean="0"/>
-              <a:t>kleinsten</a:t>
-            </a:r>
-            <a:r>
-              <a:rPr lang="en-US" dirty="0" smtClean="0"/>
-              <a:t>, </a:t>
-            </a:r>
-            <a:r>
-              <a:rPr lang="en-US" dirty="0" err="1" smtClean="0"/>
-              <a:t>vollständig</a:t>
-            </a:r>
-            <a:r>
-              <a:rPr lang="en-US" dirty="0" smtClean="0"/>
-              <a:t> </a:t>
-            </a:r>
-            <a:r>
-              <a:rPr lang="en-US" dirty="0" err="1" smtClean="0"/>
-              <a:t>umschließenden</a:t>
-            </a:r>
-            <a:r>
-              <a:rPr lang="en-US" dirty="0" smtClean="0"/>
-              <a:t> </a:t>
-            </a:r>
-            <a:r>
-              <a:rPr lang="en-US" dirty="0" err="1" smtClean="0"/>
-              <a:t>Rechtecks</a:t>
-            </a:r>
-            <a:r>
-              <a:rPr lang="en-US" dirty="0" smtClean="0"/>
-              <a:t> </a:t>
-            </a:r>
-            <a:r>
-              <a:rPr lang="en-US" dirty="0" err="1" smtClean="0"/>
-              <a:t>maximiert</a:t>
-            </a:r>
-            <a:r>
-              <a:rPr lang="en-US" dirty="0" smtClean="0"/>
-              <a:t> </a:t>
-            </a:r>
-            <a:r>
-              <a:rPr lang="en-US" dirty="0" err="1" smtClean="0"/>
-              <a:t>ist</a:t>
-            </a:r>
-            <a:r>
-              <a:rPr lang="en-US" dirty="0" smtClean="0"/>
-              <a:t> die </a:t>
-            </a:r>
-            <a:r>
-              <a:rPr lang="en-US" dirty="0" err="1" smtClean="0"/>
-              <a:t>Kontur</a:t>
-            </a:r>
-            <a:r>
-              <a:rPr lang="en-US" dirty="0" smtClean="0"/>
-              <a:t> des </a:t>
-            </a:r>
-            <a:r>
-              <a:rPr lang="en-US" dirty="0" err="1" smtClean="0"/>
-              <a:t>Werkstücks</a:t>
-            </a:r>
-            <a:endParaRPr lang="en-US" dirty="0" smtClean="0"/>
-          </a:p>
-          <a:p>
-            <a:pPr lvl="1"/>
-            <a:r>
-              <a:rPr lang="en-US" dirty="0" err="1" smtClean="0"/>
-              <a:t>Überprüfe</a:t>
-            </a:r>
-            <a:r>
-              <a:rPr lang="en-US" dirty="0" smtClean="0"/>
-              <a:t> die </a:t>
-            </a:r>
-            <a:r>
-              <a:rPr lang="en-US" dirty="0" err="1" smtClean="0"/>
-              <a:t>Länge</a:t>
-            </a:r>
-            <a:r>
-              <a:rPr lang="en-US" dirty="0" smtClean="0"/>
-              <a:t> </a:t>
-            </a:r>
-            <a:r>
-              <a:rPr lang="en-US" dirty="0" err="1" smtClean="0"/>
-              <a:t>jeder</a:t>
-            </a:r>
-            <a:r>
-              <a:rPr lang="en-US" dirty="0" smtClean="0"/>
-              <a:t> </a:t>
-            </a:r>
-            <a:r>
-              <a:rPr lang="en-US" dirty="0" err="1" smtClean="0"/>
-              <a:t>Kante</a:t>
-            </a:r>
-            <a:r>
-              <a:rPr lang="en-US" dirty="0" smtClean="0"/>
-              <a:t> des </a:t>
-            </a:r>
-            <a:r>
-              <a:rPr lang="en-US" dirty="0" err="1" smtClean="0"/>
-              <a:t>umschließenden</a:t>
-            </a:r>
-            <a:r>
-              <a:rPr lang="en-US" dirty="0" smtClean="0"/>
-              <a:t> </a:t>
-            </a:r>
-            <a:r>
-              <a:rPr lang="en-US" dirty="0" err="1" smtClean="0"/>
-              <a:t>Rechtecks</a:t>
-            </a:r>
-            <a:endParaRPr lang="en-US" dirty="0" smtClean="0"/>
-          </a:p>
-          <a:p>
-            <a:pPr lvl="1"/>
-            <a:endParaRPr lang="en-US" dirty="0" smtClean="0"/>
-          </a:p>
-          <a:p>
-            <a:pPr lvl="2"/>
-            <a:endParaRPr lang="en-US" dirty="0" smtClean="0"/>
-          </a:p>
-          <a:p>
-            <a:pPr>
-              <a:buNone/>
-            </a:pPr>
-            <a:endParaRPr lang="en-US" dirty="0" smtClean="0"/>
+            <a:pPr algn="ctr"/>
+            <a:r>
+              <a:rPr lang="de-DE" dirty="0" smtClean="0"/>
+              <a:t>Kalibrierung</a:t>
+            </a:r>
+            <a:endParaRPr lang="de-DE" dirty="0"/>
           </a:p>
         </p:txBody>
       </p:sp>
+      <p:sp>
+        <p:nvSpPr>
+          <p:cNvPr id="5" name="Flussdiagramm: Alternativer Prozess 4"/>
+          <p:cNvSpPr/>
+          <p:nvPr/>
+        </p:nvSpPr>
+        <p:spPr>
+          <a:xfrm>
+            <a:off x="2971800" y="2397744"/>
+            <a:ext cx="2743200" cy="612648"/>
+          </a:xfrm>
+          <a:prstGeom prst="flowChartAlternateProcess">
+            <a:avLst/>
+          </a:prstGeom>
+          <a:solidFill>
+            <a:schemeClr val="accent1">
+              <a:alpha val="25000"/>
+            </a:schemeClr>
+          </a:solidFill>
+          <a:ln>
+            <a:solidFill>
+              <a:schemeClr val="accent1">
+                <a:alpha val="25000"/>
+              </a:schemeClr>
+            </a:solidFill>
+          </a:ln>
+        </p:spPr>
+        <p:style>
+          <a:lnRef idx="2">
+            <a:schemeClr val="accent1">
+              <a:shade val="50000"/>
+            </a:schemeClr>
+          </a:lnRef>
+          <a:fillRef idx="1">
+            <a:schemeClr val="accent1"/>
+          </a:fillRef>
+          <a:effectRef idx="0">
+            <a:schemeClr val="accent1"/>
+          </a:effectRef>
+          <a:fontRef idx="minor">
+            <a:schemeClr val="lt1"/>
+          </a:fontRef>
+        </p:style>
+        <p:txBody>
+          <a:bodyPr rtlCol="0" anchor="ctr"/>
+          <a:lstStyle/>
+          <a:p>
+            <a:pPr algn="ctr"/>
+            <a:r>
+              <a:rPr lang="de-DE" dirty="0"/>
+              <a:t>Lage und Maße</a:t>
+            </a:r>
+            <a:endParaRPr lang="de-DE" dirty="0"/>
+          </a:p>
+        </p:txBody>
+      </p:sp>
+      <p:sp>
+        <p:nvSpPr>
+          <p:cNvPr id="6" name="Flussdiagramm: Alternativer Prozess 5"/>
+          <p:cNvSpPr/>
+          <p:nvPr/>
+        </p:nvSpPr>
+        <p:spPr>
+          <a:xfrm>
+            <a:off x="2986216" y="3748710"/>
+            <a:ext cx="2743200" cy="612648"/>
+          </a:xfrm>
+          <a:prstGeom prst="flowChartAlternateProcess">
+            <a:avLst/>
+          </a:prstGeom>
+          <a:solidFill>
+            <a:schemeClr val="accent1">
+              <a:alpha val="25000"/>
+            </a:schemeClr>
+          </a:solidFill>
+          <a:ln>
+            <a:solidFill>
+              <a:schemeClr val="accent1">
+                <a:alpha val="25000"/>
+              </a:schemeClr>
+            </a:solidFill>
+          </a:ln>
+        </p:spPr>
+        <p:style>
+          <a:lnRef idx="2">
+            <a:schemeClr val="accent1">
+              <a:shade val="50000"/>
+            </a:schemeClr>
+          </a:lnRef>
+          <a:fillRef idx="1">
+            <a:schemeClr val="accent1"/>
+          </a:fillRef>
+          <a:effectRef idx="0">
+            <a:schemeClr val="accent1"/>
+          </a:effectRef>
+          <a:fontRef idx="minor">
+            <a:schemeClr val="lt1"/>
+          </a:fontRef>
+        </p:style>
+        <p:txBody>
+          <a:bodyPr rtlCol="0" anchor="ctr"/>
+          <a:lstStyle/>
+          <a:p>
+            <a:pPr algn="ctr"/>
+            <a:r>
+              <a:rPr lang="de-DE" dirty="0"/>
+              <a:t>Bohrungen</a:t>
+            </a:r>
+            <a:endParaRPr lang="de-DE" dirty="0"/>
+          </a:p>
+        </p:txBody>
+      </p:sp>
+      <p:sp>
+        <p:nvSpPr>
+          <p:cNvPr id="7" name="Flussdiagramm: Alternativer Prozess 6"/>
+          <p:cNvSpPr/>
+          <p:nvPr/>
+        </p:nvSpPr>
+        <p:spPr>
+          <a:xfrm>
+            <a:off x="2971800" y="5105854"/>
+            <a:ext cx="2743200" cy="612648"/>
+          </a:xfrm>
+          <a:prstGeom prst="flowChartAlternateProcess">
+            <a:avLst/>
+          </a:prstGeom>
+          <a:solidFill>
+            <a:schemeClr val="accent1">
+              <a:alpha val="25000"/>
+            </a:schemeClr>
+          </a:solidFill>
+          <a:ln>
+            <a:solidFill>
+              <a:schemeClr val="accent1">
+                <a:alpha val="25000"/>
+              </a:schemeClr>
+            </a:solidFill>
+          </a:ln>
+        </p:spPr>
+        <p:style>
+          <a:lnRef idx="2">
+            <a:schemeClr val="accent1">
+              <a:shade val="50000"/>
+            </a:schemeClr>
+          </a:lnRef>
+          <a:fillRef idx="1">
+            <a:schemeClr val="accent1"/>
+          </a:fillRef>
+          <a:effectRef idx="0">
+            <a:schemeClr val="accent1"/>
+          </a:effectRef>
+          <a:fontRef idx="minor">
+            <a:schemeClr val="lt1"/>
+          </a:fontRef>
+        </p:style>
+        <p:txBody>
+          <a:bodyPr rtlCol="0" anchor="ctr"/>
+          <a:lstStyle/>
+          <a:p>
+            <a:pPr algn="ctr"/>
+            <a:r>
+              <a:rPr lang="de-DE" dirty="0" smtClean="0"/>
+              <a:t>Schäden</a:t>
+            </a:r>
+            <a:endParaRPr lang="de-DE" dirty="0"/>
+          </a:p>
+        </p:txBody>
+      </p:sp>
+      <p:cxnSp>
+        <p:nvCxnSpPr>
+          <p:cNvPr id="11" name="Gerade Verbindung mit Pfeil 10"/>
+          <p:cNvCxnSpPr>
+            <a:stCxn id="4" idx="2"/>
+            <a:endCxn id="5" idx="0"/>
+          </p:cNvCxnSpPr>
+          <p:nvPr/>
+        </p:nvCxnSpPr>
+        <p:spPr>
+          <a:xfrm>
+            <a:off x="4343400" y="1653248"/>
+            <a:ext cx="0" cy="744496"/>
+          </a:xfrm>
+          <a:prstGeom prst="straightConnector1">
+            <a:avLst/>
+          </a:prstGeom>
+          <a:ln>
+            <a:solidFill>
+              <a:schemeClr val="accent1">
+                <a:alpha val="25000"/>
+              </a:schemeClr>
+            </a:solidFill>
+            <a:tailEnd type="triangle"/>
+          </a:ln>
+        </p:spPr>
+        <p:style>
+          <a:lnRef idx="3">
+            <a:schemeClr val="accent1"/>
+          </a:lnRef>
+          <a:fillRef idx="0">
+            <a:schemeClr val="accent1"/>
+          </a:fillRef>
+          <a:effectRef idx="2">
+            <a:schemeClr val="accent1"/>
+          </a:effectRef>
+          <a:fontRef idx="minor">
+            <a:schemeClr val="tx1"/>
+          </a:fontRef>
+        </p:style>
+      </p:cxnSp>
+      <p:cxnSp>
+        <p:nvCxnSpPr>
+          <p:cNvPr id="13" name="Gerade Verbindung mit Pfeil 12"/>
+          <p:cNvCxnSpPr/>
+          <p:nvPr/>
+        </p:nvCxnSpPr>
+        <p:spPr>
+          <a:xfrm>
+            <a:off x="4343400" y="3004214"/>
+            <a:ext cx="0" cy="744496"/>
+          </a:xfrm>
+          <a:prstGeom prst="straightConnector1">
+            <a:avLst/>
+          </a:prstGeom>
+          <a:ln>
+            <a:solidFill>
+              <a:schemeClr val="accent1">
+                <a:alpha val="25000"/>
+              </a:schemeClr>
+            </a:solidFill>
+            <a:tailEnd type="triangle"/>
+          </a:ln>
+        </p:spPr>
+        <p:style>
+          <a:lnRef idx="3">
+            <a:schemeClr val="accent1"/>
+          </a:lnRef>
+          <a:fillRef idx="0">
+            <a:schemeClr val="accent1"/>
+          </a:fillRef>
+          <a:effectRef idx="2">
+            <a:schemeClr val="accent1"/>
+          </a:effectRef>
+          <a:fontRef idx="minor">
+            <a:schemeClr val="tx1"/>
+          </a:fontRef>
+        </p:style>
+      </p:cxnSp>
+      <p:cxnSp>
+        <p:nvCxnSpPr>
+          <p:cNvPr id="14" name="Gerade Verbindung mit Pfeil 13"/>
+          <p:cNvCxnSpPr/>
+          <p:nvPr/>
+        </p:nvCxnSpPr>
+        <p:spPr>
+          <a:xfrm>
+            <a:off x="4333103" y="4361358"/>
+            <a:ext cx="0" cy="744496"/>
+          </a:xfrm>
+          <a:prstGeom prst="straightConnector1">
+            <a:avLst/>
+          </a:prstGeom>
+          <a:ln>
+            <a:solidFill>
+              <a:schemeClr val="accent1">
+                <a:alpha val="25000"/>
+              </a:schemeClr>
+            </a:solidFill>
+            <a:tailEnd type="triangle"/>
+          </a:ln>
+        </p:spPr>
+        <p:style>
+          <a:lnRef idx="3">
+            <a:schemeClr val="accent1"/>
+          </a:lnRef>
+          <a:fillRef idx="0">
+            <a:schemeClr val="accent1"/>
+          </a:fillRef>
+          <a:effectRef idx="2">
+            <a:schemeClr val="accent1"/>
+          </a:effectRef>
+          <a:fontRef idx="minor">
+            <a:schemeClr val="tx1"/>
+          </a:fontRef>
+        </p:style>
+      </p:cxnSp>
     </p:spTree>
+    <p:extLst>
+      <p:ext uri="{BB962C8B-B14F-4D97-AF65-F5344CB8AC3E}">
+        <p14:creationId xmlns:p14="http://schemas.microsoft.com/office/powerpoint/2010/main" val="3187124118"/>
+      </p:ext>
+    </p:extLst>
   </p:cSld>
   <p:clrMapOvr>
     <a:masterClrMapping/>

</xml_diff>

<commit_message>
Added circle detection part
</commit_message>
<xml_diff>
--- a/Praesentation/Vorlage Präsentation.pptx
+++ b/Praesentation/Vorlage Präsentation.pptx
@@ -5,10 +5,10 @@
     <p:sldMasterId id="2147483648" r:id="rId1"/>
   </p:sldMasterIdLst>
   <p:notesMasterIdLst>
-    <p:notesMasterId r:id="rId19"/>
+    <p:notesMasterId r:id="rId24"/>
   </p:notesMasterIdLst>
   <p:handoutMasterIdLst>
-    <p:handoutMasterId r:id="rId20"/>
+    <p:handoutMasterId r:id="rId25"/>
   </p:handoutMasterIdLst>
   <p:sldIdLst>
     <p:sldId id="589" r:id="rId2"/>
@@ -25,9 +25,14 @@
     <p:sldId id="598" r:id="rId13"/>
     <p:sldId id="605" r:id="rId14"/>
     <p:sldId id="599" r:id="rId15"/>
-    <p:sldId id="606" r:id="rId16"/>
-    <p:sldId id="600" r:id="rId17"/>
-    <p:sldId id="601" r:id="rId18"/>
+    <p:sldId id="607" r:id="rId16"/>
+    <p:sldId id="608" r:id="rId17"/>
+    <p:sldId id="610" r:id="rId18"/>
+    <p:sldId id="609" r:id="rId19"/>
+    <p:sldId id="611" r:id="rId20"/>
+    <p:sldId id="606" r:id="rId21"/>
+    <p:sldId id="600" r:id="rId22"/>
+    <p:sldId id="601" r:id="rId23"/>
   </p:sldIdLst>
   <p:sldSz cx="9144000" cy="6858000" type="screen4x3"/>
   <p:notesSz cx="6797675" cy="9928225"/>
@@ -4445,16 +4450,7 @@
                 </a:solidFill>
                 <a:cs typeface="+mn-cs"/>
               </a:rPr>
-              <a:t>	</a:t>
-            </a:r>
-            <a:r>
-              <a:rPr lang="de-DE" altLang="de-DE" sz="900" b="0" dirty="0" smtClean="0">
-                <a:solidFill>
-                  <a:schemeClr val="tx1"/>
-                </a:solidFill>
-                <a:cs typeface="+mn-cs"/>
-              </a:rPr>
-              <a:t> Christoph Jost, Marcus </a:t>
+              <a:t>	 Christoph Jost, Marcus </a:t>
             </a:r>
             <a:r>
               <a:rPr lang="de-DE" altLang="de-DE" sz="900" b="0" dirty="0" err="1" smtClean="0">
@@ -6026,7 +6022,6 @@
               <a:rPr lang="de-DE" dirty="0"/>
               <a:t>Lage und Maße</a:t>
             </a:r>
-            <a:endParaRPr lang="de-DE" dirty="0"/>
           </a:p>
         </p:txBody>
       </p:sp>
@@ -6647,7 +6642,6 @@
               <a:rPr lang="de-DE" dirty="0"/>
               <a:t>Lage und Maße</a:t>
             </a:r>
-            <a:endParaRPr lang="de-DE" dirty="0"/>
           </a:p>
         </p:txBody>
       </p:sp>
@@ -6930,7 +6924,7 @@
           <a:p>
             <a:r>
               <a:rPr lang="de-DE" dirty="0" smtClean="0"/>
-              <a:t>Prüfen der Bohrungen</a:t>
+              <a:t>Bohrungspositionen</a:t>
             </a:r>
             <a:endParaRPr lang="de-DE" dirty="0"/>
           </a:p>
@@ -6951,7 +6945,441 @@
           <a:bodyPr/>
           <a:lstStyle/>
           <a:p>
+            <a:r>
+              <a:rPr lang="de-DE" dirty="0" smtClean="0"/>
+              <a:t>Berechnung der Bohrungspositionen </a:t>
+            </a:r>
+            <a:r>
+              <a:rPr lang="de-DE" dirty="0"/>
+              <a:t>anhand Rechteck-Eckpunktekorrekten </a:t>
+            </a:r>
             <a:endParaRPr lang="de-DE" dirty="0"/>
+          </a:p>
+        </p:txBody>
+      </p:sp>
+      <p:pic>
+        <p:nvPicPr>
+          <p:cNvPr id="4" name="Grafik 3" descr="Perfekt3.png"/>
+          <p:cNvPicPr>
+            <a:picLocks noChangeAspect="1"/>
+          </p:cNvPicPr>
+          <p:nvPr/>
+        </p:nvPicPr>
+        <p:blipFill>
+          <a:blip r:embed="rId2"/>
+          <a:stretch>
+            <a:fillRect/>
+          </a:stretch>
+        </p:blipFill>
+        <p:spPr>
+          <a:xfrm flipH="1">
+            <a:off x="762000" y="2232658"/>
+            <a:ext cx="3048000" cy="3025817"/>
+          </a:xfrm>
+          <a:prstGeom prst="rect">
+            <a:avLst/>
+          </a:prstGeom>
+        </p:spPr>
+      </p:pic>
+      <p:sp>
+        <p:nvSpPr>
+          <p:cNvPr id="5" name="Rechteck 4"/>
+          <p:cNvSpPr/>
+          <p:nvPr/>
+        </p:nvSpPr>
+        <p:spPr>
+          <a:xfrm>
+            <a:off x="4648200" y="2362200"/>
+            <a:ext cx="2743200" cy="2743200"/>
+          </a:xfrm>
+          <a:prstGeom prst="rect">
+            <a:avLst/>
+          </a:prstGeom>
+          <a:noFill/>
+          <a:ln w="38100"/>
+        </p:spPr>
+        <p:style>
+          <a:lnRef idx="2">
+            <a:schemeClr val="accent1">
+              <a:shade val="50000"/>
+            </a:schemeClr>
+          </a:lnRef>
+          <a:fillRef idx="1">
+            <a:schemeClr val="accent1"/>
+          </a:fillRef>
+          <a:effectRef idx="0">
+            <a:schemeClr val="accent1"/>
+          </a:effectRef>
+          <a:fontRef idx="minor">
+            <a:schemeClr val="lt1"/>
+          </a:fontRef>
+        </p:style>
+        <p:txBody>
+          <a:bodyPr rtlCol="0" anchor="ctr"/>
+          <a:lstStyle/>
+          <a:p>
+            <a:pPr algn="ctr"/>
+            <a:endParaRPr lang="de-DE"/>
+          </a:p>
+        </p:txBody>
+      </p:sp>
+      <p:sp>
+        <p:nvSpPr>
+          <p:cNvPr id="6" name="Ellipse 5"/>
+          <p:cNvSpPr/>
+          <p:nvPr/>
+        </p:nvSpPr>
+        <p:spPr>
+          <a:xfrm>
+            <a:off x="5029200" y="2697481"/>
+            <a:ext cx="45719" cy="45719"/>
+          </a:xfrm>
+          <a:prstGeom prst="ellipse">
+            <a:avLst/>
+          </a:prstGeom>
+        </p:spPr>
+        <p:style>
+          <a:lnRef idx="2">
+            <a:schemeClr val="accent1">
+              <a:shade val="50000"/>
+            </a:schemeClr>
+          </a:lnRef>
+          <a:fillRef idx="1">
+            <a:schemeClr val="accent1"/>
+          </a:fillRef>
+          <a:effectRef idx="0">
+            <a:schemeClr val="accent1"/>
+          </a:effectRef>
+          <a:fontRef idx="minor">
+            <a:schemeClr val="lt1"/>
+          </a:fontRef>
+        </p:style>
+        <p:txBody>
+          <a:bodyPr rtlCol="0" anchor="ctr"/>
+          <a:lstStyle/>
+          <a:p>
+            <a:pPr algn="ctr"/>
+            <a:endParaRPr lang="de-DE"/>
+          </a:p>
+        </p:txBody>
+      </p:sp>
+      <p:sp>
+        <p:nvSpPr>
+          <p:cNvPr id="7" name="Ellipse 6"/>
+          <p:cNvSpPr/>
+          <p:nvPr/>
+        </p:nvSpPr>
+        <p:spPr>
+          <a:xfrm>
+            <a:off x="6991349" y="2697481"/>
+            <a:ext cx="45719" cy="45719"/>
+          </a:xfrm>
+          <a:prstGeom prst="ellipse">
+            <a:avLst/>
+          </a:prstGeom>
+        </p:spPr>
+        <p:style>
+          <a:lnRef idx="2">
+            <a:schemeClr val="accent1">
+              <a:shade val="50000"/>
+            </a:schemeClr>
+          </a:lnRef>
+          <a:fillRef idx="1">
+            <a:schemeClr val="accent1"/>
+          </a:fillRef>
+          <a:effectRef idx="0">
+            <a:schemeClr val="accent1"/>
+          </a:effectRef>
+          <a:fontRef idx="minor">
+            <a:schemeClr val="lt1"/>
+          </a:fontRef>
+        </p:style>
+        <p:txBody>
+          <a:bodyPr rtlCol="0" anchor="ctr"/>
+          <a:lstStyle/>
+          <a:p>
+            <a:pPr algn="ctr"/>
+            <a:endParaRPr lang="de-DE"/>
+          </a:p>
+        </p:txBody>
+      </p:sp>
+      <p:sp>
+        <p:nvSpPr>
+          <p:cNvPr id="8" name="Ellipse 7"/>
+          <p:cNvSpPr/>
+          <p:nvPr/>
+        </p:nvSpPr>
+        <p:spPr>
+          <a:xfrm>
+            <a:off x="5029200" y="4754881"/>
+            <a:ext cx="45719" cy="45719"/>
+          </a:xfrm>
+          <a:prstGeom prst="ellipse">
+            <a:avLst/>
+          </a:prstGeom>
+        </p:spPr>
+        <p:style>
+          <a:lnRef idx="2">
+            <a:schemeClr val="accent1">
+              <a:shade val="50000"/>
+            </a:schemeClr>
+          </a:lnRef>
+          <a:fillRef idx="1">
+            <a:schemeClr val="accent1"/>
+          </a:fillRef>
+          <a:effectRef idx="0">
+            <a:schemeClr val="accent1"/>
+          </a:effectRef>
+          <a:fontRef idx="minor">
+            <a:schemeClr val="lt1"/>
+          </a:fontRef>
+        </p:style>
+        <p:txBody>
+          <a:bodyPr rtlCol="0" anchor="ctr"/>
+          <a:lstStyle/>
+          <a:p>
+            <a:pPr algn="ctr"/>
+            <a:endParaRPr lang="de-DE"/>
+          </a:p>
+        </p:txBody>
+      </p:sp>
+      <p:sp>
+        <p:nvSpPr>
+          <p:cNvPr id="9" name="Ellipse 8"/>
+          <p:cNvSpPr/>
+          <p:nvPr/>
+        </p:nvSpPr>
+        <p:spPr>
+          <a:xfrm>
+            <a:off x="6987540" y="4754882"/>
+            <a:ext cx="45719" cy="45719"/>
+          </a:xfrm>
+          <a:prstGeom prst="ellipse">
+            <a:avLst/>
+          </a:prstGeom>
+        </p:spPr>
+        <p:style>
+          <a:lnRef idx="2">
+            <a:schemeClr val="accent1">
+              <a:shade val="50000"/>
+            </a:schemeClr>
+          </a:lnRef>
+          <a:fillRef idx="1">
+            <a:schemeClr val="accent1"/>
+          </a:fillRef>
+          <a:effectRef idx="0">
+            <a:schemeClr val="accent1"/>
+          </a:effectRef>
+          <a:fontRef idx="minor">
+            <a:schemeClr val="lt1"/>
+          </a:fontRef>
+        </p:style>
+        <p:txBody>
+          <a:bodyPr rtlCol="0" anchor="ctr"/>
+          <a:lstStyle/>
+          <a:p>
+            <a:pPr algn="ctr"/>
+            <a:endParaRPr lang="de-DE"/>
+          </a:p>
+        </p:txBody>
+      </p:sp>
+      <p:sp>
+        <p:nvSpPr>
+          <p:cNvPr id="10" name="Ellipse 9"/>
+          <p:cNvSpPr/>
+          <p:nvPr/>
+        </p:nvSpPr>
+        <p:spPr>
+          <a:xfrm>
+            <a:off x="5985194" y="3581400"/>
+            <a:ext cx="45719" cy="45719"/>
+          </a:xfrm>
+          <a:prstGeom prst="ellipse">
+            <a:avLst/>
+          </a:prstGeom>
+        </p:spPr>
+        <p:style>
+          <a:lnRef idx="2">
+            <a:schemeClr val="accent1">
+              <a:shade val="50000"/>
+            </a:schemeClr>
+          </a:lnRef>
+          <a:fillRef idx="1">
+            <a:schemeClr val="accent1"/>
+          </a:fillRef>
+          <a:effectRef idx="0">
+            <a:schemeClr val="accent1"/>
+          </a:effectRef>
+          <a:fontRef idx="minor">
+            <a:schemeClr val="lt1"/>
+          </a:fontRef>
+        </p:style>
+        <p:txBody>
+          <a:bodyPr rtlCol="0" anchor="ctr"/>
+          <a:lstStyle/>
+          <a:p>
+            <a:pPr algn="ctr"/>
+            <a:endParaRPr lang="de-DE"/>
+          </a:p>
+        </p:txBody>
+      </p:sp>
+      <p:sp>
+        <p:nvSpPr>
+          <p:cNvPr id="11" name="Ellipse 10"/>
+          <p:cNvSpPr/>
+          <p:nvPr/>
+        </p:nvSpPr>
+        <p:spPr>
+          <a:xfrm>
+            <a:off x="5985193" y="3810000"/>
+            <a:ext cx="45719" cy="45719"/>
+          </a:xfrm>
+          <a:prstGeom prst="ellipse">
+            <a:avLst/>
+          </a:prstGeom>
+        </p:spPr>
+        <p:style>
+          <a:lnRef idx="2">
+            <a:schemeClr val="accent1">
+              <a:shade val="50000"/>
+            </a:schemeClr>
+          </a:lnRef>
+          <a:fillRef idx="1">
+            <a:schemeClr val="accent1"/>
+          </a:fillRef>
+          <a:effectRef idx="0">
+            <a:schemeClr val="accent1"/>
+          </a:effectRef>
+          <a:fontRef idx="minor">
+            <a:schemeClr val="lt1"/>
+          </a:fontRef>
+        </p:style>
+        <p:txBody>
+          <a:bodyPr rtlCol="0" anchor="ctr"/>
+          <a:lstStyle/>
+          <a:p>
+            <a:pPr algn="ctr"/>
+            <a:endParaRPr lang="de-DE"/>
+          </a:p>
+        </p:txBody>
+      </p:sp>
+      <p:sp>
+        <p:nvSpPr>
+          <p:cNvPr id="12" name="Ellipse 11"/>
+          <p:cNvSpPr/>
+          <p:nvPr/>
+        </p:nvSpPr>
+        <p:spPr>
+          <a:xfrm>
+            <a:off x="5867400" y="3699848"/>
+            <a:ext cx="45719" cy="45719"/>
+          </a:xfrm>
+          <a:prstGeom prst="ellipse">
+            <a:avLst/>
+          </a:prstGeom>
+        </p:spPr>
+        <p:style>
+          <a:lnRef idx="2">
+            <a:schemeClr val="accent1">
+              <a:shade val="50000"/>
+            </a:schemeClr>
+          </a:lnRef>
+          <a:fillRef idx="1">
+            <a:schemeClr val="accent1"/>
+          </a:fillRef>
+          <a:effectRef idx="0">
+            <a:schemeClr val="accent1"/>
+          </a:effectRef>
+          <a:fontRef idx="minor">
+            <a:schemeClr val="lt1"/>
+          </a:fontRef>
+        </p:style>
+        <p:txBody>
+          <a:bodyPr rtlCol="0" anchor="ctr"/>
+          <a:lstStyle/>
+          <a:p>
+            <a:pPr algn="ctr"/>
+            <a:endParaRPr lang="de-DE"/>
+          </a:p>
+        </p:txBody>
+      </p:sp>
+      <p:sp>
+        <p:nvSpPr>
+          <p:cNvPr id="13" name="Ellipse 12"/>
+          <p:cNvSpPr/>
+          <p:nvPr/>
+        </p:nvSpPr>
+        <p:spPr>
+          <a:xfrm>
+            <a:off x="6096000" y="3699848"/>
+            <a:ext cx="45719" cy="45719"/>
+          </a:xfrm>
+          <a:prstGeom prst="ellipse">
+            <a:avLst/>
+          </a:prstGeom>
+        </p:spPr>
+        <p:style>
+          <a:lnRef idx="2">
+            <a:schemeClr val="accent1">
+              <a:shade val="50000"/>
+            </a:schemeClr>
+          </a:lnRef>
+          <a:fillRef idx="1">
+            <a:schemeClr val="accent1"/>
+          </a:fillRef>
+          <a:effectRef idx="0">
+            <a:schemeClr val="accent1"/>
+          </a:effectRef>
+          <a:fontRef idx="minor">
+            <a:schemeClr val="lt1"/>
+          </a:fontRef>
+        </p:style>
+        <p:txBody>
+          <a:bodyPr rtlCol="0" anchor="ctr"/>
+          <a:lstStyle/>
+          <a:p>
+            <a:pPr algn="ctr"/>
+            <a:endParaRPr lang="de-DE"/>
+          </a:p>
+        </p:txBody>
+      </p:sp>
+      <p:sp>
+        <p:nvSpPr>
+          <p:cNvPr id="14" name="Pfeil nach rechts 13"/>
+          <p:cNvSpPr/>
+          <p:nvPr/>
+        </p:nvSpPr>
+        <p:spPr>
+          <a:xfrm>
+            <a:off x="3977640" y="3516966"/>
+            <a:ext cx="381000" cy="411481"/>
+          </a:xfrm>
+          <a:prstGeom prst="rightArrow">
+            <a:avLst/>
+          </a:prstGeom>
+        </p:spPr>
+        <p:style>
+          <a:lnRef idx="2">
+            <a:schemeClr val="accent1">
+              <a:shade val="50000"/>
+            </a:schemeClr>
+          </a:lnRef>
+          <a:fillRef idx="1">
+            <a:schemeClr val="accent1"/>
+          </a:fillRef>
+          <a:effectRef idx="0">
+            <a:schemeClr val="accent1"/>
+          </a:effectRef>
+          <a:fontRef idx="minor">
+            <a:schemeClr val="lt1"/>
+          </a:fontRef>
+        </p:style>
+        <p:txBody>
+          <a:bodyPr rtlCol="0" anchor="ctr"/>
+          <a:lstStyle/>
+          <a:p>
+            <a:pPr algn="ctr"/>
+            <a:endParaRPr lang="de-DE"/>
           </a:p>
         </p:txBody>
       </p:sp>
@@ -7004,7 +7432,7 @@
           <a:p>
             <a:r>
               <a:rPr lang="de-DE" dirty="0" smtClean="0"/>
-              <a:t>Programm-Ablauf</a:t>
+              <a:t>Bohrungsdetektion</a:t>
             </a:r>
             <a:endParaRPr lang="de-DE" dirty="0"/>
           </a:p>
@@ -7012,31 +7440,106 @@
       </p:sp>
       <p:sp>
         <p:nvSpPr>
-          <p:cNvPr id="4" name="Flussdiagramm: Alternativer Prozess 3"/>
+          <p:cNvPr id="3" name="Inhaltsplatzhalter 2"/>
+          <p:cNvSpPr>
+            <a:spLocks noGrp="1"/>
+          </p:cNvSpPr>
+          <p:nvPr>
+            <p:ph idx="1"/>
+          </p:nvPr>
+        </p:nvSpPr>
+        <p:spPr/>
+        <p:txBody>
+          <a:bodyPr/>
+          <a:lstStyle/>
+          <a:p>
+            <a:r>
+              <a:rPr lang="de-DE" dirty="0" smtClean="0"/>
+              <a:t>Anwendung eines Gauß-Filters</a:t>
+            </a:r>
+          </a:p>
+          <a:p>
+            <a:pPr lvl="1"/>
+            <a:r>
+              <a:rPr lang="de-DE" dirty="0" smtClean="0"/>
+              <a:t>Rauschentfernung</a:t>
+            </a:r>
+            <a:endParaRPr lang="de-DE" dirty="0"/>
+          </a:p>
+        </p:txBody>
+      </p:sp>
+      <p:pic>
+        <p:nvPicPr>
+          <p:cNvPr id="16" name="Grafik 15"/>
+          <p:cNvPicPr>
+            <a:picLocks noChangeAspect="1"/>
+          </p:cNvPicPr>
+          <p:nvPr/>
+        </p:nvPicPr>
+        <p:blipFill rotWithShape="1">
+          <a:blip r:embed="rId2">
+            <a:extLst>
+              <a:ext uri="{28A0092B-C50C-407E-A947-70E740481C1C}">
+                <a14:useLocalDpi xmlns:a14="http://schemas.microsoft.com/office/drawing/2010/main" val="0"/>
+              </a:ext>
+            </a:extLst>
+          </a:blip>
+          <a:srcRect l="34215" t="16164" r="11647" b="5403"/>
+          <a:stretch/>
+        </p:blipFill>
+        <p:spPr>
+          <a:xfrm>
+            <a:off x="298382" y="2225833"/>
+            <a:ext cx="3657600" cy="3327717"/>
+          </a:xfrm>
+          <a:prstGeom prst="rect">
+            <a:avLst/>
+          </a:prstGeom>
+        </p:spPr>
+      </p:pic>
+      <p:pic>
+        <p:nvPicPr>
+          <p:cNvPr id="17" name="Grafik 16"/>
+          <p:cNvPicPr>
+            <a:picLocks noChangeAspect="1"/>
+          </p:cNvPicPr>
+          <p:nvPr/>
+        </p:nvPicPr>
+        <p:blipFill rotWithShape="1">
+          <a:blip r:embed="rId3">
+            <a:extLst>
+              <a:ext uri="{28A0092B-C50C-407E-A947-70E740481C1C}">
+                <a14:useLocalDpi xmlns:a14="http://schemas.microsoft.com/office/drawing/2010/main" val="0"/>
+              </a:ext>
+            </a:extLst>
+          </a:blip>
+          <a:srcRect l="17500" t="14095" r="15833" b="3671"/>
+          <a:stretch/>
+        </p:blipFill>
+        <p:spPr>
+          <a:xfrm>
+            <a:off x="4803842" y="2225832"/>
+            <a:ext cx="3749541" cy="3327717"/>
+          </a:xfrm>
+          <a:prstGeom prst="rect">
+            <a:avLst/>
+          </a:prstGeom>
+        </p:spPr>
+      </p:pic>
+      <p:sp>
+        <p:nvSpPr>
+          <p:cNvPr id="20" name="Pfeil nach rechts 19"/>
           <p:cNvSpPr/>
           <p:nvPr/>
         </p:nvSpPr>
         <p:spPr>
           <a:xfrm>
-            <a:off x="2971800" y="1040600"/>
-            <a:ext cx="2743200" cy="612648"/>
-          </a:xfrm>
-          <a:prstGeom prst="flowChartAlternateProcess">
+            <a:off x="4189412" y="3538377"/>
+            <a:ext cx="381000" cy="411481"/>
+          </a:xfrm>
+          <a:prstGeom prst="rightArrow">
             <a:avLst/>
           </a:prstGeom>
-          <a:solidFill>
-            <a:schemeClr val="accent1">
-              <a:alpha val="25000"/>
-            </a:schemeClr>
-          </a:solidFill>
-          <a:ln>
-            <a:solidFill>
-              <a:schemeClr val="accent1">
-                <a:shade val="50000"/>
-                <a:alpha val="25000"/>
-              </a:schemeClr>
-            </a:solidFill>
-          </a:ln>
         </p:spPr>
         <p:style>
           <a:lnRef idx="2">
@@ -7059,299 +7562,14 @@
           <a:lstStyle/>
           <a:p>
             <a:pPr algn="ctr"/>
-            <a:r>
-              <a:rPr lang="de-DE" dirty="0" smtClean="0"/>
-              <a:t>Kalibrierung</a:t>
-            </a:r>
-            <a:endParaRPr lang="de-DE" dirty="0"/>
+            <a:endParaRPr lang="de-DE"/>
           </a:p>
         </p:txBody>
       </p:sp>
-      <p:sp>
-        <p:nvSpPr>
-          <p:cNvPr id="5" name="Flussdiagramm: Alternativer Prozess 4"/>
-          <p:cNvSpPr/>
-          <p:nvPr/>
-        </p:nvSpPr>
-        <p:spPr>
-          <a:xfrm>
-            <a:off x="2971800" y="2397744"/>
-            <a:ext cx="2743200" cy="612648"/>
-          </a:xfrm>
-          <a:prstGeom prst="flowChartAlternateProcess">
-            <a:avLst/>
-          </a:prstGeom>
-          <a:solidFill>
-            <a:schemeClr val="accent1">
-              <a:alpha val="25000"/>
-            </a:schemeClr>
-          </a:solidFill>
-          <a:ln>
-            <a:solidFill>
-              <a:schemeClr val="accent1">
-                <a:alpha val="25000"/>
-              </a:schemeClr>
-            </a:solidFill>
-          </a:ln>
-        </p:spPr>
-        <p:style>
-          <a:lnRef idx="2">
-            <a:schemeClr val="accent1">
-              <a:shade val="50000"/>
-            </a:schemeClr>
-          </a:lnRef>
-          <a:fillRef idx="1">
-            <a:schemeClr val="accent1"/>
-          </a:fillRef>
-          <a:effectRef idx="0">
-            <a:schemeClr val="accent1"/>
-          </a:effectRef>
-          <a:fontRef idx="minor">
-            <a:schemeClr val="lt1"/>
-          </a:fontRef>
-        </p:style>
-        <p:txBody>
-          <a:bodyPr rtlCol="0" anchor="ctr"/>
-          <a:lstStyle/>
-          <a:p>
-            <a:pPr algn="ctr"/>
-            <a:r>
-              <a:rPr lang="de-DE" dirty="0"/>
-              <a:t>Lage und Maße</a:t>
-            </a:r>
-            <a:endParaRPr lang="de-DE" dirty="0"/>
-          </a:p>
-        </p:txBody>
-      </p:sp>
-      <p:sp>
-        <p:nvSpPr>
-          <p:cNvPr id="6" name="Flussdiagramm: Alternativer Prozess 5"/>
-          <p:cNvSpPr/>
-          <p:nvPr/>
-        </p:nvSpPr>
-        <p:spPr>
-          <a:xfrm>
-            <a:off x="2986216" y="3748710"/>
-            <a:ext cx="2743200" cy="612648"/>
-          </a:xfrm>
-          <a:prstGeom prst="flowChartAlternateProcess">
-            <a:avLst/>
-          </a:prstGeom>
-          <a:solidFill>
-            <a:schemeClr val="accent1">
-              <a:alpha val="25000"/>
-            </a:schemeClr>
-          </a:solidFill>
-          <a:ln>
-            <a:solidFill>
-              <a:schemeClr val="accent1">
-                <a:alpha val="25000"/>
-              </a:schemeClr>
-            </a:solidFill>
-          </a:ln>
-        </p:spPr>
-        <p:style>
-          <a:lnRef idx="2">
-            <a:schemeClr val="accent1">
-              <a:shade val="50000"/>
-            </a:schemeClr>
-          </a:lnRef>
-          <a:fillRef idx="1">
-            <a:schemeClr val="accent1"/>
-          </a:fillRef>
-          <a:effectRef idx="0">
-            <a:schemeClr val="accent1"/>
-          </a:effectRef>
-          <a:fontRef idx="minor">
-            <a:schemeClr val="lt1"/>
-          </a:fontRef>
-        </p:style>
-        <p:txBody>
-          <a:bodyPr rtlCol="0" anchor="ctr"/>
-          <a:lstStyle/>
-          <a:p>
-            <a:pPr algn="ctr"/>
-            <a:r>
-              <a:rPr lang="de-DE" dirty="0" smtClean="0"/>
-              <a:t>Bohrungen</a:t>
-            </a:r>
-            <a:endParaRPr lang="de-DE" dirty="0"/>
-          </a:p>
-        </p:txBody>
-      </p:sp>
-      <p:sp>
-        <p:nvSpPr>
-          <p:cNvPr id="7" name="Flussdiagramm: Alternativer Prozess 6"/>
-          <p:cNvSpPr/>
-          <p:nvPr/>
-        </p:nvSpPr>
-        <p:spPr>
-          <a:xfrm>
-            <a:off x="2971800" y="5105854"/>
-            <a:ext cx="2743200" cy="612648"/>
-          </a:xfrm>
-          <a:prstGeom prst="flowChartAlternateProcess">
-            <a:avLst/>
-          </a:prstGeom>
-          <a:solidFill>
-            <a:schemeClr val="accent1"/>
-          </a:solidFill>
-          <a:ln>
-            <a:solidFill>
-              <a:schemeClr val="accent1"/>
-            </a:solidFill>
-          </a:ln>
-        </p:spPr>
-        <p:style>
-          <a:lnRef idx="2">
-            <a:schemeClr val="accent1">
-              <a:shade val="50000"/>
-            </a:schemeClr>
-          </a:lnRef>
-          <a:fillRef idx="1">
-            <a:schemeClr val="accent1"/>
-          </a:fillRef>
-          <a:effectRef idx="0">
-            <a:schemeClr val="accent1"/>
-          </a:effectRef>
-          <a:fontRef idx="minor">
-            <a:schemeClr val="lt1"/>
-          </a:fontRef>
-        </p:style>
-        <p:txBody>
-          <a:bodyPr rtlCol="0" anchor="ctr"/>
-          <a:lstStyle/>
-          <a:p>
-            <a:pPr algn="ctr"/>
-            <a:r>
-              <a:rPr lang="de-DE" dirty="0" smtClean="0"/>
-              <a:t>Schäden</a:t>
-            </a:r>
-            <a:endParaRPr lang="de-DE" dirty="0"/>
-          </a:p>
-        </p:txBody>
-      </p:sp>
-      <p:cxnSp>
-        <p:nvCxnSpPr>
-          <p:cNvPr id="11" name="Gerade Verbindung mit Pfeil 10"/>
-          <p:cNvCxnSpPr>
-            <a:stCxn id="4" idx="2"/>
-            <a:endCxn id="5" idx="0"/>
-          </p:cNvCxnSpPr>
-          <p:nvPr/>
-        </p:nvCxnSpPr>
-        <p:spPr>
-          <a:xfrm>
-            <a:off x="4343400" y="1653248"/>
-            <a:ext cx="0" cy="744496"/>
-          </a:xfrm>
-          <a:prstGeom prst="straightConnector1">
-            <a:avLst/>
-          </a:prstGeom>
-          <a:ln>
-            <a:solidFill>
-              <a:schemeClr val="accent1">
-                <a:alpha val="25000"/>
-              </a:schemeClr>
-            </a:solidFill>
-            <a:tailEnd type="triangle"/>
-          </a:ln>
-        </p:spPr>
-        <p:style>
-          <a:lnRef idx="3">
-            <a:schemeClr val="accent1"/>
-          </a:lnRef>
-          <a:fillRef idx="0">
-            <a:schemeClr val="accent1"/>
-          </a:fillRef>
-          <a:effectRef idx="2">
-            <a:schemeClr val="accent1"/>
-          </a:effectRef>
-          <a:fontRef idx="minor">
-            <a:schemeClr val="tx1"/>
-          </a:fontRef>
-        </p:style>
-      </p:cxnSp>
-      <p:cxnSp>
-        <p:nvCxnSpPr>
-          <p:cNvPr id="13" name="Gerade Verbindung mit Pfeil 12"/>
-          <p:cNvCxnSpPr/>
-          <p:nvPr/>
-        </p:nvCxnSpPr>
-        <p:spPr>
-          <a:xfrm>
-            <a:off x="4343400" y="3004214"/>
-            <a:ext cx="0" cy="744496"/>
-          </a:xfrm>
-          <a:prstGeom prst="straightConnector1">
-            <a:avLst/>
-          </a:prstGeom>
-          <a:ln>
-            <a:solidFill>
-              <a:schemeClr val="accent1">
-                <a:alpha val="25000"/>
-              </a:schemeClr>
-            </a:solidFill>
-            <a:tailEnd type="triangle"/>
-          </a:ln>
-        </p:spPr>
-        <p:style>
-          <a:lnRef idx="3">
-            <a:schemeClr val="accent1"/>
-          </a:lnRef>
-          <a:fillRef idx="0">
-            <a:schemeClr val="accent1"/>
-          </a:fillRef>
-          <a:effectRef idx="2">
-            <a:schemeClr val="accent1"/>
-          </a:effectRef>
-          <a:fontRef idx="minor">
-            <a:schemeClr val="tx1"/>
-          </a:fontRef>
-        </p:style>
-      </p:cxnSp>
-      <p:cxnSp>
-        <p:nvCxnSpPr>
-          <p:cNvPr id="14" name="Gerade Verbindung mit Pfeil 13"/>
-          <p:cNvCxnSpPr/>
-          <p:nvPr/>
-        </p:nvCxnSpPr>
-        <p:spPr>
-          <a:xfrm>
-            <a:off x="4333103" y="4361358"/>
-            <a:ext cx="0" cy="744496"/>
-          </a:xfrm>
-          <a:prstGeom prst="straightConnector1">
-            <a:avLst/>
-          </a:prstGeom>
-          <a:ln>
-            <a:solidFill>
-              <a:schemeClr val="accent1">
-                <a:alpha val="25000"/>
-              </a:schemeClr>
-            </a:solidFill>
-            <a:tailEnd type="triangle"/>
-          </a:ln>
-        </p:spPr>
-        <p:style>
-          <a:lnRef idx="3">
-            <a:schemeClr val="accent1"/>
-          </a:lnRef>
-          <a:fillRef idx="0">
-            <a:schemeClr val="accent1"/>
-          </a:fillRef>
-          <a:effectRef idx="2">
-            <a:schemeClr val="accent1"/>
-          </a:effectRef>
-          <a:fontRef idx="minor">
-            <a:schemeClr val="tx1"/>
-          </a:fontRef>
-        </p:style>
-      </p:cxnSp>
     </p:spTree>
     <p:extLst>
       <p:ext uri="{BB962C8B-B14F-4D97-AF65-F5344CB8AC3E}">
-        <p14:creationId xmlns:p14="http://schemas.microsoft.com/office/powerpoint/2010/main" val="1212497302"/>
+        <p14:creationId xmlns:p14="http://schemas.microsoft.com/office/powerpoint/2010/main" val="3604075679"/>
       </p:ext>
     </p:extLst>
   </p:cSld>
@@ -7401,8 +7619,8 @@
           <a:lstStyle/>
           <a:p>
             <a:r>
-              <a:rPr lang="de-DE" dirty="0" smtClean="0"/>
-              <a:t>Prüfen auf Beschädigungen</a:t>
+              <a:rPr lang="de-DE" dirty="0"/>
+              <a:t>Bohrungsdetektion</a:t>
             </a:r>
             <a:endParaRPr lang="de-DE" dirty="0"/>
           </a:p>
@@ -7425,66 +7643,54 @@
           <a:p>
             <a:r>
               <a:rPr lang="de-DE" dirty="0" smtClean="0"/>
-              <a:t>Maskieren des Werkstücks</a:t>
-            </a:r>
-          </a:p>
-          <a:p>
+              <a:t>Entfernung von Hintergrund mittels Schwellwert</a:t>
+            </a:r>
+          </a:p>
+          <a:p>
+            <a:pPr lvl="1"/>
             <a:r>
               <a:rPr lang="de-DE" dirty="0" smtClean="0"/>
-              <a:t>Filtern</a:t>
-            </a:r>
-          </a:p>
-          <a:p>
-            <a:pPr lvl="1"/>
-            <a:r>
-              <a:rPr lang="de-DE" dirty="0" err="1" smtClean="0"/>
-              <a:t>Guided</a:t>
-            </a:r>
-            <a:r>
-              <a:rPr lang="de-DE" dirty="0" smtClean="0"/>
-              <a:t> Image Filter</a:t>
-            </a:r>
-          </a:p>
-          <a:p>
-            <a:r>
-              <a:rPr lang="de-DE" dirty="0" smtClean="0"/>
-              <a:t>Kantendetektion mit </a:t>
-            </a:r>
-            <a:r>
-              <a:rPr lang="de-DE" dirty="0" err="1" smtClean="0"/>
-              <a:t>Canny</a:t>
-            </a:r>
-            <a:endParaRPr lang="de-DE" dirty="0" smtClean="0"/>
-          </a:p>
-          <a:p>
-            <a:r>
-              <a:rPr lang="de-DE" dirty="0" smtClean="0"/>
-              <a:t>Kanten und Bohrungen entfernen</a:t>
-            </a:r>
-          </a:p>
-          <a:p>
-            <a:r>
-              <a:rPr lang="de-DE" dirty="0" smtClean="0"/>
-              <a:t>Cluster finden</a:t>
-            </a:r>
-          </a:p>
-          <a:p>
-            <a:r>
-              <a:rPr lang="de-DE" dirty="0" smtClean="0"/>
-              <a:t>Zusätzlich: Überprüfung des Stegs</a:t>
-            </a:r>
-          </a:p>
-          <a:p>
-            <a:pPr lvl="1"/>
-            <a:r>
-              <a:rPr lang="de-DE" dirty="0" err="1" smtClean="0"/>
-              <a:t>Threshold</a:t>
+              <a:t>Bessere Erkennung von Bohrungen</a:t>
             </a:r>
             <a:endParaRPr lang="de-DE" dirty="0"/>
           </a:p>
         </p:txBody>
       </p:sp>
+      <p:pic>
+        <p:nvPicPr>
+          <p:cNvPr id="18" name="Grafik 17"/>
+          <p:cNvPicPr>
+            <a:picLocks noChangeAspect="1"/>
+          </p:cNvPicPr>
+          <p:nvPr/>
+        </p:nvPicPr>
+        <p:blipFill rotWithShape="1">
+          <a:blip r:embed="rId2">
+            <a:extLst>
+              <a:ext uri="{28A0092B-C50C-407E-A947-70E740481C1C}">
+                <a14:useLocalDpi xmlns:a14="http://schemas.microsoft.com/office/drawing/2010/main" val="0"/>
+              </a:ext>
+            </a:extLst>
+          </a:blip>
+          <a:srcRect l="15834" t="11170" r="14166" b="3088"/>
+          <a:stretch/>
+        </p:blipFill>
+        <p:spPr>
+          <a:xfrm>
+            <a:off x="2133600" y="2133600"/>
+            <a:ext cx="4267200" cy="3899694"/>
+          </a:xfrm>
+          <a:prstGeom prst="rect">
+            <a:avLst/>
+          </a:prstGeom>
+        </p:spPr>
+      </p:pic>
     </p:spTree>
+    <p:extLst>
+      <p:ext uri="{BB962C8B-B14F-4D97-AF65-F5344CB8AC3E}">
+        <p14:creationId xmlns:p14="http://schemas.microsoft.com/office/powerpoint/2010/main" val="901032271"/>
+      </p:ext>
+    </p:extLst>
   </p:cSld>
   <p:clrMapOvr>
     <a:masterClrMapping/>
@@ -7526,28 +7732,571 @@
             <p:ph type="title"/>
           </p:nvPr>
         </p:nvSpPr>
-        <p:spPr>
-          <a:xfrm>
-            <a:off x="1905000" y="2895600"/>
-            <a:ext cx="6911975" cy="693737"/>
-          </a:xfrm>
-        </p:spPr>
+        <p:spPr/>
         <p:txBody>
           <a:bodyPr/>
           <a:lstStyle/>
           <a:p>
             <a:r>
-              <a:rPr lang="de-DE" sz="6000" dirty="0" smtClean="0"/>
-              <a:t>Vorführung</a:t>
-            </a:r>
-            <a:endParaRPr lang="de-DE" sz="6000" dirty="0"/>
+              <a:rPr lang="de-DE" dirty="0"/>
+              <a:t>Bohrungsdetektion</a:t>
+            </a:r>
+            <a:endParaRPr lang="de-DE" dirty="0"/>
           </a:p>
         </p:txBody>
       </p:sp>
+      <p:sp>
+        <p:nvSpPr>
+          <p:cNvPr id="3" name="Inhaltsplatzhalter 2"/>
+          <p:cNvSpPr>
+            <a:spLocks noGrp="1"/>
+          </p:cNvSpPr>
+          <p:nvPr>
+            <p:ph idx="1"/>
+          </p:nvPr>
+        </p:nvSpPr>
+        <p:spPr/>
+        <p:txBody>
+          <a:bodyPr/>
+          <a:lstStyle/>
+          <a:p>
+            <a:r>
+              <a:rPr lang="de-DE" dirty="0" smtClean="0"/>
+              <a:t>Maskierung pro erwarteter Bohrungsposition</a:t>
+            </a:r>
+          </a:p>
+          <a:p>
+            <a:pPr lvl="1"/>
+            <a:r>
+              <a:rPr lang="de-DE" dirty="0" smtClean="0"/>
+              <a:t>Individuelle Schwellwerte für Unterschiedliche Beleuchtung</a:t>
+            </a:r>
+            <a:endParaRPr lang="de-DE" dirty="0"/>
+          </a:p>
+        </p:txBody>
+      </p:sp>
+      <p:pic>
+        <p:nvPicPr>
+          <p:cNvPr id="17" name="Grafik 16"/>
+          <p:cNvPicPr>
+            <a:picLocks noChangeAspect="1"/>
+          </p:cNvPicPr>
+          <p:nvPr/>
+        </p:nvPicPr>
+        <p:blipFill rotWithShape="1">
+          <a:blip r:embed="rId2">
+            <a:extLst>
+              <a:ext uri="{28A0092B-C50C-407E-A947-70E740481C1C}">
+                <a14:useLocalDpi xmlns:a14="http://schemas.microsoft.com/office/drawing/2010/main" val="0"/>
+              </a:ext>
+            </a:extLst>
+          </a:blip>
+          <a:srcRect l="17500" t="14095" r="15833" b="3671"/>
+          <a:stretch/>
+        </p:blipFill>
+        <p:spPr>
+          <a:xfrm>
+            <a:off x="2895600" y="2439353"/>
+            <a:ext cx="3733800" cy="3313747"/>
+          </a:xfrm>
+          <a:prstGeom prst="rect">
+            <a:avLst/>
+          </a:prstGeom>
+        </p:spPr>
+      </p:pic>
+      <p:pic>
+        <p:nvPicPr>
+          <p:cNvPr id="9" name="Grafik 8"/>
+          <p:cNvPicPr>
+            <a:picLocks noChangeAspect="1"/>
+          </p:cNvPicPr>
+          <p:nvPr/>
+        </p:nvPicPr>
+        <p:blipFill rotWithShape="1">
+          <a:blip r:embed="rId2">
+            <a:extLst>
+              <a:ext uri="{28A0092B-C50C-407E-A947-70E740481C1C}">
+                <a14:useLocalDpi xmlns:a14="http://schemas.microsoft.com/office/drawing/2010/main" val="0"/>
+              </a:ext>
+            </a:extLst>
+          </a:blip>
+          <a:srcRect l="68909" t="77989" r="21232" b="9287"/>
+          <a:stretch/>
+        </p:blipFill>
+        <p:spPr>
+          <a:xfrm>
+            <a:off x="7085817" y="5257800"/>
+            <a:ext cx="1066800" cy="990600"/>
+          </a:xfrm>
+          <a:prstGeom prst="rect">
+            <a:avLst/>
+          </a:prstGeom>
+        </p:spPr>
+      </p:pic>
+      <p:pic>
+        <p:nvPicPr>
+          <p:cNvPr id="10" name="Grafik 9"/>
+          <p:cNvPicPr>
+            <a:picLocks noChangeAspect="1"/>
+          </p:cNvPicPr>
+          <p:nvPr/>
+        </p:nvPicPr>
+        <p:blipFill rotWithShape="1">
+          <a:blip r:embed="rId2">
+            <a:extLst>
+              <a:ext uri="{28A0092B-C50C-407E-A947-70E740481C1C}">
+                <a14:useLocalDpi xmlns:a14="http://schemas.microsoft.com/office/drawing/2010/main" val="0"/>
+              </a:ext>
+            </a:extLst>
+          </a:blip>
+          <a:srcRect l="24542" t="22098" r="65599" b="65177"/>
+          <a:stretch/>
+        </p:blipFill>
+        <p:spPr>
+          <a:xfrm>
+            <a:off x="1219200" y="2068172"/>
+            <a:ext cx="1066800" cy="990600"/>
+          </a:xfrm>
+          <a:prstGeom prst="rect">
+            <a:avLst/>
+          </a:prstGeom>
+        </p:spPr>
+      </p:pic>
+      <p:cxnSp>
+        <p:nvCxnSpPr>
+          <p:cNvPr id="5" name="Gerader Verbinder 4"/>
+          <p:cNvCxnSpPr/>
+          <p:nvPr/>
+        </p:nvCxnSpPr>
+        <p:spPr>
+          <a:xfrm>
+            <a:off x="2057400" y="2563472"/>
+            <a:ext cx="1295400" cy="408328"/>
+          </a:xfrm>
+          <a:prstGeom prst="line">
+            <a:avLst/>
+          </a:prstGeom>
+        </p:spPr>
+        <p:style>
+          <a:lnRef idx="3">
+            <a:schemeClr val="accent1"/>
+          </a:lnRef>
+          <a:fillRef idx="0">
+            <a:schemeClr val="accent1"/>
+          </a:fillRef>
+          <a:effectRef idx="2">
+            <a:schemeClr val="accent1"/>
+          </a:effectRef>
+          <a:fontRef idx="minor">
+            <a:schemeClr val="tx1"/>
+          </a:fontRef>
+        </p:style>
+      </p:cxnSp>
+      <p:cxnSp>
+        <p:nvCxnSpPr>
+          <p:cNvPr id="11" name="Gerader Verbinder 10"/>
+          <p:cNvCxnSpPr/>
+          <p:nvPr/>
+        </p:nvCxnSpPr>
+        <p:spPr>
+          <a:xfrm>
+            <a:off x="6228959" y="5354297"/>
+            <a:ext cx="1010041" cy="364502"/>
+          </a:xfrm>
+          <a:prstGeom prst="line">
+            <a:avLst/>
+          </a:prstGeom>
+        </p:spPr>
+        <p:style>
+          <a:lnRef idx="3">
+            <a:schemeClr val="accent1"/>
+          </a:lnRef>
+          <a:fillRef idx="0">
+            <a:schemeClr val="accent1"/>
+          </a:fillRef>
+          <a:effectRef idx="2">
+            <a:schemeClr val="accent1"/>
+          </a:effectRef>
+          <a:fontRef idx="minor">
+            <a:schemeClr val="tx1"/>
+          </a:fontRef>
+        </p:style>
+      </p:cxnSp>
     </p:spTree>
     <p:extLst>
       <p:ext uri="{BB962C8B-B14F-4D97-AF65-F5344CB8AC3E}">
-        <p14:creationId xmlns:p14="http://schemas.microsoft.com/office/powerpoint/2010/main" val="543134797"/>
+        <p14:creationId xmlns:p14="http://schemas.microsoft.com/office/powerpoint/2010/main" val="3862156488"/>
+      </p:ext>
+    </p:extLst>
+  </p:cSld>
+  <p:clrMapOvr>
+    <a:masterClrMapping/>
+  </p:clrMapOvr>
+  <p:timing>
+    <p:tnLst>
+      <p:par>
+        <p:cTn id="1" dur="indefinite" restart="never" nodeType="tmRoot"/>
+      </p:par>
+    </p:tnLst>
+  </p:timing>
+</p:sld>
+</file>
+
+<file path=ppt/slides/slide18.xml><?xml version="1.0" encoding="utf-8"?>
+<p:sld xmlns:a="http://schemas.openxmlformats.org/drawingml/2006/main" xmlns:r="http://schemas.openxmlformats.org/officeDocument/2006/relationships" xmlns:p="http://schemas.openxmlformats.org/presentationml/2006/main">
+  <p:cSld>
+    <p:spTree>
+      <p:nvGrpSpPr>
+        <p:cNvPr id="1" name=""/>
+        <p:cNvGrpSpPr/>
+        <p:nvPr/>
+      </p:nvGrpSpPr>
+      <p:grpSpPr>
+        <a:xfrm>
+          <a:off x="0" y="0"/>
+          <a:ext cx="0" cy="0"/>
+          <a:chOff x="0" y="0"/>
+          <a:chExt cx="0" cy="0"/>
+        </a:xfrm>
+      </p:grpSpPr>
+      <p:sp>
+        <p:nvSpPr>
+          <p:cNvPr id="2" name="Titel 1"/>
+          <p:cNvSpPr>
+            <a:spLocks noGrp="1"/>
+          </p:cNvSpPr>
+          <p:nvPr>
+            <p:ph type="title"/>
+          </p:nvPr>
+        </p:nvSpPr>
+        <p:spPr/>
+        <p:txBody>
+          <a:bodyPr/>
+          <a:lstStyle/>
+          <a:p>
+            <a:r>
+              <a:rPr lang="de-DE" dirty="0"/>
+              <a:t>Bohrungsdetektion</a:t>
+            </a:r>
+            <a:endParaRPr lang="de-DE" dirty="0"/>
+          </a:p>
+        </p:txBody>
+      </p:sp>
+      <p:sp>
+        <p:nvSpPr>
+          <p:cNvPr id="3" name="Inhaltsplatzhalter 2"/>
+          <p:cNvSpPr>
+            <a:spLocks noGrp="1"/>
+          </p:cNvSpPr>
+          <p:nvPr>
+            <p:ph idx="1"/>
+          </p:nvPr>
+        </p:nvSpPr>
+        <p:spPr/>
+        <p:txBody>
+          <a:bodyPr/>
+          <a:lstStyle/>
+          <a:p>
+            <a:r>
+              <a:rPr lang="de-DE" dirty="0" smtClean="0"/>
+              <a:t>XOR von Schwellwertbild und Maskierung</a:t>
+            </a:r>
+          </a:p>
+          <a:p>
+            <a:pPr lvl="1"/>
+            <a:r>
+              <a:rPr lang="de-DE" dirty="0" smtClean="0"/>
+              <a:t>Einzelne Detektion von Bohrungen</a:t>
+            </a:r>
+            <a:endParaRPr lang="de-DE" dirty="0"/>
+          </a:p>
+          <a:p>
+            <a:r>
+              <a:rPr lang="de-DE" dirty="0" smtClean="0"/>
+              <a:t>Hough Transformation zur Kreis-Detektion</a:t>
+            </a:r>
+            <a:endParaRPr lang="de-DE" dirty="0"/>
+          </a:p>
+        </p:txBody>
+      </p:sp>
+      <p:pic>
+        <p:nvPicPr>
+          <p:cNvPr id="19" name="Grafik 18"/>
+          <p:cNvPicPr>
+            <a:picLocks noChangeAspect="1"/>
+          </p:cNvPicPr>
+          <p:nvPr/>
+        </p:nvPicPr>
+        <p:blipFill rotWithShape="1">
+          <a:blip r:embed="rId2">
+            <a:extLst>
+              <a:ext uri="{28A0092B-C50C-407E-A947-70E740481C1C}">
+                <a14:useLocalDpi xmlns:a14="http://schemas.microsoft.com/office/drawing/2010/main" val="0"/>
+              </a:ext>
+            </a:extLst>
+          </a:blip>
+          <a:srcRect l="15966" t="15556" r="16839" b="6666"/>
+          <a:stretch/>
+        </p:blipFill>
+        <p:spPr>
+          <a:xfrm>
+            <a:off x="5134330" y="2727936"/>
+            <a:ext cx="3704870" cy="3368064"/>
+          </a:xfrm>
+          <a:prstGeom prst="rect">
+            <a:avLst/>
+          </a:prstGeom>
+          <a:ln w="38100">
+            <a:solidFill>
+              <a:schemeClr val="bg1">
+                <a:lumMod val="85000"/>
+              </a:schemeClr>
+            </a:solidFill>
+          </a:ln>
+        </p:spPr>
+      </p:pic>
+      <p:pic>
+        <p:nvPicPr>
+          <p:cNvPr id="7" name="Grafik 6"/>
+          <p:cNvPicPr>
+            <a:picLocks noChangeAspect="1"/>
+          </p:cNvPicPr>
+          <p:nvPr/>
+        </p:nvPicPr>
+        <p:blipFill rotWithShape="1">
+          <a:blip r:embed="rId3" cstate="print">
+            <a:extLst>
+              <a:ext uri="{28A0092B-C50C-407E-A947-70E740481C1C}">
+                <a14:useLocalDpi xmlns:a14="http://schemas.microsoft.com/office/drawing/2010/main" val="0"/>
+              </a:ext>
+            </a:extLst>
+          </a:blip>
+          <a:srcRect l="15834" t="11170" r="14166" b="3088"/>
+          <a:stretch/>
+        </p:blipFill>
+        <p:spPr>
+          <a:xfrm>
+            <a:off x="228600" y="2720036"/>
+            <a:ext cx="3694113" cy="3375963"/>
+          </a:xfrm>
+          <a:prstGeom prst="rect">
+            <a:avLst/>
+          </a:prstGeom>
+        </p:spPr>
+      </p:pic>
+      <p:sp>
+        <p:nvSpPr>
+          <p:cNvPr id="4" name="Flussdiagramm: Prozess 3"/>
+          <p:cNvSpPr/>
+          <p:nvPr/>
+        </p:nvSpPr>
+        <p:spPr>
+          <a:xfrm>
+            <a:off x="4038600" y="4003530"/>
+            <a:ext cx="914400" cy="612648"/>
+          </a:xfrm>
+          <a:prstGeom prst="flowChartProcess">
+            <a:avLst/>
+          </a:prstGeom>
+        </p:spPr>
+        <p:style>
+          <a:lnRef idx="2">
+            <a:schemeClr val="accent1">
+              <a:shade val="50000"/>
+            </a:schemeClr>
+          </a:lnRef>
+          <a:fillRef idx="1">
+            <a:schemeClr val="accent1"/>
+          </a:fillRef>
+          <a:effectRef idx="0">
+            <a:schemeClr val="accent1"/>
+          </a:effectRef>
+          <a:fontRef idx="minor">
+            <a:schemeClr val="lt1"/>
+          </a:fontRef>
+        </p:style>
+        <p:txBody>
+          <a:bodyPr rtlCol="0" anchor="ctr"/>
+          <a:lstStyle/>
+          <a:p>
+            <a:pPr algn="ctr"/>
+            <a:r>
+              <a:rPr lang="de-DE" dirty="0" smtClean="0"/>
+              <a:t>XOR</a:t>
+            </a:r>
+            <a:endParaRPr lang="de-DE" dirty="0"/>
+          </a:p>
+        </p:txBody>
+      </p:sp>
+    </p:spTree>
+    <p:extLst>
+      <p:ext uri="{BB962C8B-B14F-4D97-AF65-F5344CB8AC3E}">
+        <p14:creationId xmlns:p14="http://schemas.microsoft.com/office/powerpoint/2010/main" val="1185749361"/>
+      </p:ext>
+    </p:extLst>
+  </p:cSld>
+  <p:clrMapOvr>
+    <a:masterClrMapping/>
+  </p:clrMapOvr>
+  <p:timing>
+    <p:tnLst>
+      <p:par>
+        <p:cTn id="1" dur="indefinite" restart="never" nodeType="tmRoot"/>
+      </p:par>
+    </p:tnLst>
+  </p:timing>
+</p:sld>
+</file>
+
+<file path=ppt/slides/slide19.xml><?xml version="1.0" encoding="utf-8"?>
+<p:sld xmlns:a="http://schemas.openxmlformats.org/drawingml/2006/main" xmlns:r="http://schemas.openxmlformats.org/officeDocument/2006/relationships" xmlns:p="http://schemas.openxmlformats.org/presentationml/2006/main">
+  <p:cSld>
+    <p:spTree>
+      <p:nvGrpSpPr>
+        <p:cNvPr id="1" name=""/>
+        <p:cNvGrpSpPr/>
+        <p:nvPr/>
+      </p:nvGrpSpPr>
+      <p:grpSpPr>
+        <a:xfrm>
+          <a:off x="0" y="0"/>
+          <a:ext cx="0" cy="0"/>
+          <a:chOff x="0" y="0"/>
+          <a:chExt cx="0" cy="0"/>
+        </a:xfrm>
+      </p:grpSpPr>
+      <p:sp>
+        <p:nvSpPr>
+          <p:cNvPr id="2" name="Titel 1"/>
+          <p:cNvSpPr>
+            <a:spLocks noGrp="1"/>
+          </p:cNvSpPr>
+          <p:nvPr>
+            <p:ph type="title"/>
+          </p:nvPr>
+        </p:nvSpPr>
+        <p:spPr/>
+        <p:txBody>
+          <a:bodyPr/>
+          <a:lstStyle/>
+          <a:p>
+            <a:r>
+              <a:rPr lang="de-DE" dirty="0" smtClean="0"/>
+              <a:t>Bohrungsüberprüfung</a:t>
+            </a:r>
+            <a:endParaRPr lang="de-DE" dirty="0"/>
+          </a:p>
+        </p:txBody>
+      </p:sp>
+      <p:sp>
+        <p:nvSpPr>
+          <p:cNvPr id="3" name="Inhaltsplatzhalter 2"/>
+          <p:cNvSpPr>
+            <a:spLocks noGrp="1"/>
+          </p:cNvSpPr>
+          <p:nvPr>
+            <p:ph idx="1"/>
+          </p:nvPr>
+        </p:nvSpPr>
+        <p:spPr/>
+        <p:txBody>
+          <a:bodyPr/>
+          <a:lstStyle/>
+          <a:p>
+            <a:r>
+              <a:rPr lang="de-DE" dirty="0" smtClean="0"/>
+              <a:t>Existenz von Bohrung in Nähe der berechneter Bohrungsposition</a:t>
+            </a:r>
+          </a:p>
+          <a:p>
+            <a:r>
+              <a:rPr lang="de-DE" dirty="0" smtClean="0"/>
+              <a:t>Zuordnung zu Bohrungsgrößen</a:t>
+            </a:r>
+          </a:p>
+          <a:p>
+            <a:r>
+              <a:rPr lang="de-DE" dirty="0" smtClean="0"/>
+              <a:t>Anordnung der erkannten Bohrungsgrößen</a:t>
+            </a:r>
+          </a:p>
+          <a:p>
+            <a:r>
+              <a:rPr lang="de-DE" dirty="0" smtClean="0"/>
+              <a:t>Markierung im Fehlerfall</a:t>
+            </a:r>
+            <a:endParaRPr lang="de-DE" dirty="0" smtClean="0"/>
+          </a:p>
+          <a:p>
+            <a:pPr lvl="1"/>
+            <a:endParaRPr lang="de-DE" dirty="0" smtClean="0"/>
+          </a:p>
+          <a:p>
+            <a:endParaRPr lang="de-DE" dirty="0" smtClean="0"/>
+          </a:p>
+          <a:p>
+            <a:pPr lvl="1"/>
+            <a:endParaRPr lang="de-DE" dirty="0"/>
+          </a:p>
+        </p:txBody>
+      </p:sp>
+      <p:pic>
+        <p:nvPicPr>
+          <p:cNvPr id="8" name="Grafik 7" descr="Perfekt3.png"/>
+          <p:cNvPicPr>
+            <a:picLocks noChangeAspect="1"/>
+          </p:cNvPicPr>
+          <p:nvPr/>
+        </p:nvPicPr>
+        <p:blipFill>
+          <a:blip r:embed="rId2"/>
+          <a:stretch>
+            <a:fillRect/>
+          </a:stretch>
+        </p:blipFill>
+        <p:spPr>
+          <a:xfrm flipH="1">
+            <a:off x="762000" y="2844356"/>
+            <a:ext cx="3429000" cy="3404044"/>
+          </a:xfrm>
+          <a:prstGeom prst="rect">
+            <a:avLst/>
+          </a:prstGeom>
+        </p:spPr>
+      </p:pic>
+      <p:pic>
+        <p:nvPicPr>
+          <p:cNvPr id="5" name="Grafik 4"/>
+          <p:cNvPicPr>
+            <a:picLocks noChangeAspect="1"/>
+          </p:cNvPicPr>
+          <p:nvPr/>
+        </p:nvPicPr>
+        <p:blipFill rotWithShape="1">
+          <a:blip r:embed="rId3">
+            <a:extLst>
+              <a:ext uri="{28A0092B-C50C-407E-A947-70E740481C1C}">
+                <a14:useLocalDpi xmlns:a14="http://schemas.microsoft.com/office/drawing/2010/main" val="0"/>
+              </a:ext>
+            </a:extLst>
+          </a:blip>
+          <a:srcRect l="35833" t="8401" r="11667" b="6192"/>
+          <a:stretch/>
+        </p:blipFill>
+        <p:spPr>
+          <a:xfrm>
+            <a:off x="4953000" y="2819400"/>
+            <a:ext cx="3515652" cy="3404044"/>
+          </a:xfrm>
+          <a:prstGeom prst="rect">
+            <a:avLst/>
+          </a:prstGeom>
+        </p:spPr>
+      </p:pic>
+    </p:spTree>
+    <p:extLst>
+      <p:ext uri="{BB962C8B-B14F-4D97-AF65-F5344CB8AC3E}">
+        <p14:creationId xmlns:p14="http://schemas.microsoft.com/office/powerpoint/2010/main" val="2797205545"/>
       </p:ext>
     </p:extLst>
   </p:cSld>
@@ -7669,6 +8418,599 @@
         </p:txBody>
       </p:sp>
     </p:spTree>
+  </p:cSld>
+  <p:clrMapOvr>
+    <a:masterClrMapping/>
+  </p:clrMapOvr>
+  <p:timing>
+    <p:tnLst>
+      <p:par>
+        <p:cTn id="1" dur="indefinite" restart="never" nodeType="tmRoot"/>
+      </p:par>
+    </p:tnLst>
+  </p:timing>
+</p:sld>
+</file>
+
+<file path=ppt/slides/slide20.xml><?xml version="1.0" encoding="utf-8"?>
+<p:sld xmlns:a="http://schemas.openxmlformats.org/drawingml/2006/main" xmlns:r="http://schemas.openxmlformats.org/officeDocument/2006/relationships" xmlns:p="http://schemas.openxmlformats.org/presentationml/2006/main">
+  <p:cSld>
+    <p:spTree>
+      <p:nvGrpSpPr>
+        <p:cNvPr id="1" name=""/>
+        <p:cNvGrpSpPr/>
+        <p:nvPr/>
+      </p:nvGrpSpPr>
+      <p:grpSpPr>
+        <a:xfrm>
+          <a:off x="0" y="0"/>
+          <a:ext cx="0" cy="0"/>
+          <a:chOff x="0" y="0"/>
+          <a:chExt cx="0" cy="0"/>
+        </a:xfrm>
+      </p:grpSpPr>
+      <p:sp>
+        <p:nvSpPr>
+          <p:cNvPr id="2" name="Titel 1"/>
+          <p:cNvSpPr>
+            <a:spLocks noGrp="1"/>
+          </p:cNvSpPr>
+          <p:nvPr>
+            <p:ph type="title"/>
+          </p:nvPr>
+        </p:nvSpPr>
+        <p:spPr/>
+        <p:txBody>
+          <a:bodyPr/>
+          <a:lstStyle/>
+          <a:p>
+            <a:r>
+              <a:rPr lang="de-DE" dirty="0" smtClean="0"/>
+              <a:t>Programm-Ablauf</a:t>
+            </a:r>
+            <a:endParaRPr lang="de-DE" dirty="0"/>
+          </a:p>
+        </p:txBody>
+      </p:sp>
+      <p:sp>
+        <p:nvSpPr>
+          <p:cNvPr id="4" name="Flussdiagramm: Alternativer Prozess 3"/>
+          <p:cNvSpPr/>
+          <p:nvPr/>
+        </p:nvSpPr>
+        <p:spPr>
+          <a:xfrm>
+            <a:off x="2971800" y="1040600"/>
+            <a:ext cx="2743200" cy="612648"/>
+          </a:xfrm>
+          <a:prstGeom prst="flowChartAlternateProcess">
+            <a:avLst/>
+          </a:prstGeom>
+          <a:solidFill>
+            <a:schemeClr val="accent1">
+              <a:alpha val="25000"/>
+            </a:schemeClr>
+          </a:solidFill>
+          <a:ln>
+            <a:solidFill>
+              <a:schemeClr val="accent1">
+                <a:shade val="50000"/>
+                <a:alpha val="25000"/>
+              </a:schemeClr>
+            </a:solidFill>
+          </a:ln>
+        </p:spPr>
+        <p:style>
+          <a:lnRef idx="2">
+            <a:schemeClr val="accent1">
+              <a:shade val="50000"/>
+            </a:schemeClr>
+          </a:lnRef>
+          <a:fillRef idx="1">
+            <a:schemeClr val="accent1"/>
+          </a:fillRef>
+          <a:effectRef idx="0">
+            <a:schemeClr val="accent1"/>
+          </a:effectRef>
+          <a:fontRef idx="minor">
+            <a:schemeClr val="lt1"/>
+          </a:fontRef>
+        </p:style>
+        <p:txBody>
+          <a:bodyPr rtlCol="0" anchor="ctr"/>
+          <a:lstStyle/>
+          <a:p>
+            <a:pPr algn="ctr"/>
+            <a:r>
+              <a:rPr lang="de-DE" dirty="0" smtClean="0"/>
+              <a:t>Kalibrierung</a:t>
+            </a:r>
+            <a:endParaRPr lang="de-DE" dirty="0"/>
+          </a:p>
+        </p:txBody>
+      </p:sp>
+      <p:sp>
+        <p:nvSpPr>
+          <p:cNvPr id="5" name="Flussdiagramm: Alternativer Prozess 4"/>
+          <p:cNvSpPr/>
+          <p:nvPr/>
+        </p:nvSpPr>
+        <p:spPr>
+          <a:xfrm>
+            <a:off x="2971800" y="2397744"/>
+            <a:ext cx="2743200" cy="612648"/>
+          </a:xfrm>
+          <a:prstGeom prst="flowChartAlternateProcess">
+            <a:avLst/>
+          </a:prstGeom>
+          <a:solidFill>
+            <a:schemeClr val="accent1">
+              <a:alpha val="25000"/>
+            </a:schemeClr>
+          </a:solidFill>
+          <a:ln>
+            <a:solidFill>
+              <a:schemeClr val="accent1">
+                <a:alpha val="25000"/>
+              </a:schemeClr>
+            </a:solidFill>
+          </a:ln>
+        </p:spPr>
+        <p:style>
+          <a:lnRef idx="2">
+            <a:schemeClr val="accent1">
+              <a:shade val="50000"/>
+            </a:schemeClr>
+          </a:lnRef>
+          <a:fillRef idx="1">
+            <a:schemeClr val="accent1"/>
+          </a:fillRef>
+          <a:effectRef idx="0">
+            <a:schemeClr val="accent1"/>
+          </a:effectRef>
+          <a:fontRef idx="minor">
+            <a:schemeClr val="lt1"/>
+          </a:fontRef>
+        </p:style>
+        <p:txBody>
+          <a:bodyPr rtlCol="0" anchor="ctr"/>
+          <a:lstStyle/>
+          <a:p>
+            <a:pPr algn="ctr"/>
+            <a:r>
+              <a:rPr lang="de-DE" dirty="0"/>
+              <a:t>Lage und Maße</a:t>
+            </a:r>
+          </a:p>
+        </p:txBody>
+      </p:sp>
+      <p:sp>
+        <p:nvSpPr>
+          <p:cNvPr id="6" name="Flussdiagramm: Alternativer Prozess 5"/>
+          <p:cNvSpPr/>
+          <p:nvPr/>
+        </p:nvSpPr>
+        <p:spPr>
+          <a:xfrm>
+            <a:off x="2986216" y="3748710"/>
+            <a:ext cx="2743200" cy="612648"/>
+          </a:xfrm>
+          <a:prstGeom prst="flowChartAlternateProcess">
+            <a:avLst/>
+          </a:prstGeom>
+          <a:solidFill>
+            <a:schemeClr val="accent1">
+              <a:alpha val="25000"/>
+            </a:schemeClr>
+          </a:solidFill>
+          <a:ln>
+            <a:solidFill>
+              <a:schemeClr val="accent1">
+                <a:alpha val="25000"/>
+              </a:schemeClr>
+            </a:solidFill>
+          </a:ln>
+        </p:spPr>
+        <p:style>
+          <a:lnRef idx="2">
+            <a:schemeClr val="accent1">
+              <a:shade val="50000"/>
+            </a:schemeClr>
+          </a:lnRef>
+          <a:fillRef idx="1">
+            <a:schemeClr val="accent1"/>
+          </a:fillRef>
+          <a:effectRef idx="0">
+            <a:schemeClr val="accent1"/>
+          </a:effectRef>
+          <a:fontRef idx="minor">
+            <a:schemeClr val="lt1"/>
+          </a:fontRef>
+        </p:style>
+        <p:txBody>
+          <a:bodyPr rtlCol="0" anchor="ctr"/>
+          <a:lstStyle/>
+          <a:p>
+            <a:pPr algn="ctr"/>
+            <a:r>
+              <a:rPr lang="de-DE" dirty="0" smtClean="0"/>
+              <a:t>Bohrungen</a:t>
+            </a:r>
+            <a:endParaRPr lang="de-DE" dirty="0"/>
+          </a:p>
+        </p:txBody>
+      </p:sp>
+      <p:sp>
+        <p:nvSpPr>
+          <p:cNvPr id="7" name="Flussdiagramm: Alternativer Prozess 6"/>
+          <p:cNvSpPr/>
+          <p:nvPr/>
+        </p:nvSpPr>
+        <p:spPr>
+          <a:xfrm>
+            <a:off x="2971800" y="5105854"/>
+            <a:ext cx="2743200" cy="612648"/>
+          </a:xfrm>
+          <a:prstGeom prst="flowChartAlternateProcess">
+            <a:avLst/>
+          </a:prstGeom>
+          <a:solidFill>
+            <a:schemeClr val="accent1"/>
+          </a:solidFill>
+          <a:ln>
+            <a:solidFill>
+              <a:schemeClr val="accent1"/>
+            </a:solidFill>
+          </a:ln>
+        </p:spPr>
+        <p:style>
+          <a:lnRef idx="2">
+            <a:schemeClr val="accent1">
+              <a:shade val="50000"/>
+            </a:schemeClr>
+          </a:lnRef>
+          <a:fillRef idx="1">
+            <a:schemeClr val="accent1"/>
+          </a:fillRef>
+          <a:effectRef idx="0">
+            <a:schemeClr val="accent1"/>
+          </a:effectRef>
+          <a:fontRef idx="minor">
+            <a:schemeClr val="lt1"/>
+          </a:fontRef>
+        </p:style>
+        <p:txBody>
+          <a:bodyPr rtlCol="0" anchor="ctr"/>
+          <a:lstStyle/>
+          <a:p>
+            <a:pPr algn="ctr"/>
+            <a:r>
+              <a:rPr lang="de-DE" dirty="0" smtClean="0"/>
+              <a:t>Schäden</a:t>
+            </a:r>
+            <a:endParaRPr lang="de-DE" dirty="0"/>
+          </a:p>
+        </p:txBody>
+      </p:sp>
+      <p:cxnSp>
+        <p:nvCxnSpPr>
+          <p:cNvPr id="11" name="Gerade Verbindung mit Pfeil 10"/>
+          <p:cNvCxnSpPr>
+            <a:stCxn id="4" idx="2"/>
+            <a:endCxn id="5" idx="0"/>
+          </p:cNvCxnSpPr>
+          <p:nvPr/>
+        </p:nvCxnSpPr>
+        <p:spPr>
+          <a:xfrm>
+            <a:off x="4343400" y="1653248"/>
+            <a:ext cx="0" cy="744496"/>
+          </a:xfrm>
+          <a:prstGeom prst="straightConnector1">
+            <a:avLst/>
+          </a:prstGeom>
+          <a:ln>
+            <a:solidFill>
+              <a:schemeClr val="accent1">
+                <a:alpha val="25000"/>
+              </a:schemeClr>
+            </a:solidFill>
+            <a:tailEnd type="triangle"/>
+          </a:ln>
+        </p:spPr>
+        <p:style>
+          <a:lnRef idx="3">
+            <a:schemeClr val="accent1"/>
+          </a:lnRef>
+          <a:fillRef idx="0">
+            <a:schemeClr val="accent1"/>
+          </a:fillRef>
+          <a:effectRef idx="2">
+            <a:schemeClr val="accent1"/>
+          </a:effectRef>
+          <a:fontRef idx="minor">
+            <a:schemeClr val="tx1"/>
+          </a:fontRef>
+        </p:style>
+      </p:cxnSp>
+      <p:cxnSp>
+        <p:nvCxnSpPr>
+          <p:cNvPr id="13" name="Gerade Verbindung mit Pfeil 12"/>
+          <p:cNvCxnSpPr/>
+          <p:nvPr/>
+        </p:nvCxnSpPr>
+        <p:spPr>
+          <a:xfrm>
+            <a:off x="4343400" y="3004214"/>
+            <a:ext cx="0" cy="744496"/>
+          </a:xfrm>
+          <a:prstGeom prst="straightConnector1">
+            <a:avLst/>
+          </a:prstGeom>
+          <a:ln>
+            <a:solidFill>
+              <a:schemeClr val="accent1">
+                <a:alpha val="25000"/>
+              </a:schemeClr>
+            </a:solidFill>
+            <a:tailEnd type="triangle"/>
+          </a:ln>
+        </p:spPr>
+        <p:style>
+          <a:lnRef idx="3">
+            <a:schemeClr val="accent1"/>
+          </a:lnRef>
+          <a:fillRef idx="0">
+            <a:schemeClr val="accent1"/>
+          </a:fillRef>
+          <a:effectRef idx="2">
+            <a:schemeClr val="accent1"/>
+          </a:effectRef>
+          <a:fontRef idx="minor">
+            <a:schemeClr val="tx1"/>
+          </a:fontRef>
+        </p:style>
+      </p:cxnSp>
+      <p:cxnSp>
+        <p:nvCxnSpPr>
+          <p:cNvPr id="14" name="Gerade Verbindung mit Pfeil 13"/>
+          <p:cNvCxnSpPr/>
+          <p:nvPr/>
+        </p:nvCxnSpPr>
+        <p:spPr>
+          <a:xfrm>
+            <a:off x="4333103" y="4361358"/>
+            <a:ext cx="0" cy="744496"/>
+          </a:xfrm>
+          <a:prstGeom prst="straightConnector1">
+            <a:avLst/>
+          </a:prstGeom>
+          <a:ln>
+            <a:solidFill>
+              <a:schemeClr val="accent1">
+                <a:alpha val="25000"/>
+              </a:schemeClr>
+            </a:solidFill>
+            <a:tailEnd type="triangle"/>
+          </a:ln>
+        </p:spPr>
+        <p:style>
+          <a:lnRef idx="3">
+            <a:schemeClr val="accent1"/>
+          </a:lnRef>
+          <a:fillRef idx="0">
+            <a:schemeClr val="accent1"/>
+          </a:fillRef>
+          <a:effectRef idx="2">
+            <a:schemeClr val="accent1"/>
+          </a:effectRef>
+          <a:fontRef idx="minor">
+            <a:schemeClr val="tx1"/>
+          </a:fontRef>
+        </p:style>
+      </p:cxnSp>
+    </p:spTree>
+    <p:extLst>
+      <p:ext uri="{BB962C8B-B14F-4D97-AF65-F5344CB8AC3E}">
+        <p14:creationId xmlns:p14="http://schemas.microsoft.com/office/powerpoint/2010/main" val="1212497302"/>
+      </p:ext>
+    </p:extLst>
+  </p:cSld>
+  <p:clrMapOvr>
+    <a:masterClrMapping/>
+  </p:clrMapOvr>
+  <p:timing>
+    <p:tnLst>
+      <p:par>
+        <p:cTn id="1" dur="indefinite" restart="never" nodeType="tmRoot"/>
+      </p:par>
+    </p:tnLst>
+  </p:timing>
+</p:sld>
+</file>
+
+<file path=ppt/slides/slide21.xml><?xml version="1.0" encoding="utf-8"?>
+<p:sld xmlns:a="http://schemas.openxmlformats.org/drawingml/2006/main" xmlns:r="http://schemas.openxmlformats.org/officeDocument/2006/relationships" xmlns:p="http://schemas.openxmlformats.org/presentationml/2006/main">
+  <p:cSld>
+    <p:spTree>
+      <p:nvGrpSpPr>
+        <p:cNvPr id="1" name=""/>
+        <p:cNvGrpSpPr/>
+        <p:nvPr/>
+      </p:nvGrpSpPr>
+      <p:grpSpPr>
+        <a:xfrm>
+          <a:off x="0" y="0"/>
+          <a:ext cx="0" cy="0"/>
+          <a:chOff x="0" y="0"/>
+          <a:chExt cx="0" cy="0"/>
+        </a:xfrm>
+      </p:grpSpPr>
+      <p:sp>
+        <p:nvSpPr>
+          <p:cNvPr id="2" name="Titel 1"/>
+          <p:cNvSpPr>
+            <a:spLocks noGrp="1"/>
+          </p:cNvSpPr>
+          <p:nvPr>
+            <p:ph type="title"/>
+          </p:nvPr>
+        </p:nvSpPr>
+        <p:spPr/>
+        <p:txBody>
+          <a:bodyPr/>
+          <a:lstStyle/>
+          <a:p>
+            <a:r>
+              <a:rPr lang="de-DE" dirty="0" smtClean="0"/>
+              <a:t>Prüfen auf Beschädigungen</a:t>
+            </a:r>
+            <a:endParaRPr lang="de-DE" dirty="0"/>
+          </a:p>
+        </p:txBody>
+      </p:sp>
+      <p:sp>
+        <p:nvSpPr>
+          <p:cNvPr id="3" name="Inhaltsplatzhalter 2"/>
+          <p:cNvSpPr>
+            <a:spLocks noGrp="1"/>
+          </p:cNvSpPr>
+          <p:nvPr>
+            <p:ph idx="1"/>
+          </p:nvPr>
+        </p:nvSpPr>
+        <p:spPr/>
+        <p:txBody>
+          <a:bodyPr/>
+          <a:lstStyle/>
+          <a:p>
+            <a:r>
+              <a:rPr lang="de-DE" dirty="0" smtClean="0"/>
+              <a:t>Maskieren des Werkstücks</a:t>
+            </a:r>
+          </a:p>
+          <a:p>
+            <a:r>
+              <a:rPr lang="de-DE" dirty="0" smtClean="0"/>
+              <a:t>Filtern</a:t>
+            </a:r>
+          </a:p>
+          <a:p>
+            <a:pPr lvl="1"/>
+            <a:r>
+              <a:rPr lang="de-DE" dirty="0" err="1" smtClean="0"/>
+              <a:t>Guided</a:t>
+            </a:r>
+            <a:r>
+              <a:rPr lang="de-DE" dirty="0" smtClean="0"/>
+              <a:t> Image Filter</a:t>
+            </a:r>
+          </a:p>
+          <a:p>
+            <a:r>
+              <a:rPr lang="de-DE" dirty="0" smtClean="0"/>
+              <a:t>Kantendetektion mit </a:t>
+            </a:r>
+            <a:r>
+              <a:rPr lang="de-DE" dirty="0" err="1" smtClean="0"/>
+              <a:t>Canny</a:t>
+            </a:r>
+            <a:endParaRPr lang="de-DE" dirty="0" smtClean="0"/>
+          </a:p>
+          <a:p>
+            <a:r>
+              <a:rPr lang="de-DE" dirty="0" smtClean="0"/>
+              <a:t>Kanten und Bohrungen entfernen</a:t>
+            </a:r>
+          </a:p>
+          <a:p>
+            <a:r>
+              <a:rPr lang="de-DE" dirty="0" smtClean="0"/>
+              <a:t>Cluster finden</a:t>
+            </a:r>
+          </a:p>
+          <a:p>
+            <a:r>
+              <a:rPr lang="de-DE" dirty="0" smtClean="0"/>
+              <a:t>Zusätzlich: Überprüfung des Stegs</a:t>
+            </a:r>
+          </a:p>
+          <a:p>
+            <a:pPr lvl="1"/>
+            <a:r>
+              <a:rPr lang="de-DE" dirty="0" err="1" smtClean="0"/>
+              <a:t>Threshold</a:t>
+            </a:r>
+            <a:endParaRPr lang="de-DE" dirty="0"/>
+          </a:p>
+        </p:txBody>
+      </p:sp>
+    </p:spTree>
+  </p:cSld>
+  <p:clrMapOvr>
+    <a:masterClrMapping/>
+  </p:clrMapOvr>
+  <p:timing>
+    <p:tnLst>
+      <p:par>
+        <p:cTn id="1" dur="indefinite" restart="never" nodeType="tmRoot"/>
+      </p:par>
+    </p:tnLst>
+  </p:timing>
+</p:sld>
+</file>
+
+<file path=ppt/slides/slide22.xml><?xml version="1.0" encoding="utf-8"?>
+<p:sld xmlns:a="http://schemas.openxmlformats.org/drawingml/2006/main" xmlns:r="http://schemas.openxmlformats.org/officeDocument/2006/relationships" xmlns:p="http://schemas.openxmlformats.org/presentationml/2006/main">
+  <p:cSld>
+    <p:spTree>
+      <p:nvGrpSpPr>
+        <p:cNvPr id="1" name=""/>
+        <p:cNvGrpSpPr/>
+        <p:nvPr/>
+      </p:nvGrpSpPr>
+      <p:grpSpPr>
+        <a:xfrm>
+          <a:off x="0" y="0"/>
+          <a:ext cx="0" cy="0"/>
+          <a:chOff x="0" y="0"/>
+          <a:chExt cx="0" cy="0"/>
+        </a:xfrm>
+      </p:grpSpPr>
+      <p:sp>
+        <p:nvSpPr>
+          <p:cNvPr id="2" name="Titel 1"/>
+          <p:cNvSpPr>
+            <a:spLocks noGrp="1"/>
+          </p:cNvSpPr>
+          <p:nvPr>
+            <p:ph type="title"/>
+          </p:nvPr>
+        </p:nvSpPr>
+        <p:spPr>
+          <a:xfrm>
+            <a:off x="1905000" y="2895600"/>
+            <a:ext cx="6911975" cy="693737"/>
+          </a:xfrm>
+        </p:spPr>
+        <p:txBody>
+          <a:bodyPr/>
+          <a:lstStyle/>
+          <a:p>
+            <a:r>
+              <a:rPr lang="de-DE" sz="6000" dirty="0" smtClean="0"/>
+              <a:t>Vorführung</a:t>
+            </a:r>
+            <a:endParaRPr lang="de-DE" sz="6000" dirty="0"/>
+          </a:p>
+        </p:txBody>
+      </p:sp>
+    </p:spTree>
+    <p:extLst>
+      <p:ext uri="{BB962C8B-B14F-4D97-AF65-F5344CB8AC3E}">
+        <p14:creationId xmlns:p14="http://schemas.microsoft.com/office/powerpoint/2010/main" val="543134797"/>
+      </p:ext>
+    </p:extLst>
   </p:cSld>
   <p:clrMapOvr>
     <a:masterClrMapping/>
@@ -8531,11 +9873,11 @@
   <p:clrMapOvr>
     <a:masterClrMapping/>
   </p:clrMapOvr>
-  <mc:AlternateContent xmlns:mc="http://schemas.openxmlformats.org/markup-compatibility/2006">
-    <mc:Choice xmlns:p14="http://schemas.microsoft.com/office/powerpoint/2010/main" Requires="p14">
+  <mc:AlternateContent xmlns:mc="http://schemas.openxmlformats.org/markup-compatibility/2006" xmlns:p14="http://schemas.microsoft.com/office/powerpoint/2010/main">
+    <mc:Choice Requires="p14">
       <p:transition spd="slow" p14:dur="2000"/>
     </mc:Choice>
-    <mc:Fallback>
+    <mc:Fallback xmlns="">
       <p:transition spd="slow"/>
     </mc:Fallback>
   </mc:AlternateContent>
@@ -9033,7 +10375,6 @@
               <a:rPr lang="de-DE" dirty="0"/>
               <a:t>Lage und Maße</a:t>
             </a:r>
-            <a:endParaRPr lang="de-DE" dirty="0"/>
           </a:p>
         </p:txBody>
       </p:sp>
@@ -9089,7 +10430,6 @@
               <a:rPr lang="de-DE" dirty="0"/>
               <a:t>Bohrungen</a:t>
             </a:r>
-            <a:endParaRPr lang="de-DE" dirty="0"/>
           </a:p>
         </p:txBody>
       </p:sp>

</xml_diff>

<commit_message>
Fixed small mistake on slide
</commit_message>
<xml_diff>
--- a/Praesentation/Vorlage Präsentation.pptx
+++ b/Praesentation/Vorlage Präsentation.pptx
@@ -6953,7 +6953,6 @@
               <a:rPr lang="de-DE" dirty="0"/>
               <a:t>anhand Rechteck-Eckpunktekorrekten </a:t>
             </a:r>
-            <a:endParaRPr lang="de-DE" dirty="0"/>
           </a:p>
         </p:txBody>
       </p:sp>
@@ -7351,7 +7350,7 @@
         </p:nvSpPr>
         <p:spPr>
           <a:xfrm>
-            <a:off x="3977640" y="3516966"/>
+            <a:off x="4038600" y="3516966"/>
             <a:ext cx="381000" cy="411481"/>
           </a:xfrm>
           <a:prstGeom prst="rightArrow">
@@ -7622,7 +7621,6 @@
               <a:rPr lang="de-DE" dirty="0"/>
               <a:t>Bohrungsdetektion</a:t>
             </a:r>
-            <a:endParaRPr lang="de-DE" dirty="0"/>
           </a:p>
         </p:txBody>
       </p:sp>
@@ -7741,7 +7739,6 @@
               <a:rPr lang="de-DE" dirty="0"/>
               <a:t>Bohrungsdetektion</a:t>
             </a:r>
-            <a:endParaRPr lang="de-DE" dirty="0"/>
           </a:p>
         </p:txBody>
       </p:sp>
@@ -7978,7 +7975,6 @@
               <a:rPr lang="de-DE" dirty="0"/>
               <a:t>Bohrungsdetektion</a:t>
             </a:r>
-            <a:endParaRPr lang="de-DE" dirty="0"/>
           </a:p>
         </p:txBody>
       </p:sp>
@@ -8011,9 +8007,37 @@
             <a:endParaRPr lang="de-DE" dirty="0"/>
           </a:p>
           <a:p>
+            <a:endParaRPr lang="de-DE" dirty="0" smtClean="0"/>
+          </a:p>
+          <a:p>
+            <a:endParaRPr lang="de-DE" dirty="0"/>
+          </a:p>
+          <a:p>
+            <a:endParaRPr lang="de-DE" dirty="0" smtClean="0"/>
+          </a:p>
+          <a:p>
+            <a:endParaRPr lang="de-DE" dirty="0"/>
+          </a:p>
+          <a:p>
+            <a:endParaRPr lang="de-DE" dirty="0" smtClean="0"/>
+          </a:p>
+          <a:p>
+            <a:endParaRPr lang="de-DE" dirty="0"/>
+          </a:p>
+          <a:p>
+            <a:endParaRPr lang="de-DE" dirty="0" smtClean="0"/>
+          </a:p>
+          <a:p>
+            <a:endParaRPr lang="de-DE" dirty="0"/>
+          </a:p>
+          <a:p>
             <a:r>
               <a:rPr lang="de-DE" dirty="0" smtClean="0"/>
-              <a:t>Hough Transformation zur Kreis-Detektion</a:t>
+              <a:t>Hough </a:t>
+            </a:r>
+            <a:r>
+              <a:rPr lang="de-DE" dirty="0" smtClean="0"/>
+              <a:t>Transformation zur Kreis-Detektion</a:t>
             </a:r>
             <a:endParaRPr lang="de-DE" dirty="0"/>
           </a:p>
@@ -8021,43 +8045,80 @@
       </p:sp>
       <p:pic>
         <p:nvPicPr>
-          <p:cNvPr id="19" name="Grafik 18"/>
+          <p:cNvPr id="7" name="Grafik 6"/>
           <p:cNvPicPr>
             <a:picLocks noChangeAspect="1"/>
           </p:cNvPicPr>
           <p:nvPr/>
         </p:nvPicPr>
         <p:blipFill rotWithShape="1">
-          <a:blip r:embed="rId2">
+          <a:blip r:embed="rId2" cstate="print">
             <a:extLst>
               <a:ext uri="{28A0092B-C50C-407E-A947-70E740481C1C}">
                 <a14:useLocalDpi xmlns:a14="http://schemas.microsoft.com/office/drawing/2010/main" val="0"/>
               </a:ext>
             </a:extLst>
           </a:blip>
-          <a:srcRect l="15966" t="15556" r="16839" b="6666"/>
+          <a:srcRect l="15834" t="11170" r="14166" b="3088"/>
           <a:stretch/>
         </p:blipFill>
         <p:spPr>
           <a:xfrm>
-            <a:off x="5134330" y="2727936"/>
-            <a:ext cx="3704870" cy="3368064"/>
+            <a:off x="228600" y="2057400"/>
+            <a:ext cx="2363152" cy="2159629"/>
           </a:xfrm>
           <a:prstGeom prst="rect">
             <a:avLst/>
           </a:prstGeom>
-          <a:ln w="38100">
-            <a:solidFill>
-              <a:schemeClr val="bg1">
-                <a:lumMod val="85000"/>
-              </a:schemeClr>
-            </a:solidFill>
-          </a:ln>
         </p:spPr>
       </p:pic>
+      <p:sp>
+        <p:nvSpPr>
+          <p:cNvPr id="4" name="Flussdiagramm: Prozess 3"/>
+          <p:cNvSpPr/>
+          <p:nvPr/>
+        </p:nvSpPr>
+        <p:spPr>
+          <a:xfrm>
+            <a:off x="2743200" y="2819400"/>
+            <a:ext cx="685800" cy="459486"/>
+          </a:xfrm>
+          <a:prstGeom prst="flowChartProcess">
+            <a:avLst/>
+          </a:prstGeom>
+        </p:spPr>
+        <p:style>
+          <a:lnRef idx="2">
+            <a:schemeClr val="accent1">
+              <a:shade val="50000"/>
+            </a:schemeClr>
+          </a:lnRef>
+          <a:fillRef idx="1">
+            <a:schemeClr val="accent1"/>
+          </a:fillRef>
+          <a:effectRef idx="0">
+            <a:schemeClr val="accent1"/>
+          </a:effectRef>
+          <a:fontRef idx="minor">
+            <a:schemeClr val="lt1"/>
+          </a:fontRef>
+        </p:style>
+        <p:txBody>
+          <a:bodyPr rtlCol="0" anchor="ctr"/>
+          <a:lstStyle/>
+          <a:p>
+            <a:pPr algn="ctr"/>
+            <a:r>
+              <a:rPr lang="de-DE" dirty="0" smtClean="0"/>
+              <a:t>XOR</a:t>
+            </a:r>
+            <a:endParaRPr lang="de-DE" dirty="0"/>
+          </a:p>
+        </p:txBody>
+      </p:sp>
       <p:pic>
         <p:nvPicPr>
-          <p:cNvPr id="7" name="Grafik 6"/>
+          <p:cNvPr id="8" name="Grafik 7"/>
           <p:cNvPicPr>
             <a:picLocks noChangeAspect="1"/>
           </p:cNvPicPr>
@@ -8071,31 +8132,76 @@
               </a:ext>
             </a:extLst>
           </a:blip>
-          <a:srcRect l="15834" t="11170" r="14166" b="3088"/>
+          <a:srcRect l="15966" t="15556" r="16839" b="6666"/>
           <a:stretch/>
         </p:blipFill>
         <p:spPr>
           <a:xfrm>
-            <a:off x="228600" y="2720036"/>
-            <a:ext cx="3694113" cy="3375963"/>
+            <a:off x="6553200" y="2057400"/>
+            <a:ext cx="2423161" cy="2133601"/>
           </a:xfrm>
           <a:prstGeom prst="rect">
             <a:avLst/>
           </a:prstGeom>
+          <a:ln w="38100">
+            <a:solidFill>
+              <a:schemeClr val="bg1">
+                <a:lumMod val="85000"/>
+              </a:schemeClr>
+            </a:solidFill>
+          </a:ln>
         </p:spPr>
       </p:pic>
-      <p:sp>
-        <p:nvSpPr>
-          <p:cNvPr id="4" name="Flussdiagramm: Prozess 3"/>
+      <p:pic>
+        <p:nvPicPr>
+          <p:cNvPr id="5" name="Grafik 4"/>
+          <p:cNvPicPr>
+            <a:picLocks noChangeAspect="1"/>
+          </p:cNvPicPr>
+          <p:nvPr/>
+        </p:nvPicPr>
+        <p:blipFill>
+          <a:blip r:embed="rId4">
+            <a:extLst>
+              <a:ext uri="{28A0092B-C50C-407E-A947-70E740481C1C}">
+                <a14:useLocalDpi xmlns:a14="http://schemas.microsoft.com/office/drawing/2010/main" val="0"/>
+              </a:ext>
+            </a:extLst>
+          </a:blip>
+          <a:stretch>
+            <a:fillRect/>
+          </a:stretch>
+        </p:blipFill>
+        <p:spPr>
+          <a:xfrm>
+            <a:off x="3606551" y="2057401"/>
+            <a:ext cx="2337049" cy="2133600"/>
+          </a:xfrm>
+          <a:prstGeom prst="rect">
+            <a:avLst/>
+          </a:prstGeom>
+          <a:noFill/>
+          <a:ln w="28575">
+            <a:solidFill>
+              <a:schemeClr val="bg1">
+                <a:lumMod val="85000"/>
+              </a:schemeClr>
+            </a:solidFill>
+          </a:ln>
+        </p:spPr>
+      </p:pic>
+      <p:sp>
+        <p:nvSpPr>
+          <p:cNvPr id="9" name="Pfeil nach rechts 8"/>
           <p:cNvSpPr/>
           <p:nvPr/>
         </p:nvSpPr>
         <p:spPr>
           <a:xfrm>
-            <a:off x="4038600" y="4003530"/>
-            <a:ext cx="914400" cy="612648"/>
-          </a:xfrm>
-          <a:prstGeom prst="flowChartProcess">
+            <a:off x="6096000" y="2867405"/>
+            <a:ext cx="381000" cy="411481"/>
+          </a:xfrm>
+          <a:prstGeom prst="rightArrow">
             <a:avLst/>
           </a:prstGeom>
         </p:spPr>
@@ -8120,11 +8226,7 @@
           <a:lstStyle/>
           <a:p>
             <a:pPr algn="ctr"/>
-            <a:r>
-              <a:rPr lang="de-DE" dirty="0" smtClean="0"/>
-              <a:t>XOR</a:t>
-            </a:r>
-            <a:endParaRPr lang="de-DE" dirty="0"/>
+            <a:endParaRPr lang="de-DE"/>
           </a:p>
         </p:txBody>
       </p:sp>
@@ -8225,7 +8327,6 @@
               <a:rPr lang="de-DE" dirty="0" smtClean="0"/>
               <a:t>Markierung im Fehlerfall</a:t>
             </a:r>
-            <a:endParaRPr lang="de-DE" dirty="0" smtClean="0"/>
           </a:p>
           <a:p>
             <a:pPr lvl="1"/>

</xml_diff>